<commit_message>
add coordinate of scan laser and robot
</commit_message>
<xml_diff>
--- a/SLAM_Theoretical_Formulas.pptx
+++ b/SLAM_Theoretical_Formulas.pptx
@@ -104,6 +104,11 @@
       </a:defRPr>
     </a:lvl9pPr>
   </p:defaultTextStyle>
+  <p:extLst>
+    <p:ext uri="{EFAFB233-063F-42B5-8137-9DF3F51BA10A}">
+      <p15:sldGuideLst xmlns:p15="http://schemas.microsoft.com/office/powerpoint/2012/main"/>
+    </p:ext>
+  </p:extLst>
 </p:presentation>
 </file>
 
@@ -254,7 +259,7 @@
           <a:p>
             <a:fld id="{9DDD97A9-1B44-463F-8EAF-3A848A7F5CA1}" type="datetimeFigureOut">
               <a:rPr kumimoji="1" lang="ja-JP" altLang="en-US" smtClean="0"/>
-              <a:t>2020/7/9</a:t>
+              <a:t>2020/7/10</a:t>
             </a:fld>
             <a:endParaRPr kumimoji="1" lang="ja-JP" altLang="en-US"/>
           </a:p>
@@ -484,7 +489,7 @@
           <a:p>
             <a:fld id="{9DDD97A9-1B44-463F-8EAF-3A848A7F5CA1}" type="datetimeFigureOut">
               <a:rPr kumimoji="1" lang="ja-JP" altLang="en-US" smtClean="0"/>
-              <a:t>2020/7/9</a:t>
+              <a:t>2020/7/10</a:t>
             </a:fld>
             <a:endParaRPr kumimoji="1" lang="ja-JP" altLang="en-US"/>
           </a:p>
@@ -724,7 +729,7 @@
           <a:p>
             <a:fld id="{9DDD97A9-1B44-463F-8EAF-3A848A7F5CA1}" type="datetimeFigureOut">
               <a:rPr kumimoji="1" lang="ja-JP" altLang="en-US" smtClean="0"/>
-              <a:t>2020/7/9</a:t>
+              <a:t>2020/7/10</a:t>
             </a:fld>
             <a:endParaRPr kumimoji="1" lang="ja-JP" altLang="en-US"/>
           </a:p>
@@ -954,7 +959,7 @@
           <a:p>
             <a:fld id="{9DDD97A9-1B44-463F-8EAF-3A848A7F5CA1}" type="datetimeFigureOut">
               <a:rPr kumimoji="1" lang="ja-JP" altLang="en-US" smtClean="0"/>
-              <a:t>2020/7/9</a:t>
+              <a:t>2020/7/10</a:t>
             </a:fld>
             <a:endParaRPr kumimoji="1" lang="ja-JP" altLang="en-US"/>
           </a:p>
@@ -1229,7 +1234,7 @@
           <a:p>
             <a:fld id="{9DDD97A9-1B44-463F-8EAF-3A848A7F5CA1}" type="datetimeFigureOut">
               <a:rPr kumimoji="1" lang="ja-JP" altLang="en-US" smtClean="0"/>
-              <a:t>2020/7/9</a:t>
+              <a:t>2020/7/10</a:t>
             </a:fld>
             <a:endParaRPr kumimoji="1" lang="ja-JP" altLang="en-US"/>
           </a:p>
@@ -1558,7 +1563,7 @@
           <a:p>
             <a:fld id="{9DDD97A9-1B44-463F-8EAF-3A848A7F5CA1}" type="datetimeFigureOut">
               <a:rPr kumimoji="1" lang="ja-JP" altLang="en-US" smtClean="0"/>
-              <a:t>2020/7/9</a:t>
+              <a:t>2020/7/10</a:t>
             </a:fld>
             <a:endParaRPr kumimoji="1" lang="ja-JP" altLang="en-US"/>
           </a:p>
@@ -2034,7 +2039,7 @@
           <a:p>
             <a:fld id="{9DDD97A9-1B44-463F-8EAF-3A848A7F5CA1}" type="datetimeFigureOut">
               <a:rPr kumimoji="1" lang="ja-JP" altLang="en-US" smtClean="0"/>
-              <a:t>2020/7/9</a:t>
+              <a:t>2020/7/10</a:t>
             </a:fld>
             <a:endParaRPr kumimoji="1" lang="ja-JP" altLang="en-US"/>
           </a:p>
@@ -2175,7 +2180,7 @@
           <a:p>
             <a:fld id="{9DDD97A9-1B44-463F-8EAF-3A848A7F5CA1}" type="datetimeFigureOut">
               <a:rPr kumimoji="1" lang="ja-JP" altLang="en-US" smtClean="0"/>
-              <a:t>2020/7/9</a:t>
+              <a:t>2020/7/10</a:t>
             </a:fld>
             <a:endParaRPr kumimoji="1" lang="ja-JP" altLang="en-US"/>
           </a:p>
@@ -2288,7 +2293,7 @@
           <a:p>
             <a:fld id="{9DDD97A9-1B44-463F-8EAF-3A848A7F5CA1}" type="datetimeFigureOut">
               <a:rPr kumimoji="1" lang="ja-JP" altLang="en-US" smtClean="0"/>
-              <a:t>2020/7/9</a:t>
+              <a:t>2020/7/10</a:t>
             </a:fld>
             <a:endParaRPr kumimoji="1" lang="ja-JP" altLang="en-US"/>
           </a:p>
@@ -2631,7 +2636,7 @@
           <a:p>
             <a:fld id="{9DDD97A9-1B44-463F-8EAF-3A848A7F5CA1}" type="datetimeFigureOut">
               <a:rPr kumimoji="1" lang="ja-JP" altLang="en-US" smtClean="0"/>
-              <a:t>2020/7/9</a:t>
+              <a:t>2020/7/10</a:t>
             </a:fld>
             <a:endParaRPr kumimoji="1" lang="ja-JP" altLang="en-US"/>
           </a:p>
@@ -2919,7 +2924,7 @@
           <a:p>
             <a:fld id="{9DDD97A9-1B44-463F-8EAF-3A848A7F5CA1}" type="datetimeFigureOut">
               <a:rPr kumimoji="1" lang="ja-JP" altLang="en-US" smtClean="0"/>
-              <a:t>2020/7/9</a:t>
+              <a:t>2020/7/10</a:t>
             </a:fld>
             <a:endParaRPr kumimoji="1" lang="ja-JP" altLang="en-US"/>
           </a:p>
@@ -3192,7 +3197,7 @@
           <a:p>
             <a:fld id="{9DDD97A9-1B44-463F-8EAF-3A848A7F5CA1}" type="datetimeFigureOut">
               <a:rPr kumimoji="1" lang="ja-JP" altLang="en-US" smtClean="0"/>
-              <a:t>2020/7/9</a:t>
+              <a:t>2020/7/10</a:t>
             </a:fld>
             <a:endParaRPr kumimoji="1" lang="ja-JP" altLang="en-US"/>
           </a:p>
@@ -7109,8 +7114,8 @@
             </a:fontRef>
           </p:style>
         </p:cxnSp>
-        <mc:AlternateContent xmlns:mc="http://schemas.openxmlformats.org/markup-compatibility/2006">
-          <mc:Choice xmlns:a14="http://schemas.microsoft.com/office/drawing/2010/main" Requires="a14">
+        <mc:AlternateContent xmlns:mc="http://schemas.openxmlformats.org/markup-compatibility/2006" xmlns:a14="http://schemas.microsoft.com/office/drawing/2010/main">
+          <mc:Choice Requires="a14">
             <p:sp>
               <p:nvSpPr>
                 <p:cNvPr id="84" name="テキスト ボックス 83">
@@ -7160,7 +7165,7 @@
               </p:txBody>
             </p:sp>
           </mc:Choice>
-          <mc:Fallback>
+          <mc:Fallback xmlns="">
             <p:sp>
               <p:nvSpPr>
                 <p:cNvPr id="84" name="テキスト ボックス 83">
@@ -7220,7 +7225,7 @@
         </p:nvGrpSpPr>
         <p:grpSpPr>
           <a:xfrm flipH="1">
-            <a:off x="8310120" y="1685320"/>
+            <a:off x="7958935" y="1455996"/>
             <a:ext cx="932430" cy="953490"/>
             <a:chOff x="2940037" y="1782869"/>
             <a:chExt cx="932430" cy="953490"/>
@@ -7314,8 +7319,8 @@
             </a:fontRef>
           </p:style>
         </p:cxnSp>
-        <mc:AlternateContent xmlns:mc="http://schemas.openxmlformats.org/markup-compatibility/2006">
-          <mc:Choice xmlns:a14="http://schemas.microsoft.com/office/drawing/2010/main" Requires="a14">
+        <mc:AlternateContent xmlns:mc="http://schemas.openxmlformats.org/markup-compatibility/2006" xmlns:a14="http://schemas.microsoft.com/office/drawing/2010/main">
+          <mc:Choice Requires="a14">
             <p:sp>
               <p:nvSpPr>
                 <p:cNvPr id="89" name="テキスト ボックス 88">
@@ -7365,7 +7370,7 @@
               </p:txBody>
             </p:sp>
           </mc:Choice>
-          <mc:Fallback>
+          <mc:Fallback xmlns="">
             <p:sp>
               <p:nvSpPr>
                 <p:cNvPr id="89" name="テキスト ボックス 88">
@@ -7500,8 +7505,8 @@
           </a:p>
         </p:txBody>
       </p:sp>
-      <mc:AlternateContent xmlns:mc="http://schemas.openxmlformats.org/markup-compatibility/2006">
-        <mc:Choice xmlns:a14="http://schemas.microsoft.com/office/drawing/2010/main" Requires="a14">
+      <mc:AlternateContent xmlns:mc="http://schemas.openxmlformats.org/markup-compatibility/2006" xmlns:a14="http://schemas.microsoft.com/office/drawing/2010/main">
+        <mc:Choice Requires="a14">
           <p:sp>
             <p:nvSpPr>
               <p:cNvPr id="95" name="テキスト ボックス 94">
@@ -7570,7 +7575,7 @@
             </p:txBody>
           </p:sp>
         </mc:Choice>
-        <mc:Fallback>
+        <mc:Fallback xmlns="">
           <p:sp>
             <p:nvSpPr>
               <p:cNvPr id="95" name="テキスト ボックス 94">
@@ -7615,8 +7620,8 @@
           </p:sp>
         </mc:Fallback>
       </mc:AlternateContent>
-      <mc:AlternateContent xmlns:mc="http://schemas.openxmlformats.org/markup-compatibility/2006">
-        <mc:Choice xmlns:a14="http://schemas.microsoft.com/office/drawing/2010/main" Requires="a14">
+      <mc:AlternateContent xmlns:mc="http://schemas.openxmlformats.org/markup-compatibility/2006" xmlns:a14="http://schemas.microsoft.com/office/drawing/2010/main">
+        <mc:Choice Requires="a14">
           <p:sp>
             <p:nvSpPr>
               <p:cNvPr id="96" name="テキスト ボックス 95">
@@ -7685,7 +7690,7 @@
             </p:txBody>
           </p:sp>
         </mc:Choice>
-        <mc:Fallback>
+        <mc:Fallback xmlns="">
           <p:sp>
             <p:nvSpPr>
               <p:cNvPr id="96" name="テキスト ボックス 95">
@@ -7712,6 +7717,2475 @@
                 <a:blip r:embed="rId5"/>
                 <a:stretch>
                   <a:fillRect/>
+                </a:stretch>
+              </a:blipFill>
+            </p:spPr>
+            <p:txBody>
+              <a:bodyPr/>
+              <a:lstStyle/>
+              <a:p>
+                <a:r>
+                  <a:rPr lang="ja-JP" altLang="en-US">
+                    <a:noFill/>
+                  </a:rPr>
+                  <a:t> </a:t>
+                </a:r>
+              </a:p>
+            </p:txBody>
+          </p:sp>
+        </mc:Fallback>
+      </mc:AlternateContent>
+      <mc:AlternateContent xmlns:mc="http://schemas.openxmlformats.org/markup-compatibility/2006">
+        <mc:Choice xmlns:a14="http://schemas.microsoft.com/office/drawing/2010/main" Requires="a14">
+          <p:sp>
+            <p:nvSpPr>
+              <p:cNvPr id="79" name="テキスト ボックス 78">
+                <a:extLst>
+                  <a:ext uri="{FF2B5EF4-FFF2-40B4-BE49-F238E27FC236}">
+                    <a16:creationId xmlns:a16="http://schemas.microsoft.com/office/drawing/2014/main" id="{51507211-2DAD-4423-9999-ECA913BE9934}"/>
+                  </a:ext>
+                </a:extLst>
+              </p:cNvPr>
+              <p:cNvSpPr txBox="1"/>
+              <p:nvPr/>
+            </p:nvSpPr>
+            <p:spPr>
+              <a:xfrm>
+                <a:off x="8638299" y="1297171"/>
+                <a:ext cx="380810" cy="369332"/>
+              </a:xfrm>
+              <a:prstGeom prst="rect">
+                <a:avLst/>
+              </a:prstGeom>
+              <a:noFill/>
+            </p:spPr>
+            <p:txBody>
+              <a:bodyPr wrap="none" rtlCol="0">
+                <a:spAutoFit/>
+              </a:bodyPr>
+              <a:lstStyle/>
+              <a:p>
+                <a:pPr algn="ctr"/>
+                <a14:m>
+                  <m:oMathPara xmlns:m="http://schemas.openxmlformats.org/officeDocument/2006/math">
+                    <m:oMathParaPr>
+                      <m:jc m:val="centerGroup"/>
+                    </m:oMathParaPr>
+                    <m:oMath xmlns:m="http://schemas.openxmlformats.org/officeDocument/2006/math">
+                      <m:r>
+                        <a:rPr kumimoji="1" lang="en-US" altLang="ja-JP" b="0" i="1" smtClean="0">
+                          <a:latin typeface="Cambria Math" panose="02040503050406030204" pitchFamily="18" charset="0"/>
+                        </a:rPr>
+                        <m:t>𝑥</m:t>
+                      </m:r>
+                    </m:oMath>
+                  </m:oMathPara>
+                </a14:m>
+                <a:endParaRPr kumimoji="1" lang="ja-JP" altLang="en-US" dirty="0"/>
+              </a:p>
+            </p:txBody>
+          </p:sp>
+        </mc:Choice>
+        <mc:Fallback>
+          <p:sp>
+            <p:nvSpPr>
+              <p:cNvPr id="79" name="テキスト ボックス 78">
+                <a:extLst>
+                  <a:ext uri="{FF2B5EF4-FFF2-40B4-BE49-F238E27FC236}">
+                    <a16:creationId xmlns:a16="http://schemas.microsoft.com/office/drawing/2014/main" id="{51507211-2DAD-4423-9999-ECA913BE9934}"/>
+                  </a:ext>
+                </a:extLst>
+              </p:cNvPr>
+              <p:cNvSpPr txBox="1">
+                <a:spLocks noRot="1" noChangeAspect="1" noMove="1" noResize="1" noEditPoints="1" noAdjustHandles="1" noChangeArrowheads="1" noChangeShapeType="1" noTextEdit="1"/>
+              </p:cNvSpPr>
+              <p:nvPr/>
+            </p:nvSpPr>
+            <p:spPr>
+              <a:xfrm>
+                <a:off x="8638299" y="1297171"/>
+                <a:ext cx="380810" cy="369332"/>
+              </a:xfrm>
+              <a:prstGeom prst="rect">
+                <a:avLst/>
+              </a:prstGeom>
+              <a:blipFill>
+                <a:blip r:embed="rId6"/>
+                <a:stretch>
+                  <a:fillRect/>
+                </a:stretch>
+              </a:blipFill>
+            </p:spPr>
+            <p:txBody>
+              <a:bodyPr/>
+              <a:lstStyle/>
+              <a:p>
+                <a:r>
+                  <a:rPr lang="ja-JP" altLang="en-US">
+                    <a:noFill/>
+                  </a:rPr>
+                  <a:t> </a:t>
+                </a:r>
+              </a:p>
+            </p:txBody>
+          </p:sp>
+        </mc:Fallback>
+      </mc:AlternateContent>
+      <mc:AlternateContent xmlns:mc="http://schemas.openxmlformats.org/markup-compatibility/2006">
+        <mc:Choice xmlns:a14="http://schemas.microsoft.com/office/drawing/2010/main" Requires="a14">
+          <p:sp>
+            <p:nvSpPr>
+              <p:cNvPr id="82" name="テキスト ボックス 81">
+                <a:extLst>
+                  <a:ext uri="{FF2B5EF4-FFF2-40B4-BE49-F238E27FC236}">
+                    <a16:creationId xmlns:a16="http://schemas.microsoft.com/office/drawing/2014/main" id="{CDFE8E75-741C-4266-8A11-B3039615CAB5}"/>
+                  </a:ext>
+                </a:extLst>
+              </p:cNvPr>
+              <p:cNvSpPr txBox="1"/>
+              <p:nvPr/>
+            </p:nvSpPr>
+            <p:spPr>
+              <a:xfrm>
+                <a:off x="7806535" y="2114045"/>
+                <a:ext cx="384208" cy="369332"/>
+              </a:xfrm>
+              <a:prstGeom prst="rect">
+                <a:avLst/>
+              </a:prstGeom>
+              <a:noFill/>
+            </p:spPr>
+            <p:txBody>
+              <a:bodyPr wrap="none" rtlCol="0">
+                <a:spAutoFit/>
+              </a:bodyPr>
+              <a:lstStyle/>
+              <a:p>
+                <a:pPr algn="ctr"/>
+                <a14:m>
+                  <m:oMathPara xmlns:m="http://schemas.openxmlformats.org/officeDocument/2006/math">
+                    <m:oMathParaPr>
+                      <m:jc m:val="centerGroup"/>
+                    </m:oMathParaPr>
+                    <m:oMath xmlns:m="http://schemas.openxmlformats.org/officeDocument/2006/math">
+                      <m:r>
+                        <a:rPr kumimoji="1" lang="en-US" altLang="ja-JP" b="0" i="1" smtClean="0">
+                          <a:latin typeface="Cambria Math" panose="02040503050406030204" pitchFamily="18" charset="0"/>
+                        </a:rPr>
+                        <m:t>𝑦</m:t>
+                      </m:r>
+                    </m:oMath>
+                  </m:oMathPara>
+                </a14:m>
+                <a:endParaRPr kumimoji="1" lang="ja-JP" altLang="en-US" dirty="0"/>
+              </a:p>
+            </p:txBody>
+          </p:sp>
+        </mc:Choice>
+        <mc:Fallback>
+          <p:sp>
+            <p:nvSpPr>
+              <p:cNvPr id="82" name="テキスト ボックス 81">
+                <a:extLst>
+                  <a:ext uri="{FF2B5EF4-FFF2-40B4-BE49-F238E27FC236}">
+                    <a16:creationId xmlns:a16="http://schemas.microsoft.com/office/drawing/2014/main" id="{CDFE8E75-741C-4266-8A11-B3039615CAB5}"/>
+                  </a:ext>
+                </a:extLst>
+              </p:cNvPr>
+              <p:cNvSpPr txBox="1">
+                <a:spLocks noRot="1" noChangeAspect="1" noMove="1" noResize="1" noEditPoints="1" noAdjustHandles="1" noChangeArrowheads="1" noChangeShapeType="1" noTextEdit="1"/>
+              </p:cNvSpPr>
+              <p:nvPr/>
+            </p:nvSpPr>
+            <p:spPr>
+              <a:xfrm>
+                <a:off x="7806535" y="2114045"/>
+                <a:ext cx="384208" cy="369332"/>
+              </a:xfrm>
+              <a:prstGeom prst="rect">
+                <a:avLst/>
+              </a:prstGeom>
+              <a:blipFill>
+                <a:blip r:embed="rId7"/>
+                <a:stretch>
+                  <a:fillRect b="-6667"/>
+                </a:stretch>
+              </a:blipFill>
+            </p:spPr>
+            <p:txBody>
+              <a:bodyPr/>
+              <a:lstStyle/>
+              <a:p>
+                <a:r>
+                  <a:rPr lang="ja-JP" altLang="en-US">
+                    <a:noFill/>
+                  </a:rPr>
+                  <a:t> </a:t>
+                </a:r>
+              </a:p>
+            </p:txBody>
+          </p:sp>
+        </mc:Fallback>
+      </mc:AlternateContent>
+      <p:grpSp>
+        <p:nvGrpSpPr>
+          <p:cNvPr id="97" name="グループ化 96">
+            <a:extLst>
+              <a:ext uri="{FF2B5EF4-FFF2-40B4-BE49-F238E27FC236}">
+                <a16:creationId xmlns:a16="http://schemas.microsoft.com/office/drawing/2014/main" id="{C05ECBCC-28F3-46D7-8906-FF8826D0717A}"/>
+              </a:ext>
+            </a:extLst>
+          </p:cNvPr>
+          <p:cNvGrpSpPr/>
+          <p:nvPr/>
+        </p:nvGrpSpPr>
+        <p:grpSpPr>
+          <a:xfrm rot="10800000" flipH="1">
+            <a:off x="10467099" y="1578696"/>
+            <a:ext cx="783825" cy="753414"/>
+            <a:chOff x="3088642" y="1782869"/>
+            <a:chExt cx="783825" cy="753414"/>
+          </a:xfrm>
+        </p:grpSpPr>
+        <p:cxnSp>
+          <p:nvCxnSpPr>
+            <p:cNvPr id="98" name="直線矢印コネクタ 97">
+              <a:extLst>
+                <a:ext uri="{FF2B5EF4-FFF2-40B4-BE49-F238E27FC236}">
+                  <a16:creationId xmlns:a16="http://schemas.microsoft.com/office/drawing/2014/main" id="{37E85AC2-FF18-4D78-9E23-C0A1A0E0C44A}"/>
+                </a:ext>
+              </a:extLst>
+            </p:cNvPr>
+            <p:cNvCxnSpPr>
+              <a:cxnSpLocks/>
+            </p:cNvCxnSpPr>
+            <p:nvPr/>
+          </p:nvCxnSpPr>
+          <p:spPr>
+            <a:xfrm>
+              <a:off x="3182747" y="2485748"/>
+              <a:ext cx="689720" cy="0"/>
+            </a:xfrm>
+            <a:prstGeom prst="straightConnector1">
+              <a:avLst/>
+            </a:prstGeom>
+            <a:ln w="12700">
+              <a:solidFill>
+                <a:schemeClr val="tx1"/>
+              </a:solidFill>
+              <a:tailEnd type="triangle"/>
+            </a:ln>
+          </p:spPr>
+          <p:style>
+            <a:lnRef idx="1">
+              <a:schemeClr val="accent1"/>
+            </a:lnRef>
+            <a:fillRef idx="0">
+              <a:schemeClr val="accent1"/>
+            </a:fillRef>
+            <a:effectRef idx="0">
+              <a:schemeClr val="accent1"/>
+            </a:effectRef>
+            <a:fontRef idx="minor">
+              <a:schemeClr val="tx1"/>
+            </a:fontRef>
+          </p:style>
+        </p:cxnSp>
+        <p:cxnSp>
+          <p:nvCxnSpPr>
+            <p:cNvPr id="99" name="直線矢印コネクタ 98">
+              <a:extLst>
+                <a:ext uri="{FF2B5EF4-FFF2-40B4-BE49-F238E27FC236}">
+                  <a16:creationId xmlns:a16="http://schemas.microsoft.com/office/drawing/2014/main" id="{98703172-E10B-4A02-BEC6-6F6B039072F0}"/>
+                </a:ext>
+              </a:extLst>
+            </p:cNvPr>
+            <p:cNvCxnSpPr>
+              <a:cxnSpLocks/>
+            </p:cNvCxnSpPr>
+            <p:nvPr/>
+          </p:nvCxnSpPr>
+          <p:spPr>
+            <a:xfrm flipV="1">
+              <a:off x="3193103" y="1782869"/>
+              <a:ext cx="0" cy="713237"/>
+            </a:xfrm>
+            <a:prstGeom prst="straightConnector1">
+              <a:avLst/>
+            </a:prstGeom>
+            <a:ln w="12700">
+              <a:solidFill>
+                <a:schemeClr val="tx1"/>
+              </a:solidFill>
+              <a:tailEnd type="triangle"/>
+            </a:ln>
+          </p:spPr>
+          <p:style>
+            <a:lnRef idx="1">
+              <a:schemeClr val="accent1"/>
+            </a:lnRef>
+            <a:fillRef idx="0">
+              <a:schemeClr val="accent1"/>
+            </a:fillRef>
+            <a:effectRef idx="0">
+              <a:schemeClr val="accent1"/>
+            </a:effectRef>
+            <a:fontRef idx="minor">
+              <a:schemeClr val="tx1"/>
+            </a:fontRef>
+          </p:style>
+        </p:cxnSp>
+        <mc:AlternateContent xmlns:mc="http://schemas.openxmlformats.org/markup-compatibility/2006">
+          <mc:Choice xmlns:a14="http://schemas.microsoft.com/office/drawing/2010/main" Requires="a14">
+            <p:sp>
+              <p:nvSpPr>
+                <p:cNvPr id="100" name="テキスト ボックス 99">
+                  <a:extLst>
+                    <a:ext uri="{FF2B5EF4-FFF2-40B4-BE49-F238E27FC236}">
+                      <a16:creationId xmlns:a16="http://schemas.microsoft.com/office/drawing/2014/main" id="{CD2B2FFD-D1C6-4652-8432-09E0825EA770}"/>
+                    </a:ext>
+                  </a:extLst>
+                </p:cNvPr>
+                <p:cNvSpPr txBox="1"/>
+                <p:nvPr/>
+              </p:nvSpPr>
+              <p:spPr>
+                <a:xfrm>
+                  <a:off x="3088642" y="2166951"/>
+                  <a:ext cx="378885" cy="369332"/>
+                </a:xfrm>
+                <a:prstGeom prst="rect">
+                  <a:avLst/>
+                </a:prstGeom>
+                <a:noFill/>
+              </p:spPr>
+              <p:txBody>
+                <a:bodyPr wrap="none" rtlCol="0">
+                  <a:spAutoFit/>
+                </a:bodyPr>
+                <a:lstStyle/>
+                <a:p>
+                  <a:pPr algn="ctr"/>
+                  <a14:m>
+                    <m:oMathPara xmlns:m="http://schemas.openxmlformats.org/officeDocument/2006/math">
+                      <m:oMathParaPr>
+                        <m:jc m:val="centerGroup"/>
+                      </m:oMathParaPr>
+                      <m:oMath xmlns:m="http://schemas.openxmlformats.org/officeDocument/2006/math">
+                        <m:r>
+                          <a:rPr kumimoji="1" lang="en-US" altLang="ja-JP" b="0" i="1" smtClean="0">
+                            <a:latin typeface="Cambria Math" panose="02040503050406030204" pitchFamily="18" charset="0"/>
+                          </a:rPr>
+                          <m:t>𝑜</m:t>
+                        </m:r>
+                      </m:oMath>
+                    </m:oMathPara>
+                  </a14:m>
+                  <a:endParaRPr kumimoji="1" lang="ja-JP" altLang="en-US" dirty="0"/>
+                </a:p>
+              </p:txBody>
+            </p:sp>
+          </mc:Choice>
+          <mc:Fallback>
+            <p:sp>
+              <p:nvSpPr>
+                <p:cNvPr id="100" name="テキスト ボックス 99">
+                  <a:extLst>
+                    <a:ext uri="{FF2B5EF4-FFF2-40B4-BE49-F238E27FC236}">
+                      <a16:creationId xmlns:a16="http://schemas.microsoft.com/office/drawing/2014/main" id="{CD2B2FFD-D1C6-4652-8432-09E0825EA770}"/>
+                    </a:ext>
+                  </a:extLst>
+                </p:cNvPr>
+                <p:cNvSpPr txBox="1">
+                  <a:spLocks noRot="1" noChangeAspect="1" noMove="1" noResize="1" noEditPoints="1" noAdjustHandles="1" noChangeArrowheads="1" noChangeShapeType="1" noTextEdit="1"/>
+                </p:cNvSpPr>
+                <p:nvPr/>
+              </p:nvSpPr>
+              <p:spPr>
+                <a:xfrm>
+                  <a:off x="3088642" y="2166951"/>
+                  <a:ext cx="378885" cy="369332"/>
+                </a:xfrm>
+                <a:prstGeom prst="rect">
+                  <a:avLst/>
+                </a:prstGeom>
+                <a:blipFill>
+                  <a:blip r:embed="rId8"/>
+                  <a:stretch>
+                    <a:fillRect/>
+                  </a:stretch>
+                </a:blipFill>
+              </p:spPr>
+              <p:txBody>
+                <a:bodyPr/>
+                <a:lstStyle/>
+                <a:p>
+                  <a:r>
+                    <a:rPr lang="ja-JP" altLang="en-US">
+                      <a:noFill/>
+                    </a:rPr>
+                    <a:t> </a:t>
+                  </a:r>
+                </a:p>
+              </p:txBody>
+            </p:sp>
+          </mc:Fallback>
+        </mc:AlternateContent>
+      </p:grpSp>
+      <mc:AlternateContent xmlns:mc="http://schemas.openxmlformats.org/markup-compatibility/2006">
+        <mc:Choice xmlns:a14="http://schemas.microsoft.com/office/drawing/2010/main" Requires="a14">
+          <p:sp>
+            <p:nvSpPr>
+              <p:cNvPr id="83" name="テキスト ボックス 82">
+                <a:extLst>
+                  <a:ext uri="{FF2B5EF4-FFF2-40B4-BE49-F238E27FC236}">
+                    <a16:creationId xmlns:a16="http://schemas.microsoft.com/office/drawing/2014/main" id="{9E975E29-703F-442F-83A2-F761CBD62743}"/>
+                  </a:ext>
+                </a:extLst>
+              </p:cNvPr>
+              <p:cNvSpPr txBox="1"/>
+              <p:nvPr/>
+            </p:nvSpPr>
+            <p:spPr>
+              <a:xfrm>
+                <a:off x="10280548" y="2098648"/>
+                <a:ext cx="380810" cy="369332"/>
+              </a:xfrm>
+              <a:prstGeom prst="rect">
+                <a:avLst/>
+              </a:prstGeom>
+              <a:noFill/>
+            </p:spPr>
+            <p:txBody>
+              <a:bodyPr wrap="none" rtlCol="0">
+                <a:spAutoFit/>
+              </a:bodyPr>
+              <a:lstStyle/>
+              <a:p>
+                <a:pPr algn="ctr"/>
+                <a14:m>
+                  <m:oMathPara xmlns:m="http://schemas.openxmlformats.org/officeDocument/2006/math">
+                    <m:oMathParaPr>
+                      <m:jc m:val="centerGroup"/>
+                    </m:oMathParaPr>
+                    <m:oMath xmlns:m="http://schemas.openxmlformats.org/officeDocument/2006/math">
+                      <m:r>
+                        <a:rPr kumimoji="1" lang="en-US" altLang="ja-JP" b="0" i="1" smtClean="0">
+                          <a:latin typeface="Cambria Math" panose="02040503050406030204" pitchFamily="18" charset="0"/>
+                        </a:rPr>
+                        <m:t>𝑥</m:t>
+                      </m:r>
+                    </m:oMath>
+                  </m:oMathPara>
+                </a14:m>
+                <a:endParaRPr kumimoji="1" lang="ja-JP" altLang="en-US" dirty="0"/>
+              </a:p>
+            </p:txBody>
+          </p:sp>
+        </mc:Choice>
+        <mc:Fallback>
+          <p:sp>
+            <p:nvSpPr>
+              <p:cNvPr id="83" name="テキスト ボックス 82">
+                <a:extLst>
+                  <a:ext uri="{FF2B5EF4-FFF2-40B4-BE49-F238E27FC236}">
+                    <a16:creationId xmlns:a16="http://schemas.microsoft.com/office/drawing/2014/main" id="{9E975E29-703F-442F-83A2-F761CBD62743}"/>
+                  </a:ext>
+                </a:extLst>
+              </p:cNvPr>
+              <p:cNvSpPr txBox="1">
+                <a:spLocks noRot="1" noChangeAspect="1" noMove="1" noResize="1" noEditPoints="1" noAdjustHandles="1" noChangeArrowheads="1" noChangeShapeType="1" noTextEdit="1"/>
+              </p:cNvSpPr>
+              <p:nvPr/>
+            </p:nvSpPr>
+            <p:spPr>
+              <a:xfrm>
+                <a:off x="10280548" y="2098648"/>
+                <a:ext cx="380810" cy="369332"/>
+              </a:xfrm>
+              <a:prstGeom prst="rect">
+                <a:avLst/>
+              </a:prstGeom>
+              <a:blipFill>
+                <a:blip r:embed="rId9"/>
+                <a:stretch>
+                  <a:fillRect/>
+                </a:stretch>
+              </a:blipFill>
+            </p:spPr>
+            <p:txBody>
+              <a:bodyPr/>
+              <a:lstStyle/>
+              <a:p>
+                <a:r>
+                  <a:rPr lang="ja-JP" altLang="en-US">
+                    <a:noFill/>
+                  </a:rPr>
+                  <a:t> </a:t>
+                </a:r>
+              </a:p>
+            </p:txBody>
+          </p:sp>
+        </mc:Fallback>
+      </mc:AlternateContent>
+      <mc:AlternateContent xmlns:mc="http://schemas.openxmlformats.org/markup-compatibility/2006">
+        <mc:Choice xmlns:a14="http://schemas.microsoft.com/office/drawing/2010/main" Requires="a14">
+          <p:sp>
+            <p:nvSpPr>
+              <p:cNvPr id="90" name="テキスト ボックス 89">
+                <a:extLst>
+                  <a:ext uri="{FF2B5EF4-FFF2-40B4-BE49-F238E27FC236}">
+                    <a16:creationId xmlns:a16="http://schemas.microsoft.com/office/drawing/2014/main" id="{2A81CC6D-0A64-41A9-A895-278AF2A8E6E2}"/>
+                  </a:ext>
+                </a:extLst>
+              </p:cNvPr>
+              <p:cNvSpPr txBox="1"/>
+              <p:nvPr/>
+            </p:nvSpPr>
+            <p:spPr>
+              <a:xfrm>
+                <a:off x="11069176" y="1266265"/>
+                <a:ext cx="384208" cy="369332"/>
+              </a:xfrm>
+              <a:prstGeom prst="rect">
+                <a:avLst/>
+              </a:prstGeom>
+              <a:noFill/>
+            </p:spPr>
+            <p:txBody>
+              <a:bodyPr wrap="none" rtlCol="0">
+                <a:spAutoFit/>
+              </a:bodyPr>
+              <a:lstStyle/>
+              <a:p>
+                <a:pPr algn="ctr"/>
+                <a14:m>
+                  <m:oMathPara xmlns:m="http://schemas.openxmlformats.org/officeDocument/2006/math">
+                    <m:oMathParaPr>
+                      <m:jc m:val="centerGroup"/>
+                    </m:oMathParaPr>
+                    <m:oMath xmlns:m="http://schemas.openxmlformats.org/officeDocument/2006/math">
+                      <m:r>
+                        <a:rPr kumimoji="1" lang="en-US" altLang="ja-JP" b="0" i="1" smtClean="0">
+                          <a:latin typeface="Cambria Math" panose="02040503050406030204" pitchFamily="18" charset="0"/>
+                        </a:rPr>
+                        <m:t>𝑦</m:t>
+                      </m:r>
+                    </m:oMath>
+                  </m:oMathPara>
+                </a14:m>
+                <a:endParaRPr kumimoji="1" lang="ja-JP" altLang="en-US" dirty="0"/>
+              </a:p>
+            </p:txBody>
+          </p:sp>
+        </mc:Choice>
+        <mc:Fallback>
+          <p:sp>
+            <p:nvSpPr>
+              <p:cNvPr id="90" name="テキスト ボックス 89">
+                <a:extLst>
+                  <a:ext uri="{FF2B5EF4-FFF2-40B4-BE49-F238E27FC236}">
+                    <a16:creationId xmlns:a16="http://schemas.microsoft.com/office/drawing/2014/main" id="{2A81CC6D-0A64-41A9-A895-278AF2A8E6E2}"/>
+                  </a:ext>
+                </a:extLst>
+              </p:cNvPr>
+              <p:cNvSpPr txBox="1">
+                <a:spLocks noRot="1" noChangeAspect="1" noMove="1" noResize="1" noEditPoints="1" noAdjustHandles="1" noChangeArrowheads="1" noChangeShapeType="1" noTextEdit="1"/>
+              </p:cNvSpPr>
+              <p:nvPr/>
+            </p:nvSpPr>
+            <p:spPr>
+              <a:xfrm>
+                <a:off x="11069176" y="1266265"/>
+                <a:ext cx="384208" cy="369332"/>
+              </a:xfrm>
+              <a:prstGeom prst="rect">
+                <a:avLst/>
+              </a:prstGeom>
+              <a:blipFill>
+                <a:blip r:embed="rId10"/>
+                <a:stretch>
+                  <a:fillRect b="-6667"/>
+                </a:stretch>
+              </a:blipFill>
+            </p:spPr>
+            <p:txBody>
+              <a:bodyPr/>
+              <a:lstStyle/>
+              <a:p>
+                <a:r>
+                  <a:rPr lang="ja-JP" altLang="en-US">
+                    <a:noFill/>
+                  </a:rPr>
+                  <a:t> </a:t>
+                </a:r>
+              </a:p>
+            </p:txBody>
+          </p:sp>
+        </mc:Fallback>
+      </mc:AlternateContent>
+      <p:cxnSp>
+        <p:nvCxnSpPr>
+          <p:cNvPr id="103" name="直線矢印コネクタ 102">
+            <a:extLst>
+              <a:ext uri="{FF2B5EF4-FFF2-40B4-BE49-F238E27FC236}">
+                <a16:creationId xmlns:a16="http://schemas.microsoft.com/office/drawing/2014/main" id="{C552D547-3E82-4CEB-8FC0-88B7E9F8E3D7}"/>
+              </a:ext>
+            </a:extLst>
+          </p:cNvPr>
+          <p:cNvCxnSpPr>
+            <a:cxnSpLocks/>
+          </p:cNvCxnSpPr>
+          <p:nvPr/>
+        </p:nvCxnSpPr>
+        <p:spPr>
+          <a:xfrm flipH="1" flipV="1">
+            <a:off x="9834876" y="797614"/>
+            <a:ext cx="732889" cy="825472"/>
+          </a:xfrm>
+          <a:prstGeom prst="straightConnector1">
+            <a:avLst/>
+          </a:prstGeom>
+          <a:ln>
+            <a:tailEnd type="triangle"/>
+          </a:ln>
+        </p:spPr>
+        <p:style>
+          <a:lnRef idx="1">
+            <a:schemeClr val="accent1"/>
+          </a:lnRef>
+          <a:fillRef idx="0">
+            <a:schemeClr val="accent1"/>
+          </a:fillRef>
+          <a:effectRef idx="0">
+            <a:schemeClr val="accent1"/>
+          </a:effectRef>
+          <a:fontRef idx="minor">
+            <a:schemeClr val="tx1"/>
+          </a:fontRef>
+        </p:style>
+      </p:cxnSp>
+      <mc:AlternateContent xmlns:mc="http://schemas.openxmlformats.org/markup-compatibility/2006">
+        <mc:Choice xmlns:a14="http://schemas.microsoft.com/office/drawing/2010/main" Requires="a14">
+          <p:sp>
+            <p:nvSpPr>
+              <p:cNvPr id="107" name="テキスト ボックス 106">
+                <a:extLst>
+                  <a:ext uri="{FF2B5EF4-FFF2-40B4-BE49-F238E27FC236}">
+                    <a16:creationId xmlns:a16="http://schemas.microsoft.com/office/drawing/2014/main" id="{D6DB0164-25AD-4C51-AA58-D9EB2B53E08E}"/>
+                  </a:ext>
+                </a:extLst>
+              </p:cNvPr>
+              <p:cNvSpPr txBox="1"/>
+              <p:nvPr/>
+            </p:nvSpPr>
+            <p:spPr>
+              <a:xfrm>
+                <a:off x="9602044" y="759420"/>
+                <a:ext cx="458074" cy="369332"/>
+              </a:xfrm>
+              <a:prstGeom prst="rect">
+                <a:avLst/>
+              </a:prstGeom>
+              <a:noFill/>
+            </p:spPr>
+            <p:txBody>
+              <a:bodyPr wrap="none" rtlCol="0">
+                <a:spAutoFit/>
+              </a:bodyPr>
+              <a:lstStyle/>
+              <a:p>
+                <a:pPr algn="ctr"/>
+                <a14:m>
+                  <m:oMathPara xmlns:m="http://schemas.openxmlformats.org/officeDocument/2006/math">
+                    <m:oMathParaPr>
+                      <m:jc m:val="centerGroup"/>
+                    </m:oMathParaPr>
+                    <m:oMath xmlns:m="http://schemas.openxmlformats.org/officeDocument/2006/math">
+                      <m:sSub>
+                        <m:sSubPr>
+                          <m:ctrlPr>
+                            <a:rPr kumimoji="1" lang="en-US" altLang="ja-JP" i="1" smtClean="0">
+                              <a:latin typeface="Cambria Math" panose="02040503050406030204" pitchFamily="18" charset="0"/>
+                            </a:rPr>
+                          </m:ctrlPr>
+                        </m:sSubPr>
+                        <m:e>
+                          <m:r>
+                            <a:rPr kumimoji="1" lang="en-US" altLang="ja-JP" b="0" i="1" smtClean="0">
+                              <a:latin typeface="Cambria Math" panose="02040503050406030204" pitchFamily="18" charset="0"/>
+                            </a:rPr>
+                            <m:t>𝑑</m:t>
+                          </m:r>
+                        </m:e>
+                        <m:sub>
+                          <m:r>
+                            <a:rPr kumimoji="1" lang="en-US" altLang="ja-JP" b="0" i="1" smtClean="0">
+                              <a:latin typeface="Cambria Math" panose="02040503050406030204" pitchFamily="18" charset="0"/>
+                            </a:rPr>
+                            <m:t>𝑖</m:t>
+                          </m:r>
+                        </m:sub>
+                      </m:sSub>
+                    </m:oMath>
+                  </m:oMathPara>
+                </a14:m>
+                <a:endParaRPr kumimoji="1" lang="ja-JP" altLang="en-US" dirty="0"/>
+              </a:p>
+            </p:txBody>
+          </p:sp>
+        </mc:Choice>
+        <mc:Fallback>
+          <p:sp>
+            <p:nvSpPr>
+              <p:cNvPr id="107" name="テキスト ボックス 106">
+                <a:extLst>
+                  <a:ext uri="{FF2B5EF4-FFF2-40B4-BE49-F238E27FC236}">
+                    <a16:creationId xmlns:a16="http://schemas.microsoft.com/office/drawing/2014/main" id="{D6DB0164-25AD-4C51-AA58-D9EB2B53E08E}"/>
+                  </a:ext>
+                </a:extLst>
+              </p:cNvPr>
+              <p:cNvSpPr txBox="1">
+                <a:spLocks noRot="1" noChangeAspect="1" noMove="1" noResize="1" noEditPoints="1" noAdjustHandles="1" noChangeArrowheads="1" noChangeShapeType="1" noTextEdit="1"/>
+              </p:cNvSpPr>
+              <p:nvPr/>
+            </p:nvSpPr>
+            <p:spPr>
+              <a:xfrm>
+                <a:off x="9602044" y="759420"/>
+                <a:ext cx="458074" cy="369332"/>
+              </a:xfrm>
+              <a:prstGeom prst="rect">
+                <a:avLst/>
+              </a:prstGeom>
+              <a:blipFill>
+                <a:blip r:embed="rId11"/>
+                <a:stretch>
+                  <a:fillRect b="-1667"/>
+                </a:stretch>
+              </a:blipFill>
+            </p:spPr>
+            <p:txBody>
+              <a:bodyPr/>
+              <a:lstStyle/>
+              <a:p>
+                <a:r>
+                  <a:rPr lang="ja-JP" altLang="en-US">
+                    <a:noFill/>
+                  </a:rPr>
+                  <a:t> </a:t>
+                </a:r>
+              </a:p>
+            </p:txBody>
+          </p:sp>
+        </mc:Fallback>
+      </mc:AlternateContent>
+      <p:sp>
+        <p:nvSpPr>
+          <p:cNvPr id="109" name="円弧 108">
+            <a:extLst>
+              <a:ext uri="{FF2B5EF4-FFF2-40B4-BE49-F238E27FC236}">
+                <a16:creationId xmlns:a16="http://schemas.microsoft.com/office/drawing/2014/main" id="{86264E34-7548-4781-83BA-BF2619DA2C07}"/>
+              </a:ext>
+            </a:extLst>
+          </p:cNvPr>
+          <p:cNvSpPr/>
+          <p:nvPr/>
+        </p:nvSpPr>
+        <p:spPr>
+          <a:xfrm rot="10800000">
+            <a:off x="10360449" y="1452905"/>
+            <a:ext cx="417096" cy="369331"/>
+          </a:xfrm>
+          <a:prstGeom prst="arc">
+            <a:avLst>
+              <a:gd name="adj1" fmla="val 16200000"/>
+              <a:gd name="adj2" fmla="val 2926224"/>
+            </a:avLst>
+          </a:prstGeom>
+        </p:spPr>
+        <p:style>
+          <a:lnRef idx="1">
+            <a:schemeClr val="accent1"/>
+          </a:lnRef>
+          <a:fillRef idx="0">
+            <a:schemeClr val="accent1"/>
+          </a:fillRef>
+          <a:effectRef idx="0">
+            <a:schemeClr val="accent1"/>
+          </a:effectRef>
+          <a:fontRef idx="minor">
+            <a:schemeClr val="tx1"/>
+          </a:fontRef>
+        </p:style>
+        <p:txBody>
+          <a:bodyPr rtlCol="0" anchor="ctr"/>
+          <a:lstStyle/>
+          <a:p>
+            <a:pPr algn="ctr"/>
+            <a:endParaRPr kumimoji="1" lang="ja-JP" altLang="en-US"/>
+          </a:p>
+        </p:txBody>
+      </p:sp>
+      <mc:AlternateContent xmlns:mc="http://schemas.openxmlformats.org/markup-compatibility/2006">
+        <mc:Choice xmlns:a14="http://schemas.microsoft.com/office/drawing/2010/main" Requires="a14">
+          <p:sp>
+            <p:nvSpPr>
+              <p:cNvPr id="111" name="テキスト ボックス 110">
+                <a:extLst>
+                  <a:ext uri="{FF2B5EF4-FFF2-40B4-BE49-F238E27FC236}">
+                    <a16:creationId xmlns:a16="http://schemas.microsoft.com/office/drawing/2014/main" id="{644624F7-2342-4DC4-A556-B9246A3E70AE}"/>
+                  </a:ext>
+                </a:extLst>
+              </p:cNvPr>
+              <p:cNvSpPr txBox="1"/>
+              <p:nvPr/>
+            </p:nvSpPr>
+            <p:spPr>
+              <a:xfrm>
+                <a:off x="10056077" y="1539306"/>
+                <a:ext cx="482120" cy="369332"/>
+              </a:xfrm>
+              <a:prstGeom prst="rect">
+                <a:avLst/>
+              </a:prstGeom>
+              <a:noFill/>
+            </p:spPr>
+            <p:txBody>
+              <a:bodyPr wrap="none" rtlCol="0">
+                <a:spAutoFit/>
+              </a:bodyPr>
+              <a:lstStyle/>
+              <a:p>
+                <a:pPr algn="ctr"/>
+                <a14:m>
+                  <m:oMathPara xmlns:m="http://schemas.openxmlformats.org/officeDocument/2006/math">
+                    <m:oMathParaPr>
+                      <m:jc m:val="centerGroup"/>
+                    </m:oMathParaPr>
+                    <m:oMath xmlns:m="http://schemas.openxmlformats.org/officeDocument/2006/math">
+                      <m:sSub>
+                        <m:sSubPr>
+                          <m:ctrlPr>
+                            <a:rPr kumimoji="1" lang="en-US" altLang="ja-JP" i="1" smtClean="0">
+                              <a:latin typeface="Cambria Math" panose="02040503050406030204" pitchFamily="18" charset="0"/>
+                            </a:rPr>
+                          </m:ctrlPr>
+                        </m:sSubPr>
+                        <m:e>
+                          <m:r>
+                            <a:rPr kumimoji="1" lang="ja-JP" altLang="en-US" i="1" smtClean="0">
+                              <a:latin typeface="Cambria Math" panose="02040503050406030204" pitchFamily="18" charset="0"/>
+                            </a:rPr>
+                            <m:t>𝜑</m:t>
+                          </m:r>
+                        </m:e>
+                        <m:sub>
+                          <m:r>
+                            <a:rPr kumimoji="1" lang="en-US" altLang="ja-JP" b="0" i="1" smtClean="0">
+                              <a:latin typeface="Cambria Math" panose="02040503050406030204" pitchFamily="18" charset="0"/>
+                            </a:rPr>
+                            <m:t>𝑖</m:t>
+                          </m:r>
+                        </m:sub>
+                      </m:sSub>
+                    </m:oMath>
+                  </m:oMathPara>
+                </a14:m>
+                <a:endParaRPr kumimoji="1" lang="ja-JP" altLang="en-US" dirty="0"/>
+              </a:p>
+            </p:txBody>
+          </p:sp>
+        </mc:Choice>
+        <mc:Fallback>
+          <p:sp>
+            <p:nvSpPr>
+              <p:cNvPr id="111" name="テキスト ボックス 110">
+                <a:extLst>
+                  <a:ext uri="{FF2B5EF4-FFF2-40B4-BE49-F238E27FC236}">
+                    <a16:creationId xmlns:a16="http://schemas.microsoft.com/office/drawing/2014/main" id="{644624F7-2342-4DC4-A556-B9246A3E70AE}"/>
+                  </a:ext>
+                </a:extLst>
+              </p:cNvPr>
+              <p:cNvSpPr txBox="1">
+                <a:spLocks noRot="1" noChangeAspect="1" noMove="1" noResize="1" noEditPoints="1" noAdjustHandles="1" noChangeArrowheads="1" noChangeShapeType="1" noTextEdit="1"/>
+              </p:cNvSpPr>
+              <p:nvPr/>
+            </p:nvSpPr>
+            <p:spPr>
+              <a:xfrm>
+                <a:off x="10056077" y="1539306"/>
+                <a:ext cx="482120" cy="369332"/>
+              </a:xfrm>
+              <a:prstGeom prst="rect">
+                <a:avLst/>
+              </a:prstGeom>
+              <a:blipFill>
+                <a:blip r:embed="rId12"/>
+                <a:stretch>
+                  <a:fillRect b="-6667"/>
+                </a:stretch>
+              </a:blipFill>
+            </p:spPr>
+            <p:txBody>
+              <a:bodyPr/>
+              <a:lstStyle/>
+              <a:p>
+                <a:r>
+                  <a:rPr lang="ja-JP" altLang="en-US">
+                    <a:noFill/>
+                  </a:rPr>
+                  <a:t> </a:t>
+                </a:r>
+              </a:p>
+            </p:txBody>
+          </p:sp>
+        </mc:Fallback>
+      </mc:AlternateContent>
+      <p:sp>
+        <p:nvSpPr>
+          <p:cNvPr id="117" name="円弧 116">
+            <a:extLst>
+              <a:ext uri="{FF2B5EF4-FFF2-40B4-BE49-F238E27FC236}">
+                <a16:creationId xmlns:a16="http://schemas.microsoft.com/office/drawing/2014/main" id="{D492FAEA-5B33-4780-B3C1-14F5DFE49541}"/>
+              </a:ext>
+            </a:extLst>
+          </p:cNvPr>
+          <p:cNvSpPr/>
+          <p:nvPr/>
+        </p:nvSpPr>
+        <p:spPr>
+          <a:xfrm rot="13603447">
+            <a:off x="10037956" y="885122"/>
+            <a:ext cx="417096" cy="533271"/>
+          </a:xfrm>
+          <a:prstGeom prst="arc">
+            <a:avLst>
+              <a:gd name="adj1" fmla="val 17551539"/>
+              <a:gd name="adj2" fmla="val 2926224"/>
+            </a:avLst>
+          </a:prstGeom>
+          <a:ln>
+            <a:prstDash val="dash"/>
+            <a:tailEnd type="triangle"/>
+          </a:ln>
+        </p:spPr>
+        <p:style>
+          <a:lnRef idx="1">
+            <a:schemeClr val="accent1"/>
+          </a:lnRef>
+          <a:fillRef idx="0">
+            <a:schemeClr val="accent1"/>
+          </a:fillRef>
+          <a:effectRef idx="0">
+            <a:schemeClr val="accent1"/>
+          </a:effectRef>
+          <a:fontRef idx="minor">
+            <a:schemeClr val="tx1"/>
+          </a:fontRef>
+        </p:style>
+        <p:txBody>
+          <a:bodyPr rtlCol="0" anchor="ctr"/>
+          <a:lstStyle/>
+          <a:p>
+            <a:pPr algn="ctr"/>
+            <a:endParaRPr kumimoji="1" lang="ja-JP" altLang="en-US"/>
+          </a:p>
+        </p:txBody>
+      </p:sp>
+      <p:grpSp>
+        <p:nvGrpSpPr>
+          <p:cNvPr id="118" name="グループ化 117">
+            <a:extLst>
+              <a:ext uri="{FF2B5EF4-FFF2-40B4-BE49-F238E27FC236}">
+                <a16:creationId xmlns:a16="http://schemas.microsoft.com/office/drawing/2014/main" id="{218E5FE5-3FFC-4533-AF78-96EA26C707E7}"/>
+              </a:ext>
+            </a:extLst>
+          </p:cNvPr>
+          <p:cNvGrpSpPr/>
+          <p:nvPr/>
+        </p:nvGrpSpPr>
+        <p:grpSpPr>
+          <a:xfrm flipH="1">
+            <a:off x="10730263" y="3164997"/>
+            <a:ext cx="932430" cy="953490"/>
+            <a:chOff x="2940037" y="1782869"/>
+            <a:chExt cx="932430" cy="953490"/>
+          </a:xfrm>
+        </p:grpSpPr>
+        <p:cxnSp>
+          <p:nvCxnSpPr>
+            <p:cNvPr id="119" name="直線矢印コネクタ 118">
+              <a:extLst>
+                <a:ext uri="{FF2B5EF4-FFF2-40B4-BE49-F238E27FC236}">
+                  <a16:creationId xmlns:a16="http://schemas.microsoft.com/office/drawing/2014/main" id="{FDAC1383-DBBA-4060-928A-0BD69B4727BE}"/>
+                </a:ext>
+              </a:extLst>
+            </p:cNvPr>
+            <p:cNvCxnSpPr>
+              <a:cxnSpLocks/>
+            </p:cNvCxnSpPr>
+            <p:nvPr/>
+          </p:nvCxnSpPr>
+          <p:spPr>
+            <a:xfrm>
+              <a:off x="3182747" y="2485748"/>
+              <a:ext cx="689720" cy="0"/>
+            </a:xfrm>
+            <a:prstGeom prst="straightConnector1">
+              <a:avLst/>
+            </a:prstGeom>
+            <a:ln w="12700">
+              <a:solidFill>
+                <a:schemeClr val="tx1"/>
+              </a:solidFill>
+              <a:tailEnd type="triangle"/>
+            </a:ln>
+          </p:spPr>
+          <p:style>
+            <a:lnRef idx="1">
+              <a:schemeClr val="accent1"/>
+            </a:lnRef>
+            <a:fillRef idx="0">
+              <a:schemeClr val="accent1"/>
+            </a:fillRef>
+            <a:effectRef idx="0">
+              <a:schemeClr val="accent1"/>
+            </a:effectRef>
+            <a:fontRef idx="minor">
+              <a:schemeClr val="tx1"/>
+            </a:fontRef>
+          </p:style>
+        </p:cxnSp>
+        <p:cxnSp>
+          <p:nvCxnSpPr>
+            <p:cNvPr id="120" name="直線矢印コネクタ 119">
+              <a:extLst>
+                <a:ext uri="{FF2B5EF4-FFF2-40B4-BE49-F238E27FC236}">
+                  <a16:creationId xmlns:a16="http://schemas.microsoft.com/office/drawing/2014/main" id="{ED946B43-F9B2-48BC-93BF-4C9046F94446}"/>
+                </a:ext>
+              </a:extLst>
+            </p:cNvPr>
+            <p:cNvCxnSpPr>
+              <a:cxnSpLocks/>
+            </p:cNvCxnSpPr>
+            <p:nvPr/>
+          </p:nvCxnSpPr>
+          <p:spPr>
+            <a:xfrm flipV="1">
+              <a:off x="3193103" y="1782869"/>
+              <a:ext cx="0" cy="713237"/>
+            </a:xfrm>
+            <a:prstGeom prst="straightConnector1">
+              <a:avLst/>
+            </a:prstGeom>
+            <a:ln w="12700">
+              <a:solidFill>
+                <a:schemeClr val="tx1"/>
+              </a:solidFill>
+              <a:tailEnd type="triangle"/>
+            </a:ln>
+          </p:spPr>
+          <p:style>
+            <a:lnRef idx="1">
+              <a:schemeClr val="accent1"/>
+            </a:lnRef>
+            <a:fillRef idx="0">
+              <a:schemeClr val="accent1"/>
+            </a:fillRef>
+            <a:effectRef idx="0">
+              <a:schemeClr val="accent1"/>
+            </a:effectRef>
+            <a:fontRef idx="minor">
+              <a:schemeClr val="tx1"/>
+            </a:fontRef>
+          </p:style>
+        </p:cxnSp>
+        <mc:AlternateContent xmlns:mc="http://schemas.openxmlformats.org/markup-compatibility/2006" xmlns:a14="http://schemas.microsoft.com/office/drawing/2010/main">
+          <mc:Choice Requires="a14">
+            <p:sp>
+              <p:nvSpPr>
+                <p:cNvPr id="121" name="テキスト ボックス 120">
+                  <a:extLst>
+                    <a:ext uri="{FF2B5EF4-FFF2-40B4-BE49-F238E27FC236}">
+                      <a16:creationId xmlns:a16="http://schemas.microsoft.com/office/drawing/2014/main" id="{E7D33804-93CE-40BD-AD67-0F760A9315CC}"/>
+                    </a:ext>
+                  </a:extLst>
+                </p:cNvPr>
+                <p:cNvSpPr txBox="1"/>
+                <p:nvPr/>
+              </p:nvSpPr>
+              <p:spPr>
+                <a:xfrm>
+                  <a:off x="2940037" y="2367027"/>
+                  <a:ext cx="378885" cy="369332"/>
+                </a:xfrm>
+                <a:prstGeom prst="rect">
+                  <a:avLst/>
+                </a:prstGeom>
+                <a:noFill/>
+              </p:spPr>
+              <p:txBody>
+                <a:bodyPr wrap="none" rtlCol="0">
+                  <a:spAutoFit/>
+                </a:bodyPr>
+                <a:lstStyle/>
+                <a:p>
+                  <a:pPr algn="ctr"/>
+                  <a14:m>
+                    <m:oMathPara xmlns:m="http://schemas.openxmlformats.org/officeDocument/2006/math">
+                      <m:oMathParaPr>
+                        <m:jc m:val="centerGroup"/>
+                      </m:oMathParaPr>
+                      <m:oMath xmlns:m="http://schemas.openxmlformats.org/officeDocument/2006/math">
+                        <m:r>
+                          <a:rPr kumimoji="1" lang="en-US" altLang="ja-JP" b="0" i="1" smtClean="0">
+                            <a:latin typeface="Cambria Math" panose="02040503050406030204" pitchFamily="18" charset="0"/>
+                          </a:rPr>
+                          <m:t>𝑜</m:t>
+                        </m:r>
+                      </m:oMath>
+                    </m:oMathPara>
+                  </a14:m>
+                  <a:endParaRPr kumimoji="1" lang="ja-JP" altLang="en-US" dirty="0"/>
+                </a:p>
+              </p:txBody>
+            </p:sp>
+          </mc:Choice>
+          <mc:Fallback xmlns="">
+            <p:sp>
+              <p:nvSpPr>
+                <p:cNvPr id="89" name="テキスト ボックス 88">
+                  <a:extLst>
+                    <a:ext uri="{FF2B5EF4-FFF2-40B4-BE49-F238E27FC236}">
+                      <a16:creationId xmlns:a16="http://schemas.microsoft.com/office/drawing/2014/main" id="{432AFEC6-CCE9-4CA4-B070-084845B5C832}"/>
+                    </a:ext>
+                  </a:extLst>
+                </p:cNvPr>
+                <p:cNvSpPr txBox="1">
+                  <a:spLocks noRot="1" noChangeAspect="1" noMove="1" noResize="1" noEditPoints="1" noAdjustHandles="1" noChangeArrowheads="1" noChangeShapeType="1" noTextEdit="1"/>
+                </p:cNvSpPr>
+                <p:nvPr/>
+              </p:nvSpPr>
+              <p:spPr>
+                <a:xfrm>
+                  <a:off x="2940037" y="2367027"/>
+                  <a:ext cx="378885" cy="369332"/>
+                </a:xfrm>
+                <a:prstGeom prst="rect">
+                  <a:avLst/>
+                </a:prstGeom>
+                <a:blipFill>
+                  <a:blip r:embed="rId3"/>
+                  <a:stretch>
+                    <a:fillRect/>
+                  </a:stretch>
+                </a:blipFill>
+              </p:spPr>
+              <p:txBody>
+                <a:bodyPr/>
+                <a:lstStyle/>
+                <a:p>
+                  <a:r>
+                    <a:rPr lang="ja-JP" altLang="en-US">
+                      <a:noFill/>
+                    </a:rPr>
+                    <a:t> </a:t>
+                  </a:r>
+                </a:p>
+              </p:txBody>
+            </p:sp>
+          </mc:Fallback>
+        </mc:AlternateContent>
+      </p:grpSp>
+      <mc:AlternateContent xmlns:mc="http://schemas.openxmlformats.org/markup-compatibility/2006">
+        <mc:Choice xmlns:a14="http://schemas.microsoft.com/office/drawing/2010/main" Requires="a14">
+          <p:sp>
+            <p:nvSpPr>
+              <p:cNvPr id="122" name="テキスト ボックス 121">
+                <a:extLst>
+                  <a:ext uri="{FF2B5EF4-FFF2-40B4-BE49-F238E27FC236}">
+                    <a16:creationId xmlns:a16="http://schemas.microsoft.com/office/drawing/2014/main" id="{F9F8AEC1-5BF3-4C92-BBEE-0A1530BED39E}"/>
+                  </a:ext>
+                </a:extLst>
+              </p:cNvPr>
+              <p:cNvSpPr txBox="1"/>
+              <p:nvPr/>
+            </p:nvSpPr>
+            <p:spPr>
+              <a:xfrm>
+                <a:off x="11409627" y="3006172"/>
+                <a:ext cx="380810" cy="369332"/>
+              </a:xfrm>
+              <a:prstGeom prst="rect">
+                <a:avLst/>
+              </a:prstGeom>
+              <a:noFill/>
+            </p:spPr>
+            <p:txBody>
+              <a:bodyPr wrap="none" rtlCol="0">
+                <a:spAutoFit/>
+              </a:bodyPr>
+              <a:lstStyle/>
+              <a:p>
+                <a:pPr algn="ctr"/>
+                <a14:m>
+                  <m:oMathPara xmlns:m="http://schemas.openxmlformats.org/officeDocument/2006/math">
+                    <m:oMathParaPr>
+                      <m:jc m:val="centerGroup"/>
+                    </m:oMathParaPr>
+                    <m:oMath xmlns:m="http://schemas.openxmlformats.org/officeDocument/2006/math">
+                      <m:r>
+                        <a:rPr kumimoji="1" lang="en-US" altLang="ja-JP" b="0" i="1" smtClean="0">
+                          <a:latin typeface="Cambria Math" panose="02040503050406030204" pitchFamily="18" charset="0"/>
+                        </a:rPr>
+                        <m:t>𝑥</m:t>
+                      </m:r>
+                    </m:oMath>
+                  </m:oMathPara>
+                </a14:m>
+                <a:endParaRPr kumimoji="1" lang="ja-JP" altLang="en-US" dirty="0"/>
+              </a:p>
+            </p:txBody>
+          </p:sp>
+        </mc:Choice>
+        <mc:Fallback>
+          <p:sp>
+            <p:nvSpPr>
+              <p:cNvPr id="122" name="テキスト ボックス 121">
+                <a:extLst>
+                  <a:ext uri="{FF2B5EF4-FFF2-40B4-BE49-F238E27FC236}">
+                    <a16:creationId xmlns:a16="http://schemas.microsoft.com/office/drawing/2014/main" id="{F9F8AEC1-5BF3-4C92-BBEE-0A1530BED39E}"/>
+                  </a:ext>
+                </a:extLst>
+              </p:cNvPr>
+              <p:cNvSpPr txBox="1">
+                <a:spLocks noRot="1" noChangeAspect="1" noMove="1" noResize="1" noEditPoints="1" noAdjustHandles="1" noChangeArrowheads="1" noChangeShapeType="1" noTextEdit="1"/>
+              </p:cNvSpPr>
+              <p:nvPr/>
+            </p:nvSpPr>
+            <p:spPr>
+              <a:xfrm>
+                <a:off x="11409627" y="3006172"/>
+                <a:ext cx="380810" cy="369332"/>
+              </a:xfrm>
+              <a:prstGeom prst="rect">
+                <a:avLst/>
+              </a:prstGeom>
+              <a:blipFill>
+                <a:blip r:embed="rId13"/>
+                <a:stretch>
+                  <a:fillRect/>
+                </a:stretch>
+              </a:blipFill>
+            </p:spPr>
+            <p:txBody>
+              <a:bodyPr/>
+              <a:lstStyle/>
+              <a:p>
+                <a:r>
+                  <a:rPr lang="ja-JP" altLang="en-US">
+                    <a:noFill/>
+                  </a:rPr>
+                  <a:t> </a:t>
+                </a:r>
+              </a:p>
+            </p:txBody>
+          </p:sp>
+        </mc:Fallback>
+      </mc:AlternateContent>
+      <mc:AlternateContent xmlns:mc="http://schemas.openxmlformats.org/markup-compatibility/2006">
+        <mc:Choice xmlns:a14="http://schemas.microsoft.com/office/drawing/2010/main" Requires="a14">
+          <p:sp>
+            <p:nvSpPr>
+              <p:cNvPr id="123" name="テキスト ボックス 122">
+                <a:extLst>
+                  <a:ext uri="{FF2B5EF4-FFF2-40B4-BE49-F238E27FC236}">
+                    <a16:creationId xmlns:a16="http://schemas.microsoft.com/office/drawing/2014/main" id="{674BEBBD-C623-4F6B-918A-5E5E7EA755B8}"/>
+                  </a:ext>
+                </a:extLst>
+              </p:cNvPr>
+              <p:cNvSpPr txBox="1"/>
+              <p:nvPr/>
+            </p:nvSpPr>
+            <p:spPr>
+              <a:xfrm>
+                <a:off x="10577863" y="3823046"/>
+                <a:ext cx="384208" cy="369332"/>
+              </a:xfrm>
+              <a:prstGeom prst="rect">
+                <a:avLst/>
+              </a:prstGeom>
+              <a:noFill/>
+            </p:spPr>
+            <p:txBody>
+              <a:bodyPr wrap="none" rtlCol="0">
+                <a:spAutoFit/>
+              </a:bodyPr>
+              <a:lstStyle/>
+              <a:p>
+                <a:pPr algn="ctr"/>
+                <a14:m>
+                  <m:oMathPara xmlns:m="http://schemas.openxmlformats.org/officeDocument/2006/math">
+                    <m:oMathParaPr>
+                      <m:jc m:val="centerGroup"/>
+                    </m:oMathParaPr>
+                    <m:oMath xmlns:m="http://schemas.openxmlformats.org/officeDocument/2006/math">
+                      <m:r>
+                        <a:rPr kumimoji="1" lang="en-US" altLang="ja-JP" b="0" i="1" smtClean="0">
+                          <a:latin typeface="Cambria Math" panose="02040503050406030204" pitchFamily="18" charset="0"/>
+                        </a:rPr>
+                        <m:t>𝑦</m:t>
+                      </m:r>
+                    </m:oMath>
+                  </m:oMathPara>
+                </a14:m>
+                <a:endParaRPr kumimoji="1" lang="ja-JP" altLang="en-US" dirty="0"/>
+              </a:p>
+            </p:txBody>
+          </p:sp>
+        </mc:Choice>
+        <mc:Fallback>
+          <p:sp>
+            <p:nvSpPr>
+              <p:cNvPr id="123" name="テキスト ボックス 122">
+                <a:extLst>
+                  <a:ext uri="{FF2B5EF4-FFF2-40B4-BE49-F238E27FC236}">
+                    <a16:creationId xmlns:a16="http://schemas.microsoft.com/office/drawing/2014/main" id="{674BEBBD-C623-4F6B-918A-5E5E7EA755B8}"/>
+                  </a:ext>
+                </a:extLst>
+              </p:cNvPr>
+              <p:cNvSpPr txBox="1">
+                <a:spLocks noRot="1" noChangeAspect="1" noMove="1" noResize="1" noEditPoints="1" noAdjustHandles="1" noChangeArrowheads="1" noChangeShapeType="1" noTextEdit="1"/>
+              </p:cNvSpPr>
+              <p:nvPr/>
+            </p:nvSpPr>
+            <p:spPr>
+              <a:xfrm>
+                <a:off x="10577863" y="3823046"/>
+                <a:ext cx="384208" cy="369332"/>
+              </a:xfrm>
+              <a:prstGeom prst="rect">
+                <a:avLst/>
+              </a:prstGeom>
+              <a:blipFill>
+                <a:blip r:embed="rId14"/>
+                <a:stretch>
+                  <a:fillRect b="-6557"/>
+                </a:stretch>
+              </a:blipFill>
+            </p:spPr>
+            <p:txBody>
+              <a:bodyPr/>
+              <a:lstStyle/>
+              <a:p>
+                <a:r>
+                  <a:rPr lang="ja-JP" altLang="en-US">
+                    <a:noFill/>
+                  </a:rPr>
+                  <a:t> </a:t>
+                </a:r>
+              </a:p>
+            </p:txBody>
+          </p:sp>
+        </mc:Fallback>
+      </mc:AlternateContent>
+      <p:cxnSp>
+        <p:nvCxnSpPr>
+          <p:cNvPr id="124" name="直線矢印コネクタ 123">
+            <a:extLst>
+              <a:ext uri="{FF2B5EF4-FFF2-40B4-BE49-F238E27FC236}">
+                <a16:creationId xmlns:a16="http://schemas.microsoft.com/office/drawing/2014/main" id="{3AFCE1B8-544A-4C17-B964-6C29F5B3C9EB}"/>
+              </a:ext>
+            </a:extLst>
+          </p:cNvPr>
+          <p:cNvCxnSpPr>
+            <a:cxnSpLocks/>
+          </p:cNvCxnSpPr>
+          <p:nvPr/>
+        </p:nvCxnSpPr>
+        <p:spPr>
+          <a:xfrm flipH="1" flipV="1">
+            <a:off x="10673676" y="3027362"/>
+            <a:ext cx="732889" cy="825472"/>
+          </a:xfrm>
+          <a:prstGeom prst="straightConnector1">
+            <a:avLst/>
+          </a:prstGeom>
+          <a:ln>
+            <a:tailEnd type="triangle"/>
+          </a:ln>
+        </p:spPr>
+        <p:style>
+          <a:lnRef idx="1">
+            <a:schemeClr val="accent1"/>
+          </a:lnRef>
+          <a:fillRef idx="0">
+            <a:schemeClr val="accent1"/>
+          </a:fillRef>
+          <a:effectRef idx="0">
+            <a:schemeClr val="accent1"/>
+          </a:effectRef>
+          <a:fontRef idx="minor">
+            <a:schemeClr val="tx1"/>
+          </a:fontRef>
+        </p:style>
+      </p:cxnSp>
+      <mc:AlternateContent xmlns:mc="http://schemas.openxmlformats.org/markup-compatibility/2006">
+        <mc:Choice xmlns:a14="http://schemas.microsoft.com/office/drawing/2010/main" Requires="a14">
+          <p:sp>
+            <p:nvSpPr>
+              <p:cNvPr id="126" name="テキスト ボックス 125">
+                <a:extLst>
+                  <a:ext uri="{FF2B5EF4-FFF2-40B4-BE49-F238E27FC236}">
+                    <a16:creationId xmlns:a16="http://schemas.microsoft.com/office/drawing/2014/main" id="{086BCB88-FB6C-4377-9CD7-F19CBFA674B8}"/>
+                  </a:ext>
+                </a:extLst>
+              </p:cNvPr>
+              <p:cNvSpPr txBox="1"/>
+              <p:nvPr/>
+            </p:nvSpPr>
+            <p:spPr>
+              <a:xfrm>
+                <a:off x="10420611" y="2969748"/>
+                <a:ext cx="458074" cy="369332"/>
+              </a:xfrm>
+              <a:prstGeom prst="rect">
+                <a:avLst/>
+              </a:prstGeom>
+              <a:noFill/>
+            </p:spPr>
+            <p:txBody>
+              <a:bodyPr wrap="none" rtlCol="0">
+                <a:spAutoFit/>
+              </a:bodyPr>
+              <a:lstStyle/>
+              <a:p>
+                <a:pPr algn="ctr"/>
+                <a14:m>
+                  <m:oMathPara xmlns:m="http://schemas.openxmlformats.org/officeDocument/2006/math">
+                    <m:oMathParaPr>
+                      <m:jc m:val="centerGroup"/>
+                    </m:oMathParaPr>
+                    <m:oMath xmlns:m="http://schemas.openxmlformats.org/officeDocument/2006/math">
+                      <m:sSub>
+                        <m:sSubPr>
+                          <m:ctrlPr>
+                            <a:rPr kumimoji="1" lang="en-US" altLang="ja-JP" i="1" smtClean="0">
+                              <a:latin typeface="Cambria Math" panose="02040503050406030204" pitchFamily="18" charset="0"/>
+                            </a:rPr>
+                          </m:ctrlPr>
+                        </m:sSubPr>
+                        <m:e>
+                          <m:r>
+                            <a:rPr kumimoji="1" lang="en-US" altLang="ja-JP" b="0" i="1" smtClean="0">
+                              <a:latin typeface="Cambria Math" panose="02040503050406030204" pitchFamily="18" charset="0"/>
+                            </a:rPr>
+                            <m:t>𝑑</m:t>
+                          </m:r>
+                        </m:e>
+                        <m:sub>
+                          <m:r>
+                            <a:rPr kumimoji="1" lang="en-US" altLang="ja-JP" b="0" i="1" smtClean="0">
+                              <a:latin typeface="Cambria Math" panose="02040503050406030204" pitchFamily="18" charset="0"/>
+                            </a:rPr>
+                            <m:t>𝑖</m:t>
+                          </m:r>
+                        </m:sub>
+                      </m:sSub>
+                    </m:oMath>
+                  </m:oMathPara>
+                </a14:m>
+                <a:endParaRPr kumimoji="1" lang="ja-JP" altLang="en-US" dirty="0"/>
+              </a:p>
+            </p:txBody>
+          </p:sp>
+        </mc:Choice>
+        <mc:Fallback>
+          <p:sp>
+            <p:nvSpPr>
+              <p:cNvPr id="126" name="テキスト ボックス 125">
+                <a:extLst>
+                  <a:ext uri="{FF2B5EF4-FFF2-40B4-BE49-F238E27FC236}">
+                    <a16:creationId xmlns:a16="http://schemas.microsoft.com/office/drawing/2014/main" id="{086BCB88-FB6C-4377-9CD7-F19CBFA674B8}"/>
+                  </a:ext>
+                </a:extLst>
+              </p:cNvPr>
+              <p:cNvSpPr txBox="1">
+                <a:spLocks noRot="1" noChangeAspect="1" noMove="1" noResize="1" noEditPoints="1" noAdjustHandles="1" noChangeArrowheads="1" noChangeShapeType="1" noTextEdit="1"/>
+              </p:cNvSpPr>
+              <p:nvPr/>
+            </p:nvSpPr>
+            <p:spPr>
+              <a:xfrm>
+                <a:off x="10420611" y="2969748"/>
+                <a:ext cx="458074" cy="369332"/>
+              </a:xfrm>
+              <a:prstGeom prst="rect">
+                <a:avLst/>
+              </a:prstGeom>
+              <a:blipFill>
+                <a:blip r:embed="rId15"/>
+                <a:stretch>
+                  <a:fillRect/>
+                </a:stretch>
+              </a:blipFill>
+            </p:spPr>
+            <p:txBody>
+              <a:bodyPr/>
+              <a:lstStyle/>
+              <a:p>
+                <a:r>
+                  <a:rPr lang="ja-JP" altLang="en-US">
+                    <a:noFill/>
+                  </a:rPr>
+                  <a:t> </a:t>
+                </a:r>
+              </a:p>
+            </p:txBody>
+          </p:sp>
+        </mc:Fallback>
+      </mc:AlternateContent>
+      <p:sp>
+        <p:nvSpPr>
+          <p:cNvPr id="128" name="円弧 127">
+            <a:extLst>
+              <a:ext uri="{FF2B5EF4-FFF2-40B4-BE49-F238E27FC236}">
+                <a16:creationId xmlns:a16="http://schemas.microsoft.com/office/drawing/2014/main" id="{5FC16BA9-6091-407B-92A5-3B6108DFC37D}"/>
+              </a:ext>
+            </a:extLst>
+          </p:cNvPr>
+          <p:cNvSpPr/>
+          <p:nvPr/>
+        </p:nvSpPr>
+        <p:spPr>
+          <a:xfrm rot="16747653">
+            <a:off x="11153905" y="3490581"/>
+            <a:ext cx="417096" cy="369331"/>
+          </a:xfrm>
+          <a:prstGeom prst="arc">
+            <a:avLst>
+              <a:gd name="adj1" fmla="val 17129057"/>
+              <a:gd name="adj2" fmla="val 285234"/>
+            </a:avLst>
+          </a:prstGeom>
+        </p:spPr>
+        <p:style>
+          <a:lnRef idx="1">
+            <a:schemeClr val="accent1"/>
+          </a:lnRef>
+          <a:fillRef idx="0">
+            <a:schemeClr val="accent1"/>
+          </a:fillRef>
+          <a:effectRef idx="0">
+            <a:schemeClr val="accent1"/>
+          </a:effectRef>
+          <a:fontRef idx="minor">
+            <a:schemeClr val="tx1"/>
+          </a:fontRef>
+        </p:style>
+        <p:txBody>
+          <a:bodyPr rtlCol="0" anchor="ctr"/>
+          <a:lstStyle/>
+          <a:p>
+            <a:pPr algn="ctr"/>
+            <a:endParaRPr kumimoji="1" lang="ja-JP" altLang="en-US"/>
+          </a:p>
+        </p:txBody>
+      </p:sp>
+      <mc:AlternateContent xmlns:mc="http://schemas.openxmlformats.org/markup-compatibility/2006">
+        <mc:Choice xmlns:a14="http://schemas.microsoft.com/office/drawing/2010/main" Requires="a14">
+          <p:sp>
+            <p:nvSpPr>
+              <p:cNvPr id="130" name="テキスト ボックス 129">
+                <a:extLst>
+                  <a:ext uri="{FF2B5EF4-FFF2-40B4-BE49-F238E27FC236}">
+                    <a16:creationId xmlns:a16="http://schemas.microsoft.com/office/drawing/2014/main" id="{83CE2F57-E263-402B-AD93-9BB6F1FE62FB}"/>
+                  </a:ext>
+                </a:extLst>
+              </p:cNvPr>
+              <p:cNvSpPr txBox="1"/>
+              <p:nvPr/>
+            </p:nvSpPr>
+            <p:spPr>
+              <a:xfrm>
+                <a:off x="11009864" y="3158632"/>
+                <a:ext cx="482120" cy="369332"/>
+              </a:xfrm>
+              <a:prstGeom prst="rect">
+                <a:avLst/>
+              </a:prstGeom>
+              <a:noFill/>
+            </p:spPr>
+            <p:txBody>
+              <a:bodyPr wrap="none" rtlCol="0">
+                <a:spAutoFit/>
+              </a:bodyPr>
+              <a:lstStyle/>
+              <a:p>
+                <a:pPr algn="ctr"/>
+                <a14:m>
+                  <m:oMathPara xmlns:m="http://schemas.openxmlformats.org/officeDocument/2006/math">
+                    <m:oMathParaPr>
+                      <m:jc m:val="centerGroup"/>
+                    </m:oMathParaPr>
+                    <m:oMath xmlns:m="http://schemas.openxmlformats.org/officeDocument/2006/math">
+                      <m:sSub>
+                        <m:sSubPr>
+                          <m:ctrlPr>
+                            <a:rPr kumimoji="1" lang="en-US" altLang="ja-JP" i="1" smtClean="0">
+                              <a:latin typeface="Cambria Math" panose="02040503050406030204" pitchFamily="18" charset="0"/>
+                            </a:rPr>
+                          </m:ctrlPr>
+                        </m:sSubPr>
+                        <m:e>
+                          <m:r>
+                            <a:rPr kumimoji="1" lang="ja-JP" altLang="en-US" i="1" smtClean="0">
+                              <a:latin typeface="Cambria Math" panose="02040503050406030204" pitchFamily="18" charset="0"/>
+                            </a:rPr>
+                            <m:t>𝜑</m:t>
+                          </m:r>
+                        </m:e>
+                        <m:sub>
+                          <m:r>
+                            <a:rPr kumimoji="1" lang="en-US" altLang="ja-JP" b="0" i="1" smtClean="0">
+                              <a:latin typeface="Cambria Math" panose="02040503050406030204" pitchFamily="18" charset="0"/>
+                            </a:rPr>
+                            <m:t>𝑖</m:t>
+                          </m:r>
+                        </m:sub>
+                      </m:sSub>
+                    </m:oMath>
+                  </m:oMathPara>
+                </a14:m>
+                <a:endParaRPr kumimoji="1" lang="ja-JP" altLang="en-US" dirty="0"/>
+              </a:p>
+            </p:txBody>
+          </p:sp>
+        </mc:Choice>
+        <mc:Fallback>
+          <p:sp>
+            <p:nvSpPr>
+              <p:cNvPr id="130" name="テキスト ボックス 129">
+                <a:extLst>
+                  <a:ext uri="{FF2B5EF4-FFF2-40B4-BE49-F238E27FC236}">
+                    <a16:creationId xmlns:a16="http://schemas.microsoft.com/office/drawing/2014/main" id="{83CE2F57-E263-402B-AD93-9BB6F1FE62FB}"/>
+                  </a:ext>
+                </a:extLst>
+              </p:cNvPr>
+              <p:cNvSpPr txBox="1">
+                <a:spLocks noRot="1" noChangeAspect="1" noMove="1" noResize="1" noEditPoints="1" noAdjustHandles="1" noChangeArrowheads="1" noChangeShapeType="1" noTextEdit="1"/>
+              </p:cNvSpPr>
+              <p:nvPr/>
+            </p:nvSpPr>
+            <p:spPr>
+              <a:xfrm>
+                <a:off x="11009864" y="3158632"/>
+                <a:ext cx="482120" cy="369332"/>
+              </a:xfrm>
+              <a:prstGeom prst="rect">
+                <a:avLst/>
+              </a:prstGeom>
+              <a:blipFill>
+                <a:blip r:embed="rId16"/>
+                <a:stretch>
+                  <a:fillRect b="-6557"/>
+                </a:stretch>
+              </a:blipFill>
+            </p:spPr>
+            <p:txBody>
+              <a:bodyPr/>
+              <a:lstStyle/>
+              <a:p>
+                <a:r>
+                  <a:rPr lang="ja-JP" altLang="en-US">
+                    <a:noFill/>
+                  </a:rPr>
+                  <a:t> </a:t>
+                </a:r>
+              </a:p>
+            </p:txBody>
+          </p:sp>
+        </mc:Fallback>
+      </mc:AlternateContent>
+      <p:sp>
+        <p:nvSpPr>
+          <p:cNvPr id="132" name="円弧 131">
+            <a:extLst>
+              <a:ext uri="{FF2B5EF4-FFF2-40B4-BE49-F238E27FC236}">
+                <a16:creationId xmlns:a16="http://schemas.microsoft.com/office/drawing/2014/main" id="{B6FB069E-E146-46B6-90A9-2A1129D540EE}"/>
+              </a:ext>
+            </a:extLst>
+          </p:cNvPr>
+          <p:cNvSpPr/>
+          <p:nvPr/>
+        </p:nvSpPr>
+        <p:spPr>
+          <a:xfrm rot="13603447">
+            <a:off x="10865954" y="3087542"/>
+            <a:ext cx="417096" cy="533271"/>
+          </a:xfrm>
+          <a:prstGeom prst="arc">
+            <a:avLst>
+              <a:gd name="adj1" fmla="val 17551539"/>
+              <a:gd name="adj2" fmla="val 2926224"/>
+            </a:avLst>
+          </a:prstGeom>
+          <a:ln>
+            <a:prstDash val="dash"/>
+            <a:tailEnd type="triangle"/>
+          </a:ln>
+        </p:spPr>
+        <p:style>
+          <a:lnRef idx="1">
+            <a:schemeClr val="accent1"/>
+          </a:lnRef>
+          <a:fillRef idx="0">
+            <a:schemeClr val="accent1"/>
+          </a:fillRef>
+          <a:effectRef idx="0">
+            <a:schemeClr val="accent1"/>
+          </a:effectRef>
+          <a:fontRef idx="minor">
+            <a:schemeClr val="tx1"/>
+          </a:fontRef>
+        </p:style>
+        <p:txBody>
+          <a:bodyPr rtlCol="0" anchor="ctr"/>
+          <a:lstStyle/>
+          <a:p>
+            <a:pPr algn="ctr"/>
+            <a:endParaRPr kumimoji="1" lang="ja-JP" altLang="en-US"/>
+          </a:p>
+        </p:txBody>
+      </p:sp>
+      <mc:AlternateContent xmlns:mc="http://schemas.openxmlformats.org/markup-compatibility/2006">
+        <mc:Choice xmlns:a14="http://schemas.microsoft.com/office/drawing/2010/main" Requires="a14">
+          <p:sp>
+            <p:nvSpPr>
+              <p:cNvPr id="134" name="テキスト ボックス 133">
+                <a:extLst>
+                  <a:ext uri="{FF2B5EF4-FFF2-40B4-BE49-F238E27FC236}">
+                    <a16:creationId xmlns:a16="http://schemas.microsoft.com/office/drawing/2014/main" id="{998EF2A6-DA79-45ED-B854-485E6A7F462E}"/>
+                  </a:ext>
+                </a:extLst>
+              </p:cNvPr>
+              <p:cNvSpPr txBox="1"/>
+              <p:nvPr/>
+            </p:nvSpPr>
+            <p:spPr>
+              <a:xfrm>
+                <a:off x="6269866" y="3339080"/>
+                <a:ext cx="3484864" cy="369332"/>
+              </a:xfrm>
+              <a:prstGeom prst="rect">
+                <a:avLst/>
+              </a:prstGeom>
+              <a:noFill/>
+            </p:spPr>
+            <p:txBody>
+              <a:bodyPr wrap="none" rtlCol="0">
+                <a:spAutoFit/>
+              </a:bodyPr>
+              <a:lstStyle/>
+              <a:p>
+                <a:pPr algn="ctr"/>
+                <a14:m>
+                  <m:oMathPara xmlns:m="http://schemas.openxmlformats.org/officeDocument/2006/math">
+                    <m:oMathParaPr>
+                      <m:jc m:val="centerGroup"/>
+                    </m:oMathParaPr>
+                    <m:oMath xmlns:m="http://schemas.openxmlformats.org/officeDocument/2006/math">
+                      <m:d>
+                        <m:dPr>
+                          <m:ctrlPr>
+                            <a:rPr kumimoji="1" lang="en-US" altLang="ja-JP" b="0" i="1" smtClean="0">
+                              <a:latin typeface="Cambria Math" panose="02040503050406030204" pitchFamily="18" charset="0"/>
+                            </a:rPr>
+                          </m:ctrlPr>
+                        </m:dPr>
+                        <m:e>
+                          <m:sSub>
+                            <m:sSubPr>
+                              <m:ctrlPr>
+                                <a:rPr kumimoji="1" lang="en-US" altLang="ja-JP" b="0" i="1" smtClean="0">
+                                  <a:latin typeface="Cambria Math" panose="02040503050406030204" pitchFamily="18" charset="0"/>
+                                </a:rPr>
+                              </m:ctrlPr>
+                            </m:sSubPr>
+                            <m:e>
+                              <m:r>
+                                <a:rPr kumimoji="1" lang="ja-JP" altLang="en-US" b="0" i="1" smtClean="0">
+                                  <a:latin typeface="Cambria Math" panose="02040503050406030204" pitchFamily="18" charset="0"/>
+                                </a:rPr>
+                                <m:t>𝜑</m:t>
+                              </m:r>
+                            </m:e>
+                            <m:sub>
+                              <m:r>
+                                <a:rPr kumimoji="1" lang="en-US" altLang="ja-JP" b="0" i="1" smtClean="0">
+                                  <a:latin typeface="Cambria Math" panose="02040503050406030204" pitchFamily="18" charset="0"/>
+                                </a:rPr>
+                                <m:t>0</m:t>
+                              </m:r>
+                            </m:sub>
+                          </m:sSub>
+                          <m:r>
+                            <a:rPr kumimoji="1" lang="en-US" altLang="ja-JP" b="0" i="1" smtClean="0">
+                              <a:latin typeface="Cambria Math" panose="02040503050406030204" pitchFamily="18" charset="0"/>
+                            </a:rPr>
+                            <m:t>,</m:t>
+                          </m:r>
+                          <m:sSub>
+                            <m:sSubPr>
+                              <m:ctrlPr>
+                                <a:rPr kumimoji="1" lang="en-US" altLang="ja-JP" i="1" smtClean="0">
+                                  <a:latin typeface="Cambria Math" panose="02040503050406030204" pitchFamily="18" charset="0"/>
+                                </a:rPr>
+                              </m:ctrlPr>
+                            </m:sSubPr>
+                            <m:e>
+                              <m:r>
+                                <a:rPr kumimoji="1" lang="en-US" altLang="ja-JP" b="0" i="1" smtClean="0">
+                                  <a:latin typeface="Cambria Math" panose="02040503050406030204" pitchFamily="18" charset="0"/>
+                                </a:rPr>
+                                <m:t>𝑑</m:t>
+                              </m:r>
+                            </m:e>
+                            <m:sub>
+                              <m:r>
+                                <a:rPr kumimoji="1" lang="en-US" altLang="ja-JP" b="0" i="1" smtClean="0">
+                                  <a:latin typeface="Cambria Math" panose="02040503050406030204" pitchFamily="18" charset="0"/>
+                                </a:rPr>
+                                <m:t>0</m:t>
+                              </m:r>
+                            </m:sub>
+                          </m:sSub>
+                        </m:e>
+                      </m:d>
+                      <m:r>
+                        <a:rPr kumimoji="1" lang="en-US" altLang="ja-JP" b="0" i="1" smtClean="0">
+                          <a:latin typeface="Cambria Math" panose="02040503050406030204" pitchFamily="18" charset="0"/>
+                        </a:rPr>
+                        <m:t> </m:t>
+                      </m:r>
+                      <m:d>
+                        <m:dPr>
+                          <m:ctrlPr>
+                            <a:rPr lang="en-US" altLang="ja-JP" i="1">
+                              <a:latin typeface="Cambria Math" panose="02040503050406030204" pitchFamily="18" charset="0"/>
+                            </a:rPr>
+                          </m:ctrlPr>
+                        </m:dPr>
+                        <m:e>
+                          <m:sSub>
+                            <m:sSubPr>
+                              <m:ctrlPr>
+                                <a:rPr lang="en-US" altLang="ja-JP" i="1">
+                                  <a:latin typeface="Cambria Math" panose="02040503050406030204" pitchFamily="18" charset="0"/>
+                                </a:rPr>
+                              </m:ctrlPr>
+                            </m:sSubPr>
+                            <m:e>
+                              <m:r>
+                                <a:rPr lang="ja-JP" altLang="en-US" i="1">
+                                  <a:latin typeface="Cambria Math" panose="02040503050406030204" pitchFamily="18" charset="0"/>
+                                </a:rPr>
+                                <m:t>𝜑</m:t>
+                              </m:r>
+                            </m:e>
+                            <m:sub>
+                              <m:r>
+                                <a:rPr lang="en-US" altLang="ja-JP" b="0" i="1" smtClean="0">
+                                  <a:latin typeface="Cambria Math" panose="02040503050406030204" pitchFamily="18" charset="0"/>
+                                </a:rPr>
+                                <m:t>1</m:t>
+                              </m:r>
+                            </m:sub>
+                          </m:sSub>
+                          <m:r>
+                            <a:rPr lang="en-US" altLang="ja-JP" i="1">
+                              <a:latin typeface="Cambria Math" panose="02040503050406030204" pitchFamily="18" charset="0"/>
+                            </a:rPr>
+                            <m:t>,</m:t>
+                          </m:r>
+                          <m:sSub>
+                            <m:sSubPr>
+                              <m:ctrlPr>
+                                <a:rPr lang="en-US" altLang="ja-JP" i="1">
+                                  <a:latin typeface="Cambria Math" panose="02040503050406030204" pitchFamily="18" charset="0"/>
+                                </a:rPr>
+                              </m:ctrlPr>
+                            </m:sSubPr>
+                            <m:e>
+                              <m:r>
+                                <a:rPr lang="en-US" altLang="ja-JP" i="1">
+                                  <a:latin typeface="Cambria Math" panose="02040503050406030204" pitchFamily="18" charset="0"/>
+                                </a:rPr>
+                                <m:t>𝑑</m:t>
+                              </m:r>
+                            </m:e>
+                            <m:sub>
+                              <m:r>
+                                <a:rPr lang="en-US" altLang="ja-JP" b="0" i="1" smtClean="0">
+                                  <a:latin typeface="Cambria Math" panose="02040503050406030204" pitchFamily="18" charset="0"/>
+                                </a:rPr>
+                                <m:t>1</m:t>
+                              </m:r>
+                            </m:sub>
+                          </m:sSub>
+                        </m:e>
+                      </m:d>
+                      <m:r>
+                        <a:rPr lang="en-US" altLang="ja-JP" b="0" i="1" smtClean="0">
+                          <a:latin typeface="Cambria Math" panose="02040503050406030204" pitchFamily="18" charset="0"/>
+                        </a:rPr>
+                        <m:t> </m:t>
+                      </m:r>
+                      <m:r>
+                        <a:rPr lang="en-US" altLang="ja-JP" i="1" smtClean="0">
+                          <a:latin typeface="Cambria Math" panose="02040503050406030204" pitchFamily="18" charset="0"/>
+                          <a:ea typeface="Cambria Math" panose="02040503050406030204" pitchFamily="18" charset="0"/>
+                        </a:rPr>
+                        <m:t>⋯</m:t>
+                      </m:r>
+                      <m:r>
+                        <a:rPr lang="en-US" altLang="ja-JP" b="0" i="1" smtClean="0">
+                          <a:latin typeface="Cambria Math" panose="02040503050406030204" pitchFamily="18" charset="0"/>
+                          <a:ea typeface="Cambria Math" panose="02040503050406030204" pitchFamily="18" charset="0"/>
+                        </a:rPr>
+                        <m:t> </m:t>
+                      </m:r>
+                      <m:r>
+                        <a:rPr lang="en-US" altLang="ja-JP" i="1">
+                          <a:latin typeface="Cambria Math" panose="02040503050406030204" pitchFamily="18" charset="0"/>
+                        </a:rPr>
+                        <m:t>(</m:t>
+                      </m:r>
+                      <m:sSub>
+                        <m:sSubPr>
+                          <m:ctrlPr>
+                            <a:rPr lang="en-US" altLang="ja-JP" i="1">
+                              <a:latin typeface="Cambria Math" panose="02040503050406030204" pitchFamily="18" charset="0"/>
+                            </a:rPr>
+                          </m:ctrlPr>
+                        </m:sSubPr>
+                        <m:e>
+                          <m:r>
+                            <a:rPr lang="ja-JP" altLang="en-US" i="1">
+                              <a:latin typeface="Cambria Math" panose="02040503050406030204" pitchFamily="18" charset="0"/>
+                            </a:rPr>
+                            <m:t>𝜑</m:t>
+                          </m:r>
+                        </m:e>
+                        <m:sub>
+                          <m:r>
+                            <a:rPr lang="en-US" altLang="ja-JP" b="0" i="1" smtClean="0">
+                              <a:latin typeface="Cambria Math" panose="02040503050406030204" pitchFamily="18" charset="0"/>
+                            </a:rPr>
+                            <m:t>𝑛</m:t>
+                          </m:r>
+                          <m:r>
+                            <a:rPr lang="en-US" altLang="ja-JP" b="0" i="1" smtClean="0">
+                              <a:latin typeface="Cambria Math" panose="02040503050406030204" pitchFamily="18" charset="0"/>
+                            </a:rPr>
+                            <m:t>−1</m:t>
+                          </m:r>
+                        </m:sub>
+                      </m:sSub>
+                      <m:r>
+                        <a:rPr lang="en-US" altLang="ja-JP" i="1">
+                          <a:latin typeface="Cambria Math" panose="02040503050406030204" pitchFamily="18" charset="0"/>
+                        </a:rPr>
+                        <m:t>,</m:t>
+                      </m:r>
+                      <m:sSub>
+                        <m:sSubPr>
+                          <m:ctrlPr>
+                            <a:rPr lang="en-US" altLang="ja-JP" i="1">
+                              <a:latin typeface="Cambria Math" panose="02040503050406030204" pitchFamily="18" charset="0"/>
+                            </a:rPr>
+                          </m:ctrlPr>
+                        </m:sSubPr>
+                        <m:e>
+                          <m:r>
+                            <a:rPr lang="en-US" altLang="ja-JP" i="1">
+                              <a:latin typeface="Cambria Math" panose="02040503050406030204" pitchFamily="18" charset="0"/>
+                            </a:rPr>
+                            <m:t>𝑑</m:t>
+                          </m:r>
+                        </m:e>
+                        <m:sub>
+                          <m:r>
+                            <a:rPr lang="en-US" altLang="ja-JP" b="0" i="1" smtClean="0">
+                              <a:latin typeface="Cambria Math" panose="02040503050406030204" pitchFamily="18" charset="0"/>
+                            </a:rPr>
+                            <m:t>𝑛</m:t>
+                          </m:r>
+                          <m:r>
+                            <a:rPr lang="en-US" altLang="ja-JP" b="0" i="1" smtClean="0">
+                              <a:latin typeface="Cambria Math" panose="02040503050406030204" pitchFamily="18" charset="0"/>
+                            </a:rPr>
+                            <m:t>−1</m:t>
+                          </m:r>
+                        </m:sub>
+                      </m:sSub>
+                      <m:r>
+                        <a:rPr lang="en-US" altLang="ja-JP" i="1">
+                          <a:latin typeface="Cambria Math" panose="02040503050406030204" pitchFamily="18" charset="0"/>
+                        </a:rPr>
+                        <m:t>)</m:t>
+                      </m:r>
+                    </m:oMath>
+                  </m:oMathPara>
+                </a14:m>
+                <a:endParaRPr kumimoji="1" lang="ja-JP" altLang="en-US" dirty="0"/>
+              </a:p>
+            </p:txBody>
+          </p:sp>
+        </mc:Choice>
+        <mc:Fallback>
+          <p:sp>
+            <p:nvSpPr>
+              <p:cNvPr id="134" name="テキスト ボックス 133">
+                <a:extLst>
+                  <a:ext uri="{FF2B5EF4-FFF2-40B4-BE49-F238E27FC236}">
+                    <a16:creationId xmlns:a16="http://schemas.microsoft.com/office/drawing/2014/main" id="{998EF2A6-DA79-45ED-B854-485E6A7F462E}"/>
+                  </a:ext>
+                </a:extLst>
+              </p:cNvPr>
+              <p:cNvSpPr txBox="1">
+                <a:spLocks noRot="1" noChangeAspect="1" noMove="1" noResize="1" noEditPoints="1" noAdjustHandles="1" noChangeArrowheads="1" noChangeShapeType="1" noTextEdit="1"/>
+              </p:cNvSpPr>
+              <p:nvPr/>
+            </p:nvSpPr>
+            <p:spPr>
+              <a:xfrm>
+                <a:off x="6269866" y="3339080"/>
+                <a:ext cx="3484864" cy="369332"/>
+              </a:xfrm>
+              <a:prstGeom prst="rect">
+                <a:avLst/>
+              </a:prstGeom>
+              <a:blipFill>
+                <a:blip r:embed="rId17"/>
+                <a:stretch>
+                  <a:fillRect b="-13333"/>
+                </a:stretch>
+              </a:blipFill>
+            </p:spPr>
+            <p:txBody>
+              <a:bodyPr/>
+              <a:lstStyle/>
+              <a:p>
+                <a:r>
+                  <a:rPr lang="ja-JP" altLang="en-US">
+                    <a:noFill/>
+                  </a:rPr>
+                  <a:t> </a:t>
+                </a:r>
+              </a:p>
+            </p:txBody>
+          </p:sp>
+        </mc:Fallback>
+      </mc:AlternateContent>
+      <mc:AlternateContent xmlns:mc="http://schemas.openxmlformats.org/markup-compatibility/2006">
+        <mc:Choice xmlns:a14="http://schemas.microsoft.com/office/drawing/2010/main" Requires="a14">
+          <p:sp>
+            <p:nvSpPr>
+              <p:cNvPr id="136" name="テキスト ボックス 135">
+                <a:extLst>
+                  <a:ext uri="{FF2B5EF4-FFF2-40B4-BE49-F238E27FC236}">
+                    <a16:creationId xmlns:a16="http://schemas.microsoft.com/office/drawing/2014/main" id="{96096E19-C0B5-4920-A352-ED57F76E10A8}"/>
+                  </a:ext>
+                </a:extLst>
+              </p:cNvPr>
+              <p:cNvSpPr txBox="1"/>
+              <p:nvPr/>
+            </p:nvSpPr>
+            <p:spPr>
+              <a:xfrm>
+                <a:off x="6255287" y="4710957"/>
+                <a:ext cx="4418389" cy="369332"/>
+              </a:xfrm>
+              <a:prstGeom prst="rect">
+                <a:avLst/>
+              </a:prstGeom>
+              <a:noFill/>
+            </p:spPr>
+            <p:txBody>
+              <a:bodyPr wrap="none" rtlCol="0">
+                <a:spAutoFit/>
+              </a:bodyPr>
+              <a:lstStyle/>
+              <a:p>
+                <a:pPr algn="ctr"/>
+                <a14:m>
+                  <m:oMathPara xmlns:m="http://schemas.openxmlformats.org/officeDocument/2006/math">
+                    <m:oMathParaPr>
+                      <m:jc m:val="centerGroup"/>
+                    </m:oMathParaPr>
+                    <m:oMath xmlns:m="http://schemas.openxmlformats.org/officeDocument/2006/math">
+                      <m:d>
+                        <m:dPr>
+                          <m:ctrlPr>
+                            <a:rPr kumimoji="1" lang="en-US" altLang="ja-JP" b="0" i="1" smtClean="0">
+                              <a:latin typeface="Cambria Math" panose="02040503050406030204" pitchFamily="18" charset="0"/>
+                            </a:rPr>
+                          </m:ctrlPr>
+                        </m:dPr>
+                        <m:e>
+                          <m:sSub>
+                            <m:sSubPr>
+                              <m:ctrlPr>
+                                <a:rPr kumimoji="1" lang="en-US" altLang="ja-JP" b="0" i="1" smtClean="0">
+                                  <a:latin typeface="Cambria Math" panose="02040503050406030204" pitchFamily="18" charset="0"/>
+                                </a:rPr>
+                              </m:ctrlPr>
+                            </m:sSubPr>
+                            <m:e>
+                              <m:r>
+                                <a:rPr kumimoji="1" lang="en-US" altLang="ja-JP" b="0" i="1" smtClean="0">
+                                  <a:latin typeface="Cambria Math" panose="02040503050406030204" pitchFamily="18" charset="0"/>
+                                </a:rPr>
+                                <m:t>𝑥</m:t>
+                              </m:r>
+                            </m:e>
+                            <m:sub>
+                              <m:r>
+                                <a:rPr kumimoji="1" lang="en-US" altLang="ja-JP" b="0" i="1" smtClean="0">
+                                  <a:latin typeface="Cambria Math" panose="02040503050406030204" pitchFamily="18" charset="0"/>
+                                </a:rPr>
+                                <m:t>0</m:t>
+                              </m:r>
+                            </m:sub>
+                          </m:sSub>
+                          <m:r>
+                            <a:rPr kumimoji="1" lang="en-US" altLang="ja-JP" b="0" i="1" smtClean="0">
+                              <a:latin typeface="Cambria Math" panose="02040503050406030204" pitchFamily="18" charset="0"/>
+                            </a:rPr>
+                            <m:t>,</m:t>
+                          </m:r>
+                          <m:sSub>
+                            <m:sSubPr>
+                              <m:ctrlPr>
+                                <a:rPr kumimoji="1" lang="en-US" altLang="ja-JP" i="1" smtClean="0">
+                                  <a:latin typeface="Cambria Math" panose="02040503050406030204" pitchFamily="18" charset="0"/>
+                                </a:rPr>
+                              </m:ctrlPr>
+                            </m:sSubPr>
+                            <m:e>
+                              <m:r>
+                                <a:rPr kumimoji="1" lang="en-US" altLang="ja-JP" b="0" i="1" smtClean="0">
+                                  <a:latin typeface="Cambria Math" panose="02040503050406030204" pitchFamily="18" charset="0"/>
+                                </a:rPr>
+                                <m:t>𝑦</m:t>
+                              </m:r>
+                            </m:e>
+                            <m:sub>
+                              <m:r>
+                                <a:rPr kumimoji="1" lang="en-US" altLang="ja-JP" b="0" i="1" smtClean="0">
+                                  <a:latin typeface="Cambria Math" panose="02040503050406030204" pitchFamily="18" charset="0"/>
+                                </a:rPr>
+                                <m:t>0</m:t>
+                              </m:r>
+                            </m:sub>
+                          </m:sSub>
+                          <m:r>
+                            <a:rPr kumimoji="1" lang="en-US" altLang="ja-JP" b="0" i="1" smtClean="0">
+                              <a:latin typeface="Cambria Math" panose="02040503050406030204" pitchFamily="18" charset="0"/>
+                            </a:rPr>
+                            <m:t>, </m:t>
+                          </m:r>
+                          <m:sSub>
+                            <m:sSubPr>
+                              <m:ctrlPr>
+                                <a:rPr kumimoji="1" lang="en-US" altLang="ja-JP" b="0" i="1" smtClean="0">
+                                  <a:latin typeface="Cambria Math" panose="02040503050406030204" pitchFamily="18" charset="0"/>
+                                </a:rPr>
+                              </m:ctrlPr>
+                            </m:sSubPr>
+                            <m:e>
+                              <m:r>
+                                <a:rPr kumimoji="1" lang="ja-JP" altLang="en-US" b="0" i="1" smtClean="0">
+                                  <a:latin typeface="Cambria Math" panose="02040503050406030204" pitchFamily="18" charset="0"/>
+                                </a:rPr>
+                                <m:t>𝜃</m:t>
+                              </m:r>
+                            </m:e>
+                            <m:sub>
+                              <m:r>
+                                <a:rPr kumimoji="1" lang="en-US" altLang="ja-JP" b="0" i="1" smtClean="0">
+                                  <a:latin typeface="Cambria Math" panose="02040503050406030204" pitchFamily="18" charset="0"/>
+                                </a:rPr>
+                                <m:t>0</m:t>
+                              </m:r>
+                            </m:sub>
+                          </m:sSub>
+                        </m:e>
+                      </m:d>
+                      <m:r>
+                        <a:rPr kumimoji="1" lang="en-US" altLang="ja-JP" b="0" i="1" smtClean="0">
+                          <a:latin typeface="Cambria Math" panose="02040503050406030204" pitchFamily="18" charset="0"/>
+                        </a:rPr>
+                        <m:t> </m:t>
+                      </m:r>
+                      <m:d>
+                        <m:dPr>
+                          <m:ctrlPr>
+                            <a:rPr lang="en-US" altLang="ja-JP" i="1">
+                              <a:latin typeface="Cambria Math" panose="02040503050406030204" pitchFamily="18" charset="0"/>
+                            </a:rPr>
+                          </m:ctrlPr>
+                        </m:dPr>
+                        <m:e>
+                          <m:sSub>
+                            <m:sSubPr>
+                              <m:ctrlPr>
+                                <a:rPr lang="en-US" altLang="ja-JP" i="1">
+                                  <a:latin typeface="Cambria Math" panose="02040503050406030204" pitchFamily="18" charset="0"/>
+                                </a:rPr>
+                              </m:ctrlPr>
+                            </m:sSubPr>
+                            <m:e>
+                              <m:r>
+                                <a:rPr lang="en-US" altLang="ja-JP" i="1">
+                                  <a:latin typeface="Cambria Math" panose="02040503050406030204" pitchFamily="18" charset="0"/>
+                                </a:rPr>
+                                <m:t>𝑥</m:t>
+                              </m:r>
+                            </m:e>
+                            <m:sub>
+                              <m:r>
+                                <a:rPr lang="en-US" altLang="ja-JP" b="0" i="1" smtClean="0">
+                                  <a:latin typeface="Cambria Math" panose="02040503050406030204" pitchFamily="18" charset="0"/>
+                                </a:rPr>
+                                <m:t>1</m:t>
+                              </m:r>
+                            </m:sub>
+                          </m:sSub>
+                          <m:r>
+                            <a:rPr lang="en-US" altLang="ja-JP" i="1">
+                              <a:latin typeface="Cambria Math" panose="02040503050406030204" pitchFamily="18" charset="0"/>
+                            </a:rPr>
+                            <m:t>,</m:t>
+                          </m:r>
+                          <m:sSub>
+                            <m:sSubPr>
+                              <m:ctrlPr>
+                                <a:rPr lang="en-US" altLang="ja-JP" i="1">
+                                  <a:latin typeface="Cambria Math" panose="02040503050406030204" pitchFamily="18" charset="0"/>
+                                </a:rPr>
+                              </m:ctrlPr>
+                            </m:sSubPr>
+                            <m:e>
+                              <m:r>
+                                <a:rPr lang="en-US" altLang="ja-JP" i="1">
+                                  <a:latin typeface="Cambria Math" panose="02040503050406030204" pitchFamily="18" charset="0"/>
+                                </a:rPr>
+                                <m:t>𝑦</m:t>
+                              </m:r>
+                            </m:e>
+                            <m:sub>
+                              <m:r>
+                                <a:rPr lang="en-US" altLang="ja-JP" b="0" i="1" smtClean="0">
+                                  <a:latin typeface="Cambria Math" panose="02040503050406030204" pitchFamily="18" charset="0"/>
+                                </a:rPr>
+                                <m:t>1</m:t>
+                              </m:r>
+                            </m:sub>
+                          </m:sSub>
+                          <m:r>
+                            <a:rPr lang="en-US" altLang="ja-JP" i="1">
+                              <a:latin typeface="Cambria Math" panose="02040503050406030204" pitchFamily="18" charset="0"/>
+                            </a:rPr>
+                            <m:t>, </m:t>
+                          </m:r>
+                          <m:sSub>
+                            <m:sSubPr>
+                              <m:ctrlPr>
+                                <a:rPr lang="en-US" altLang="ja-JP" i="1">
+                                  <a:latin typeface="Cambria Math" panose="02040503050406030204" pitchFamily="18" charset="0"/>
+                                </a:rPr>
+                              </m:ctrlPr>
+                            </m:sSubPr>
+                            <m:e>
+                              <m:r>
+                                <a:rPr lang="ja-JP" altLang="en-US" i="1">
+                                  <a:latin typeface="Cambria Math" panose="02040503050406030204" pitchFamily="18" charset="0"/>
+                                </a:rPr>
+                                <m:t>𝜃</m:t>
+                              </m:r>
+                            </m:e>
+                            <m:sub>
+                              <m:r>
+                                <a:rPr lang="en-US" altLang="ja-JP" b="0" i="1" smtClean="0">
+                                  <a:latin typeface="Cambria Math" panose="02040503050406030204" pitchFamily="18" charset="0"/>
+                                </a:rPr>
+                                <m:t>1</m:t>
+                              </m:r>
+                            </m:sub>
+                          </m:sSub>
+                        </m:e>
+                      </m:d>
+                      <m:r>
+                        <a:rPr lang="en-US" altLang="ja-JP" i="1" smtClean="0">
+                          <a:latin typeface="Cambria Math" panose="02040503050406030204" pitchFamily="18" charset="0"/>
+                          <a:ea typeface="Cambria Math" panose="02040503050406030204" pitchFamily="18" charset="0"/>
+                        </a:rPr>
+                        <m:t>⋯</m:t>
+                      </m:r>
+                      <m:d>
+                        <m:dPr>
+                          <m:ctrlPr>
+                            <a:rPr lang="en-US" altLang="ja-JP" i="1">
+                              <a:latin typeface="Cambria Math" panose="02040503050406030204" pitchFamily="18" charset="0"/>
+                            </a:rPr>
+                          </m:ctrlPr>
+                        </m:dPr>
+                        <m:e>
+                          <m:sSub>
+                            <m:sSubPr>
+                              <m:ctrlPr>
+                                <a:rPr lang="en-US" altLang="ja-JP" i="1">
+                                  <a:latin typeface="Cambria Math" panose="02040503050406030204" pitchFamily="18" charset="0"/>
+                                </a:rPr>
+                              </m:ctrlPr>
+                            </m:sSubPr>
+                            <m:e>
+                              <m:r>
+                                <a:rPr lang="en-US" altLang="ja-JP" i="1">
+                                  <a:latin typeface="Cambria Math" panose="02040503050406030204" pitchFamily="18" charset="0"/>
+                                </a:rPr>
+                                <m:t>𝑥</m:t>
+                              </m:r>
+                            </m:e>
+                            <m:sub>
+                              <m:r>
+                                <a:rPr lang="en-US" altLang="ja-JP" b="0" i="1" smtClean="0">
+                                  <a:latin typeface="Cambria Math" panose="02040503050406030204" pitchFamily="18" charset="0"/>
+                                </a:rPr>
+                                <m:t>𝑛</m:t>
+                              </m:r>
+                              <m:r>
+                                <a:rPr lang="en-US" altLang="ja-JP" b="0" i="1" smtClean="0">
+                                  <a:latin typeface="Cambria Math" panose="02040503050406030204" pitchFamily="18" charset="0"/>
+                                </a:rPr>
+                                <m:t>−1</m:t>
+                              </m:r>
+                            </m:sub>
+                          </m:sSub>
+                          <m:r>
+                            <a:rPr lang="en-US" altLang="ja-JP" i="1">
+                              <a:latin typeface="Cambria Math" panose="02040503050406030204" pitchFamily="18" charset="0"/>
+                            </a:rPr>
+                            <m:t>,</m:t>
+                          </m:r>
+                          <m:sSub>
+                            <m:sSubPr>
+                              <m:ctrlPr>
+                                <a:rPr lang="en-US" altLang="ja-JP" i="1">
+                                  <a:latin typeface="Cambria Math" panose="02040503050406030204" pitchFamily="18" charset="0"/>
+                                </a:rPr>
+                              </m:ctrlPr>
+                            </m:sSubPr>
+                            <m:e>
+                              <m:r>
+                                <a:rPr lang="en-US" altLang="ja-JP" i="1">
+                                  <a:latin typeface="Cambria Math" panose="02040503050406030204" pitchFamily="18" charset="0"/>
+                                </a:rPr>
+                                <m:t>𝑦</m:t>
+                              </m:r>
+                            </m:e>
+                            <m:sub>
+                              <m:r>
+                                <a:rPr lang="en-US" altLang="ja-JP" b="0" i="1" smtClean="0">
+                                  <a:latin typeface="Cambria Math" panose="02040503050406030204" pitchFamily="18" charset="0"/>
+                                </a:rPr>
+                                <m:t>𝑛</m:t>
+                              </m:r>
+                              <m:r>
+                                <a:rPr lang="en-US" altLang="ja-JP" b="0" i="1" smtClean="0">
+                                  <a:latin typeface="Cambria Math" panose="02040503050406030204" pitchFamily="18" charset="0"/>
+                                </a:rPr>
+                                <m:t>−1</m:t>
+                              </m:r>
+                            </m:sub>
+                          </m:sSub>
+                          <m:r>
+                            <a:rPr lang="en-US" altLang="ja-JP" i="1">
+                              <a:latin typeface="Cambria Math" panose="02040503050406030204" pitchFamily="18" charset="0"/>
+                            </a:rPr>
+                            <m:t>, </m:t>
+                          </m:r>
+                          <m:sSub>
+                            <m:sSubPr>
+                              <m:ctrlPr>
+                                <a:rPr lang="en-US" altLang="ja-JP" i="1">
+                                  <a:latin typeface="Cambria Math" panose="02040503050406030204" pitchFamily="18" charset="0"/>
+                                </a:rPr>
+                              </m:ctrlPr>
+                            </m:sSubPr>
+                            <m:e>
+                              <m:r>
+                                <a:rPr lang="ja-JP" altLang="en-US" i="1">
+                                  <a:latin typeface="Cambria Math" panose="02040503050406030204" pitchFamily="18" charset="0"/>
+                                </a:rPr>
+                                <m:t>𝜃</m:t>
+                              </m:r>
+                            </m:e>
+                            <m:sub>
+                              <m:r>
+                                <a:rPr lang="en-US" altLang="ja-JP" b="0" i="1" smtClean="0">
+                                  <a:latin typeface="Cambria Math" panose="02040503050406030204" pitchFamily="18" charset="0"/>
+                                </a:rPr>
+                                <m:t>𝑛</m:t>
+                              </m:r>
+                              <m:r>
+                                <a:rPr lang="en-US" altLang="ja-JP" b="0" i="1" smtClean="0">
+                                  <a:latin typeface="Cambria Math" panose="02040503050406030204" pitchFamily="18" charset="0"/>
+                                </a:rPr>
+                                <m:t>−1</m:t>
+                              </m:r>
+                            </m:sub>
+                          </m:sSub>
+                        </m:e>
+                      </m:d>
+                    </m:oMath>
+                  </m:oMathPara>
+                </a14:m>
+                <a:endParaRPr kumimoji="1" lang="ja-JP" altLang="en-US" dirty="0"/>
+              </a:p>
+            </p:txBody>
+          </p:sp>
+        </mc:Choice>
+        <mc:Fallback>
+          <p:sp>
+            <p:nvSpPr>
+              <p:cNvPr id="136" name="テキスト ボックス 135">
+                <a:extLst>
+                  <a:ext uri="{FF2B5EF4-FFF2-40B4-BE49-F238E27FC236}">
+                    <a16:creationId xmlns:a16="http://schemas.microsoft.com/office/drawing/2014/main" id="{96096E19-C0B5-4920-A352-ED57F76E10A8}"/>
+                  </a:ext>
+                </a:extLst>
+              </p:cNvPr>
+              <p:cNvSpPr txBox="1">
+                <a:spLocks noRot="1" noChangeAspect="1" noMove="1" noResize="1" noEditPoints="1" noAdjustHandles="1" noChangeArrowheads="1" noChangeShapeType="1" noTextEdit="1"/>
+              </p:cNvSpPr>
+              <p:nvPr/>
+            </p:nvSpPr>
+            <p:spPr>
+              <a:xfrm>
+                <a:off x="6255287" y="4710957"/>
+                <a:ext cx="4418389" cy="369332"/>
+              </a:xfrm>
+              <a:prstGeom prst="rect">
+                <a:avLst/>
+              </a:prstGeom>
+              <a:blipFill>
+                <a:blip r:embed="rId18"/>
+                <a:stretch>
+                  <a:fillRect b="-6667"/>
                 </a:stretch>
               </a:blipFill>
             </p:spPr>

</xml_diff>

<commit_message>
modified robot coordinate figure
</commit_message>
<xml_diff>
--- a/SLAM_Theoretical_Formulas.pptx
+++ b/SLAM_Theoretical_Formulas.pptx
@@ -259,7 +259,7 @@
           <a:p>
             <a:fld id="{9DDD97A9-1B44-463F-8EAF-3A848A7F5CA1}" type="datetimeFigureOut">
               <a:rPr kumimoji="1" lang="ja-JP" altLang="en-US" smtClean="0"/>
-              <a:t>2020/7/10</a:t>
+              <a:t>2020/7/11</a:t>
             </a:fld>
             <a:endParaRPr kumimoji="1" lang="ja-JP" altLang="en-US"/>
           </a:p>
@@ -489,7 +489,7 @@
           <a:p>
             <a:fld id="{9DDD97A9-1B44-463F-8EAF-3A848A7F5CA1}" type="datetimeFigureOut">
               <a:rPr kumimoji="1" lang="ja-JP" altLang="en-US" smtClean="0"/>
-              <a:t>2020/7/10</a:t>
+              <a:t>2020/7/11</a:t>
             </a:fld>
             <a:endParaRPr kumimoji="1" lang="ja-JP" altLang="en-US"/>
           </a:p>
@@ -729,7 +729,7 @@
           <a:p>
             <a:fld id="{9DDD97A9-1B44-463F-8EAF-3A848A7F5CA1}" type="datetimeFigureOut">
               <a:rPr kumimoji="1" lang="ja-JP" altLang="en-US" smtClean="0"/>
-              <a:t>2020/7/10</a:t>
+              <a:t>2020/7/11</a:t>
             </a:fld>
             <a:endParaRPr kumimoji="1" lang="ja-JP" altLang="en-US"/>
           </a:p>
@@ -959,7 +959,7 @@
           <a:p>
             <a:fld id="{9DDD97A9-1B44-463F-8EAF-3A848A7F5CA1}" type="datetimeFigureOut">
               <a:rPr kumimoji="1" lang="ja-JP" altLang="en-US" smtClean="0"/>
-              <a:t>2020/7/10</a:t>
+              <a:t>2020/7/11</a:t>
             </a:fld>
             <a:endParaRPr kumimoji="1" lang="ja-JP" altLang="en-US"/>
           </a:p>
@@ -1234,7 +1234,7 @@
           <a:p>
             <a:fld id="{9DDD97A9-1B44-463F-8EAF-3A848A7F5CA1}" type="datetimeFigureOut">
               <a:rPr kumimoji="1" lang="ja-JP" altLang="en-US" smtClean="0"/>
-              <a:t>2020/7/10</a:t>
+              <a:t>2020/7/11</a:t>
             </a:fld>
             <a:endParaRPr kumimoji="1" lang="ja-JP" altLang="en-US"/>
           </a:p>
@@ -1563,7 +1563,7 @@
           <a:p>
             <a:fld id="{9DDD97A9-1B44-463F-8EAF-3A848A7F5CA1}" type="datetimeFigureOut">
               <a:rPr kumimoji="1" lang="ja-JP" altLang="en-US" smtClean="0"/>
-              <a:t>2020/7/10</a:t>
+              <a:t>2020/7/11</a:t>
             </a:fld>
             <a:endParaRPr kumimoji="1" lang="ja-JP" altLang="en-US"/>
           </a:p>
@@ -2039,7 +2039,7 @@
           <a:p>
             <a:fld id="{9DDD97A9-1B44-463F-8EAF-3A848A7F5CA1}" type="datetimeFigureOut">
               <a:rPr kumimoji="1" lang="ja-JP" altLang="en-US" smtClean="0"/>
-              <a:t>2020/7/10</a:t>
+              <a:t>2020/7/11</a:t>
             </a:fld>
             <a:endParaRPr kumimoji="1" lang="ja-JP" altLang="en-US"/>
           </a:p>
@@ -2180,7 +2180,7 @@
           <a:p>
             <a:fld id="{9DDD97A9-1B44-463F-8EAF-3A848A7F5CA1}" type="datetimeFigureOut">
               <a:rPr kumimoji="1" lang="ja-JP" altLang="en-US" smtClean="0"/>
-              <a:t>2020/7/10</a:t>
+              <a:t>2020/7/11</a:t>
             </a:fld>
             <a:endParaRPr kumimoji="1" lang="ja-JP" altLang="en-US"/>
           </a:p>
@@ -2293,7 +2293,7 @@
           <a:p>
             <a:fld id="{9DDD97A9-1B44-463F-8EAF-3A848A7F5CA1}" type="datetimeFigureOut">
               <a:rPr kumimoji="1" lang="ja-JP" altLang="en-US" smtClean="0"/>
-              <a:t>2020/7/10</a:t>
+              <a:t>2020/7/11</a:t>
             </a:fld>
             <a:endParaRPr kumimoji="1" lang="ja-JP" altLang="en-US"/>
           </a:p>
@@ -2636,7 +2636,7 @@
           <a:p>
             <a:fld id="{9DDD97A9-1B44-463F-8EAF-3A848A7F5CA1}" type="datetimeFigureOut">
               <a:rPr kumimoji="1" lang="ja-JP" altLang="en-US" smtClean="0"/>
-              <a:t>2020/7/10</a:t>
+              <a:t>2020/7/11</a:t>
             </a:fld>
             <a:endParaRPr kumimoji="1" lang="ja-JP" altLang="en-US"/>
           </a:p>
@@ -2924,7 +2924,7 @@
           <a:p>
             <a:fld id="{9DDD97A9-1B44-463F-8EAF-3A848A7F5CA1}" type="datetimeFigureOut">
               <a:rPr kumimoji="1" lang="ja-JP" altLang="en-US" smtClean="0"/>
-              <a:t>2020/7/10</a:t>
+              <a:t>2020/7/11</a:t>
             </a:fld>
             <a:endParaRPr kumimoji="1" lang="ja-JP" altLang="en-US"/>
           </a:p>
@@ -3197,7 +3197,7 @@
           <a:p>
             <a:fld id="{9DDD97A9-1B44-463F-8EAF-3A848A7F5CA1}" type="datetimeFigureOut">
               <a:rPr kumimoji="1" lang="ja-JP" altLang="en-US" smtClean="0"/>
-              <a:t>2020/7/10</a:t>
+              <a:t>2020/7/11</a:t>
             </a:fld>
             <a:endParaRPr kumimoji="1" lang="ja-JP" altLang="en-US"/>
           </a:p>
@@ -7735,8 +7735,8 @@
           </p:sp>
         </mc:Fallback>
       </mc:AlternateContent>
-      <mc:AlternateContent xmlns:mc="http://schemas.openxmlformats.org/markup-compatibility/2006">
-        <mc:Choice xmlns:a14="http://schemas.microsoft.com/office/drawing/2010/main" Requires="a14">
+      <mc:AlternateContent xmlns:mc="http://schemas.openxmlformats.org/markup-compatibility/2006" xmlns:a14="http://schemas.microsoft.com/office/drawing/2010/main">
+        <mc:Choice Requires="a14">
           <p:sp>
             <p:nvSpPr>
               <p:cNvPr id="79" name="テキスト ボックス 78">
@@ -7786,7 +7786,7 @@
             </p:txBody>
           </p:sp>
         </mc:Choice>
-        <mc:Fallback>
+        <mc:Fallback xmlns="">
           <p:sp>
             <p:nvSpPr>
               <p:cNvPr id="79" name="テキスト ボックス 78">
@@ -7831,8 +7831,8 @@
           </p:sp>
         </mc:Fallback>
       </mc:AlternateContent>
-      <mc:AlternateContent xmlns:mc="http://schemas.openxmlformats.org/markup-compatibility/2006">
-        <mc:Choice xmlns:a14="http://schemas.microsoft.com/office/drawing/2010/main" Requires="a14">
+      <mc:AlternateContent xmlns:mc="http://schemas.openxmlformats.org/markup-compatibility/2006" xmlns:a14="http://schemas.microsoft.com/office/drawing/2010/main">
+        <mc:Choice Requires="a14">
           <p:sp>
             <p:nvSpPr>
               <p:cNvPr id="82" name="テキスト ボックス 81">
@@ -7882,7 +7882,7 @@
             </p:txBody>
           </p:sp>
         </mc:Choice>
-        <mc:Fallback>
+        <mc:Fallback xmlns="">
           <p:sp>
             <p:nvSpPr>
               <p:cNvPr id="82" name="テキスト ボックス 81">
@@ -8035,8 +8035,8 @@
             </a:fontRef>
           </p:style>
         </p:cxnSp>
-        <mc:AlternateContent xmlns:mc="http://schemas.openxmlformats.org/markup-compatibility/2006">
-          <mc:Choice xmlns:a14="http://schemas.microsoft.com/office/drawing/2010/main" Requires="a14">
+        <mc:AlternateContent xmlns:mc="http://schemas.openxmlformats.org/markup-compatibility/2006" xmlns:a14="http://schemas.microsoft.com/office/drawing/2010/main">
+          <mc:Choice Requires="a14">
             <p:sp>
               <p:nvSpPr>
                 <p:cNvPr id="100" name="テキスト ボックス 99">
@@ -8086,7 +8086,7 @@
               </p:txBody>
             </p:sp>
           </mc:Choice>
-          <mc:Fallback>
+          <mc:Fallback xmlns="">
             <p:sp>
               <p:nvSpPr>
                 <p:cNvPr id="100" name="テキスト ボックス 99">
@@ -8132,8 +8132,8 @@
           </mc:Fallback>
         </mc:AlternateContent>
       </p:grpSp>
-      <mc:AlternateContent xmlns:mc="http://schemas.openxmlformats.org/markup-compatibility/2006">
-        <mc:Choice xmlns:a14="http://schemas.microsoft.com/office/drawing/2010/main" Requires="a14">
+      <mc:AlternateContent xmlns:mc="http://schemas.openxmlformats.org/markup-compatibility/2006" xmlns:a14="http://schemas.microsoft.com/office/drawing/2010/main">
+        <mc:Choice Requires="a14">
           <p:sp>
             <p:nvSpPr>
               <p:cNvPr id="83" name="テキスト ボックス 82">
@@ -8183,7 +8183,7 @@
             </p:txBody>
           </p:sp>
         </mc:Choice>
-        <mc:Fallback>
+        <mc:Fallback xmlns="">
           <p:sp>
             <p:nvSpPr>
               <p:cNvPr id="83" name="テキスト ボックス 82">
@@ -8228,8 +8228,8 @@
           </p:sp>
         </mc:Fallback>
       </mc:AlternateContent>
-      <mc:AlternateContent xmlns:mc="http://schemas.openxmlformats.org/markup-compatibility/2006">
-        <mc:Choice xmlns:a14="http://schemas.microsoft.com/office/drawing/2010/main" Requires="a14">
+      <mc:AlternateContent xmlns:mc="http://schemas.openxmlformats.org/markup-compatibility/2006" xmlns:a14="http://schemas.microsoft.com/office/drawing/2010/main">
+        <mc:Choice Requires="a14">
           <p:sp>
             <p:nvSpPr>
               <p:cNvPr id="90" name="テキスト ボックス 89">
@@ -8279,7 +8279,7 @@
             </p:txBody>
           </p:sp>
         </mc:Choice>
-        <mc:Fallback>
+        <mc:Fallback xmlns="">
           <p:sp>
             <p:nvSpPr>
               <p:cNvPr id="90" name="テキスト ボックス 89">
@@ -8365,8 +8365,8 @@
           </a:fontRef>
         </p:style>
       </p:cxnSp>
-      <mc:AlternateContent xmlns:mc="http://schemas.openxmlformats.org/markup-compatibility/2006">
-        <mc:Choice xmlns:a14="http://schemas.microsoft.com/office/drawing/2010/main" Requires="a14">
+      <mc:AlternateContent xmlns:mc="http://schemas.openxmlformats.org/markup-compatibility/2006" xmlns:a14="http://schemas.microsoft.com/office/drawing/2010/main">
+        <mc:Choice Requires="a14">
           <p:sp>
             <p:nvSpPr>
               <p:cNvPr id="107" name="テキスト ボックス 106">
@@ -8435,7 +8435,7 @@
             </p:txBody>
           </p:sp>
         </mc:Choice>
-        <mc:Fallback>
+        <mc:Fallback xmlns="">
           <p:sp>
             <p:nvSpPr>
               <p:cNvPr id="107" name="テキスト ボックス 106">
@@ -8527,8 +8527,8 @@
           </a:p>
         </p:txBody>
       </p:sp>
-      <mc:AlternateContent xmlns:mc="http://schemas.openxmlformats.org/markup-compatibility/2006">
-        <mc:Choice xmlns:a14="http://schemas.microsoft.com/office/drawing/2010/main" Requires="a14">
+      <mc:AlternateContent xmlns:mc="http://schemas.openxmlformats.org/markup-compatibility/2006" xmlns:a14="http://schemas.microsoft.com/office/drawing/2010/main">
+        <mc:Choice Requires="a14">
           <p:sp>
             <p:nvSpPr>
               <p:cNvPr id="111" name="テキスト ボックス 110">
@@ -8597,7 +8597,7 @@
             </p:txBody>
           </p:sp>
         </mc:Choice>
-        <mc:Fallback>
+        <mc:Fallback xmlns="">
           <p:sp>
             <p:nvSpPr>
               <p:cNvPr id="111" name="テキスト ボックス 110">
@@ -8898,8 +8898,8 @@
           </mc:Fallback>
         </mc:AlternateContent>
       </p:grpSp>
-      <mc:AlternateContent xmlns:mc="http://schemas.openxmlformats.org/markup-compatibility/2006">
-        <mc:Choice xmlns:a14="http://schemas.microsoft.com/office/drawing/2010/main" Requires="a14">
+      <mc:AlternateContent xmlns:mc="http://schemas.openxmlformats.org/markup-compatibility/2006" xmlns:a14="http://schemas.microsoft.com/office/drawing/2010/main">
+        <mc:Choice Requires="a14">
           <p:sp>
             <p:nvSpPr>
               <p:cNvPr id="122" name="テキスト ボックス 121">
@@ -8949,7 +8949,7 @@
             </p:txBody>
           </p:sp>
         </mc:Choice>
-        <mc:Fallback>
+        <mc:Fallback xmlns="">
           <p:sp>
             <p:nvSpPr>
               <p:cNvPr id="122" name="テキスト ボックス 121">
@@ -8994,8 +8994,8 @@
           </p:sp>
         </mc:Fallback>
       </mc:AlternateContent>
-      <mc:AlternateContent xmlns:mc="http://schemas.openxmlformats.org/markup-compatibility/2006">
-        <mc:Choice xmlns:a14="http://schemas.microsoft.com/office/drawing/2010/main" Requires="a14">
+      <mc:AlternateContent xmlns:mc="http://schemas.openxmlformats.org/markup-compatibility/2006" xmlns:a14="http://schemas.microsoft.com/office/drawing/2010/main">
+        <mc:Choice Requires="a14">
           <p:sp>
             <p:nvSpPr>
               <p:cNvPr id="123" name="テキスト ボックス 122">
@@ -9045,7 +9045,7 @@
             </p:txBody>
           </p:sp>
         </mc:Choice>
-        <mc:Fallback>
+        <mc:Fallback xmlns="">
           <p:sp>
             <p:nvSpPr>
               <p:cNvPr id="123" name="テキスト ボックス 122">
@@ -9131,8 +9131,8 @@
           </a:fontRef>
         </p:style>
       </p:cxnSp>
-      <mc:AlternateContent xmlns:mc="http://schemas.openxmlformats.org/markup-compatibility/2006">
-        <mc:Choice xmlns:a14="http://schemas.microsoft.com/office/drawing/2010/main" Requires="a14">
+      <mc:AlternateContent xmlns:mc="http://schemas.openxmlformats.org/markup-compatibility/2006" xmlns:a14="http://schemas.microsoft.com/office/drawing/2010/main">
+        <mc:Choice Requires="a14">
           <p:sp>
             <p:nvSpPr>
               <p:cNvPr id="126" name="テキスト ボックス 125">
@@ -9201,7 +9201,7 @@
             </p:txBody>
           </p:sp>
         </mc:Choice>
-        <mc:Fallback>
+        <mc:Fallback xmlns="">
           <p:sp>
             <p:nvSpPr>
               <p:cNvPr id="126" name="テキスト ボックス 125">
@@ -9293,8 +9293,8 @@
           </a:p>
         </p:txBody>
       </p:sp>
-      <mc:AlternateContent xmlns:mc="http://schemas.openxmlformats.org/markup-compatibility/2006">
-        <mc:Choice xmlns:a14="http://schemas.microsoft.com/office/drawing/2010/main" Requires="a14">
+      <mc:AlternateContent xmlns:mc="http://schemas.openxmlformats.org/markup-compatibility/2006" xmlns:a14="http://schemas.microsoft.com/office/drawing/2010/main">
+        <mc:Choice Requires="a14">
           <p:sp>
             <p:nvSpPr>
               <p:cNvPr id="130" name="テキスト ボックス 129">
@@ -9363,7 +9363,7 @@
             </p:txBody>
           </p:sp>
         </mc:Choice>
-        <mc:Fallback>
+        <mc:Fallback xmlns="">
           <p:sp>
             <p:nvSpPr>
               <p:cNvPr id="130" name="テキスト ボックス 129">
@@ -9459,8 +9459,8 @@
           </a:p>
         </p:txBody>
       </p:sp>
-      <mc:AlternateContent xmlns:mc="http://schemas.openxmlformats.org/markup-compatibility/2006">
-        <mc:Choice xmlns:a14="http://schemas.microsoft.com/office/drawing/2010/main" Requires="a14">
+      <mc:AlternateContent xmlns:mc="http://schemas.openxmlformats.org/markup-compatibility/2006" xmlns:a14="http://schemas.microsoft.com/office/drawing/2010/main">
+        <mc:Choice Requires="a14">
           <p:sp>
             <p:nvSpPr>
               <p:cNvPr id="134" name="テキスト ボックス 133">
@@ -9744,7 +9744,7 @@
             </p:txBody>
           </p:sp>
         </mc:Choice>
-        <mc:Fallback>
+        <mc:Fallback xmlns="">
           <p:sp>
             <p:nvSpPr>
               <p:cNvPr id="134" name="テキスト ボックス 133">
@@ -9789,8 +9789,8 @@
           </p:sp>
         </mc:Fallback>
       </mc:AlternateContent>
-      <mc:AlternateContent xmlns:mc="http://schemas.openxmlformats.org/markup-compatibility/2006">
-        <mc:Choice xmlns:a14="http://schemas.microsoft.com/office/drawing/2010/main" Requires="a14">
+      <mc:AlternateContent xmlns:mc="http://schemas.openxmlformats.org/markup-compatibility/2006" xmlns:a14="http://schemas.microsoft.com/office/drawing/2010/main">
+        <mc:Choice Requires="a14">
           <p:sp>
             <p:nvSpPr>
               <p:cNvPr id="136" name="テキスト ボックス 135">
@@ -10159,7 +10159,7 @@
             </p:txBody>
           </p:sp>
         </mc:Choice>
-        <mc:Fallback>
+        <mc:Fallback xmlns="">
           <p:sp>
             <p:nvSpPr>
               <p:cNvPr id="136" name="テキスト ボックス 135">
@@ -10204,6 +10204,140 @@
           </p:sp>
         </mc:Fallback>
       </mc:AlternateContent>
+      <p:sp>
+        <p:nvSpPr>
+          <p:cNvPr id="92" name="矢印: 上 91">
+            <a:extLst>
+              <a:ext uri="{FF2B5EF4-FFF2-40B4-BE49-F238E27FC236}">
+                <a16:creationId xmlns:a16="http://schemas.microsoft.com/office/drawing/2014/main" id="{96BA802B-ECDA-4939-9BD9-5CA8E37126FF}"/>
+              </a:ext>
+            </a:extLst>
+          </p:cNvPr>
+          <p:cNvSpPr/>
+          <p:nvPr/>
+        </p:nvSpPr>
+        <p:spPr>
+          <a:xfrm>
+            <a:off x="7643988" y="1297171"/>
+            <a:ext cx="238059" cy="375099"/>
+          </a:xfrm>
+          <a:prstGeom prst="upArrow">
+            <a:avLst/>
+          </a:prstGeom>
+        </p:spPr>
+        <p:style>
+          <a:lnRef idx="2">
+            <a:schemeClr val="accent1">
+              <a:shade val="50000"/>
+            </a:schemeClr>
+          </a:lnRef>
+          <a:fillRef idx="1">
+            <a:schemeClr val="accent1"/>
+          </a:fillRef>
+          <a:effectRef idx="0">
+            <a:schemeClr val="accent1"/>
+          </a:effectRef>
+          <a:fontRef idx="minor">
+            <a:schemeClr val="lt1"/>
+          </a:fontRef>
+        </p:style>
+        <p:txBody>
+          <a:bodyPr rtlCol="0" anchor="ctr"/>
+          <a:lstStyle/>
+          <a:p>
+            <a:pPr algn="ctr"/>
+            <a:endParaRPr kumimoji="1" lang="ja-JP" altLang="en-US"/>
+          </a:p>
+        </p:txBody>
+      </p:sp>
+      <p:sp>
+        <p:nvSpPr>
+          <p:cNvPr id="93" name="テキスト ボックス 92">
+            <a:extLst>
+              <a:ext uri="{FF2B5EF4-FFF2-40B4-BE49-F238E27FC236}">
+                <a16:creationId xmlns:a16="http://schemas.microsoft.com/office/drawing/2014/main" id="{CFA65C5A-D8BB-43A2-A1B4-9F41E64BF6AD}"/>
+              </a:ext>
+            </a:extLst>
+          </p:cNvPr>
+          <p:cNvSpPr txBox="1"/>
+          <p:nvPr/>
+        </p:nvSpPr>
+        <p:spPr>
+          <a:xfrm>
+            <a:off x="7319503" y="1043008"/>
+            <a:ext cx="870751" cy="307777"/>
+          </a:xfrm>
+          <a:prstGeom prst="rect">
+            <a:avLst/>
+          </a:prstGeom>
+          <a:noFill/>
+        </p:spPr>
+        <p:txBody>
+          <a:bodyPr wrap="none" rtlCol="0">
+            <a:spAutoFit/>
+          </a:bodyPr>
+          <a:lstStyle/>
+          <a:p>
+            <a:pPr algn="ctr"/>
+            <a:r>
+              <a:rPr kumimoji="1" lang="en-US" altLang="ja-JP" sz="1400" dirty="0"/>
+              <a:t>Forward</a:t>
+            </a:r>
+            <a:endParaRPr kumimoji="1" lang="ja-JP" altLang="en-US" sz="1400" dirty="0"/>
+          </a:p>
+        </p:txBody>
+      </p:sp>
+      <p:sp>
+        <p:nvSpPr>
+          <p:cNvPr id="101" name="円弧 100">
+            <a:extLst>
+              <a:ext uri="{FF2B5EF4-FFF2-40B4-BE49-F238E27FC236}">
+                <a16:creationId xmlns:a16="http://schemas.microsoft.com/office/drawing/2014/main" id="{A3830B22-CB03-48D5-AC2A-ABFB344C1D94}"/>
+              </a:ext>
+            </a:extLst>
+          </p:cNvPr>
+          <p:cNvSpPr/>
+          <p:nvPr/>
+        </p:nvSpPr>
+        <p:spPr>
+          <a:xfrm rot="12838177" flipV="1">
+            <a:off x="8374180" y="1936857"/>
+            <a:ext cx="417096" cy="408665"/>
+          </a:xfrm>
+          <a:prstGeom prst="arc">
+            <a:avLst>
+              <a:gd name="adj1" fmla="val 17551539"/>
+              <a:gd name="adj2" fmla="val 2432450"/>
+            </a:avLst>
+          </a:prstGeom>
+          <a:ln>
+            <a:prstDash val="dash"/>
+            <a:tailEnd type="triangle"/>
+          </a:ln>
+        </p:spPr>
+        <p:style>
+          <a:lnRef idx="1">
+            <a:schemeClr val="accent1"/>
+          </a:lnRef>
+          <a:fillRef idx="0">
+            <a:schemeClr val="accent1"/>
+          </a:fillRef>
+          <a:effectRef idx="0">
+            <a:schemeClr val="accent1"/>
+          </a:effectRef>
+          <a:fontRef idx="minor">
+            <a:schemeClr val="tx1"/>
+          </a:fontRef>
+        </p:style>
+        <p:txBody>
+          <a:bodyPr rtlCol="0" anchor="ctr"/>
+          <a:lstStyle/>
+          <a:p>
+            <a:pPr algn="ctr"/>
+            <a:endParaRPr kumimoji="1" lang="ja-JP" altLang="en-US"/>
+          </a:p>
+        </p:txBody>
+      </p:sp>
     </p:spTree>
     <p:extLst>
       <p:ext uri="{BB962C8B-B14F-4D97-AF65-F5344CB8AC3E}">

</xml_diff>

<commit_message>
add flow diagram of scan matching
</commit_message>
<xml_diff>
--- a/SLAM_Theoretical_Formulas.pptx
+++ b/SLAM_Theoretical_Formulas.pptx
@@ -6,6 +6,7 @@
   </p:sldMasterIdLst>
   <p:sldIdLst>
     <p:sldId id="256" r:id="rId2"/>
+    <p:sldId id="257" r:id="rId3"/>
   </p:sldIdLst>
   <p:sldSz cx="12192000" cy="6858000"/>
   <p:notesSz cx="6858000" cy="9144000"/>
@@ -259,7 +260,7 @@
           <a:p>
             <a:fld id="{9DDD97A9-1B44-463F-8EAF-3A848A7F5CA1}" type="datetimeFigureOut">
               <a:rPr kumimoji="1" lang="ja-JP" altLang="en-US" smtClean="0"/>
-              <a:t>2020/7/11</a:t>
+              <a:t>2020/7/12</a:t>
             </a:fld>
             <a:endParaRPr kumimoji="1" lang="ja-JP" altLang="en-US"/>
           </a:p>
@@ -489,7 +490,7 @@
           <a:p>
             <a:fld id="{9DDD97A9-1B44-463F-8EAF-3A848A7F5CA1}" type="datetimeFigureOut">
               <a:rPr kumimoji="1" lang="ja-JP" altLang="en-US" smtClean="0"/>
-              <a:t>2020/7/11</a:t>
+              <a:t>2020/7/12</a:t>
             </a:fld>
             <a:endParaRPr kumimoji="1" lang="ja-JP" altLang="en-US"/>
           </a:p>
@@ -729,7 +730,7 @@
           <a:p>
             <a:fld id="{9DDD97A9-1B44-463F-8EAF-3A848A7F5CA1}" type="datetimeFigureOut">
               <a:rPr kumimoji="1" lang="ja-JP" altLang="en-US" smtClean="0"/>
-              <a:t>2020/7/11</a:t>
+              <a:t>2020/7/12</a:t>
             </a:fld>
             <a:endParaRPr kumimoji="1" lang="ja-JP" altLang="en-US"/>
           </a:p>
@@ -959,7 +960,7 @@
           <a:p>
             <a:fld id="{9DDD97A9-1B44-463F-8EAF-3A848A7F5CA1}" type="datetimeFigureOut">
               <a:rPr kumimoji="1" lang="ja-JP" altLang="en-US" smtClean="0"/>
-              <a:t>2020/7/11</a:t>
+              <a:t>2020/7/12</a:t>
             </a:fld>
             <a:endParaRPr kumimoji="1" lang="ja-JP" altLang="en-US"/>
           </a:p>
@@ -1234,7 +1235,7 @@
           <a:p>
             <a:fld id="{9DDD97A9-1B44-463F-8EAF-3A848A7F5CA1}" type="datetimeFigureOut">
               <a:rPr kumimoji="1" lang="ja-JP" altLang="en-US" smtClean="0"/>
-              <a:t>2020/7/11</a:t>
+              <a:t>2020/7/12</a:t>
             </a:fld>
             <a:endParaRPr kumimoji="1" lang="ja-JP" altLang="en-US"/>
           </a:p>
@@ -1563,7 +1564,7 @@
           <a:p>
             <a:fld id="{9DDD97A9-1B44-463F-8EAF-3A848A7F5CA1}" type="datetimeFigureOut">
               <a:rPr kumimoji="1" lang="ja-JP" altLang="en-US" smtClean="0"/>
-              <a:t>2020/7/11</a:t>
+              <a:t>2020/7/12</a:t>
             </a:fld>
             <a:endParaRPr kumimoji="1" lang="ja-JP" altLang="en-US"/>
           </a:p>
@@ -2039,7 +2040,7 @@
           <a:p>
             <a:fld id="{9DDD97A9-1B44-463F-8EAF-3A848A7F5CA1}" type="datetimeFigureOut">
               <a:rPr kumimoji="1" lang="ja-JP" altLang="en-US" smtClean="0"/>
-              <a:t>2020/7/11</a:t>
+              <a:t>2020/7/12</a:t>
             </a:fld>
             <a:endParaRPr kumimoji="1" lang="ja-JP" altLang="en-US"/>
           </a:p>
@@ -2180,7 +2181,7 @@
           <a:p>
             <a:fld id="{9DDD97A9-1B44-463F-8EAF-3A848A7F5CA1}" type="datetimeFigureOut">
               <a:rPr kumimoji="1" lang="ja-JP" altLang="en-US" smtClean="0"/>
-              <a:t>2020/7/11</a:t>
+              <a:t>2020/7/12</a:t>
             </a:fld>
             <a:endParaRPr kumimoji="1" lang="ja-JP" altLang="en-US"/>
           </a:p>
@@ -2293,7 +2294,7 @@
           <a:p>
             <a:fld id="{9DDD97A9-1B44-463F-8EAF-3A848A7F5CA1}" type="datetimeFigureOut">
               <a:rPr kumimoji="1" lang="ja-JP" altLang="en-US" smtClean="0"/>
-              <a:t>2020/7/11</a:t>
+              <a:t>2020/7/12</a:t>
             </a:fld>
             <a:endParaRPr kumimoji="1" lang="ja-JP" altLang="en-US"/>
           </a:p>
@@ -2636,7 +2637,7 @@
           <a:p>
             <a:fld id="{9DDD97A9-1B44-463F-8EAF-3A848A7F5CA1}" type="datetimeFigureOut">
               <a:rPr kumimoji="1" lang="ja-JP" altLang="en-US" smtClean="0"/>
-              <a:t>2020/7/11</a:t>
+              <a:t>2020/7/12</a:t>
             </a:fld>
             <a:endParaRPr kumimoji="1" lang="ja-JP" altLang="en-US"/>
           </a:p>
@@ -2924,7 +2925,7 @@
           <a:p>
             <a:fld id="{9DDD97A9-1B44-463F-8EAF-3A848A7F5CA1}" type="datetimeFigureOut">
               <a:rPr kumimoji="1" lang="ja-JP" altLang="en-US" smtClean="0"/>
-              <a:t>2020/7/11</a:t>
+              <a:t>2020/7/12</a:t>
             </a:fld>
             <a:endParaRPr kumimoji="1" lang="ja-JP" altLang="en-US"/>
           </a:p>
@@ -3197,7 +3198,7 @@
           <a:p>
             <a:fld id="{9DDD97A9-1B44-463F-8EAF-3A848A7F5CA1}" type="datetimeFigureOut">
               <a:rPr kumimoji="1" lang="ja-JP" altLang="en-US" smtClean="0"/>
-              <a:t>2020/7/11</a:t>
+              <a:t>2020/7/12</a:t>
             </a:fld>
             <a:endParaRPr kumimoji="1" lang="ja-JP" altLang="en-US"/>
           </a:p>
@@ -10351,6 +10352,703 @@
 </p:sld>
 </file>
 
+<file path=ppt/slides/slide2.xml><?xml version="1.0" encoding="utf-8"?>
+<p:sld xmlns:a="http://schemas.openxmlformats.org/drawingml/2006/main" xmlns:r="http://schemas.openxmlformats.org/officeDocument/2006/relationships" xmlns:p="http://schemas.openxmlformats.org/presentationml/2006/main">
+  <p:cSld>
+    <p:spTree>
+      <p:nvGrpSpPr>
+        <p:cNvPr id="1" name=""/>
+        <p:cNvGrpSpPr/>
+        <p:nvPr/>
+      </p:nvGrpSpPr>
+      <p:grpSpPr>
+        <a:xfrm>
+          <a:off x="0" y="0"/>
+          <a:ext cx="0" cy="0"/>
+          <a:chOff x="0" y="0"/>
+          <a:chExt cx="0" cy="0"/>
+        </a:xfrm>
+      </p:grpSpPr>
+      <p:sp>
+        <p:nvSpPr>
+          <p:cNvPr id="2" name="正方形/長方形 1">
+            <a:extLst>
+              <a:ext uri="{FF2B5EF4-FFF2-40B4-BE49-F238E27FC236}">
+                <a16:creationId xmlns:a16="http://schemas.microsoft.com/office/drawing/2014/main" id="{4DEB8DCA-F3B7-4208-AC9F-1792887EE6AB}"/>
+              </a:ext>
+            </a:extLst>
+          </p:cNvPr>
+          <p:cNvSpPr/>
+          <p:nvPr/>
+        </p:nvSpPr>
+        <p:spPr>
+          <a:xfrm>
+            <a:off x="239698" y="2467992"/>
+            <a:ext cx="1376039" cy="594804"/>
+          </a:xfrm>
+          <a:prstGeom prst="rect">
+            <a:avLst/>
+          </a:prstGeom>
+        </p:spPr>
+        <p:style>
+          <a:lnRef idx="2">
+            <a:schemeClr val="accent1">
+              <a:shade val="50000"/>
+            </a:schemeClr>
+          </a:lnRef>
+          <a:fillRef idx="1">
+            <a:schemeClr val="accent1"/>
+          </a:fillRef>
+          <a:effectRef idx="0">
+            <a:schemeClr val="accent1"/>
+          </a:effectRef>
+          <a:fontRef idx="minor">
+            <a:schemeClr val="lt1"/>
+          </a:fontRef>
+        </p:style>
+        <p:txBody>
+          <a:bodyPr rtlCol="0" anchor="ctr"/>
+          <a:lstStyle/>
+          <a:p>
+            <a:pPr algn="ctr"/>
+            <a:r>
+              <a:rPr kumimoji="1" lang="en-US" altLang="ja-JP" sz="1400" dirty="0"/>
+              <a:t>Preprocessing</a:t>
+            </a:r>
+          </a:p>
+          <a:p>
+            <a:pPr algn="ctr"/>
+            <a:r>
+              <a:rPr kumimoji="1" lang="en-US" altLang="ja-JP" sz="1400" dirty="0"/>
+              <a:t>Scan data</a:t>
+            </a:r>
+          </a:p>
+        </p:txBody>
+      </p:sp>
+      <p:sp>
+        <p:nvSpPr>
+          <p:cNvPr id="4" name="正方形/長方形 3">
+            <a:extLst>
+              <a:ext uri="{FF2B5EF4-FFF2-40B4-BE49-F238E27FC236}">
+                <a16:creationId xmlns:a16="http://schemas.microsoft.com/office/drawing/2014/main" id="{1A5612F9-5966-4530-A453-E12A01A309BB}"/>
+              </a:ext>
+            </a:extLst>
+          </p:cNvPr>
+          <p:cNvSpPr/>
+          <p:nvPr/>
+        </p:nvSpPr>
+        <p:spPr>
+          <a:xfrm>
+            <a:off x="2531618" y="2469471"/>
+            <a:ext cx="1507723" cy="594804"/>
+          </a:xfrm>
+          <a:prstGeom prst="rect">
+            <a:avLst/>
+          </a:prstGeom>
+        </p:spPr>
+        <p:style>
+          <a:lnRef idx="2">
+            <a:schemeClr val="accent1">
+              <a:shade val="50000"/>
+            </a:schemeClr>
+          </a:lnRef>
+          <a:fillRef idx="1">
+            <a:schemeClr val="accent1"/>
+          </a:fillRef>
+          <a:effectRef idx="0">
+            <a:schemeClr val="accent1"/>
+          </a:effectRef>
+          <a:fontRef idx="minor">
+            <a:schemeClr val="lt1"/>
+          </a:fontRef>
+        </p:style>
+        <p:txBody>
+          <a:bodyPr rtlCol="0" anchor="ctr"/>
+          <a:lstStyle/>
+          <a:p>
+            <a:pPr algn="ctr"/>
+            <a:r>
+              <a:rPr lang="en-US" altLang="ja-JP" sz="1400" dirty="0"/>
+              <a:t>Making</a:t>
+            </a:r>
+          </a:p>
+          <a:p>
+            <a:pPr algn="ctr"/>
+            <a:r>
+              <a:rPr kumimoji="1" lang="en-US" altLang="ja-JP" sz="1400" dirty="0"/>
+              <a:t>Reference Scan</a:t>
+            </a:r>
+          </a:p>
+        </p:txBody>
+      </p:sp>
+      <p:sp>
+        <p:nvSpPr>
+          <p:cNvPr id="6" name="正方形/長方形 5">
+            <a:extLst>
+              <a:ext uri="{FF2B5EF4-FFF2-40B4-BE49-F238E27FC236}">
+                <a16:creationId xmlns:a16="http://schemas.microsoft.com/office/drawing/2014/main" id="{75C1CBAE-1FB5-4315-A2EB-5EE1A40B6595}"/>
+              </a:ext>
+            </a:extLst>
+          </p:cNvPr>
+          <p:cNvSpPr/>
+          <p:nvPr/>
+        </p:nvSpPr>
+        <p:spPr>
+          <a:xfrm>
+            <a:off x="4876806" y="2470946"/>
+            <a:ext cx="1275419" cy="594804"/>
+          </a:xfrm>
+          <a:prstGeom prst="rect">
+            <a:avLst/>
+          </a:prstGeom>
+        </p:spPr>
+        <p:style>
+          <a:lnRef idx="2">
+            <a:schemeClr val="accent1">
+              <a:shade val="50000"/>
+            </a:schemeClr>
+          </a:lnRef>
+          <a:fillRef idx="1">
+            <a:schemeClr val="accent1"/>
+          </a:fillRef>
+          <a:effectRef idx="0">
+            <a:schemeClr val="accent1"/>
+          </a:effectRef>
+          <a:fontRef idx="minor">
+            <a:schemeClr val="lt1"/>
+          </a:fontRef>
+        </p:style>
+        <p:txBody>
+          <a:bodyPr rtlCol="0" anchor="ctr"/>
+          <a:lstStyle/>
+          <a:p>
+            <a:pPr algn="ctr"/>
+            <a:r>
+              <a:rPr lang="en-US" altLang="ja-JP" sz="1400" dirty="0"/>
+              <a:t>Data</a:t>
+            </a:r>
+          </a:p>
+          <a:p>
+            <a:pPr algn="ctr"/>
+            <a:r>
+              <a:rPr lang="en-US" altLang="ja-JP" sz="1400" dirty="0"/>
+              <a:t>Association</a:t>
+            </a:r>
+          </a:p>
+        </p:txBody>
+      </p:sp>
+      <p:sp>
+        <p:nvSpPr>
+          <p:cNvPr id="8" name="正方形/長方形 7">
+            <a:extLst>
+              <a:ext uri="{FF2B5EF4-FFF2-40B4-BE49-F238E27FC236}">
+                <a16:creationId xmlns:a16="http://schemas.microsoft.com/office/drawing/2014/main" id="{04F5795E-EFC4-4A6C-AC5D-E75E9F181BB8}"/>
+              </a:ext>
+            </a:extLst>
+          </p:cNvPr>
+          <p:cNvSpPr/>
+          <p:nvPr/>
+        </p:nvSpPr>
+        <p:spPr>
+          <a:xfrm>
+            <a:off x="6893516" y="2472424"/>
+            <a:ext cx="1507723" cy="594804"/>
+          </a:xfrm>
+          <a:prstGeom prst="rect">
+            <a:avLst/>
+          </a:prstGeom>
+        </p:spPr>
+        <p:style>
+          <a:lnRef idx="2">
+            <a:schemeClr val="accent1">
+              <a:shade val="50000"/>
+            </a:schemeClr>
+          </a:lnRef>
+          <a:fillRef idx="1">
+            <a:schemeClr val="accent1"/>
+          </a:fillRef>
+          <a:effectRef idx="0">
+            <a:schemeClr val="accent1"/>
+          </a:effectRef>
+          <a:fontRef idx="minor">
+            <a:schemeClr val="lt1"/>
+          </a:fontRef>
+        </p:style>
+        <p:txBody>
+          <a:bodyPr rtlCol="0" anchor="ctr"/>
+          <a:lstStyle/>
+          <a:p>
+            <a:pPr algn="ctr"/>
+            <a:r>
+              <a:rPr lang="en-US" altLang="ja-JP" sz="1400" dirty="0"/>
+              <a:t>Robot Pose</a:t>
+            </a:r>
+          </a:p>
+          <a:p>
+            <a:pPr algn="ctr"/>
+            <a:r>
+              <a:rPr lang="en-US" altLang="ja-JP" sz="1400" dirty="0"/>
+              <a:t>Optimization</a:t>
+            </a:r>
+          </a:p>
+        </p:txBody>
+      </p:sp>
+      <p:sp>
+        <p:nvSpPr>
+          <p:cNvPr id="10" name="正方形/長方形 9">
+            <a:extLst>
+              <a:ext uri="{FF2B5EF4-FFF2-40B4-BE49-F238E27FC236}">
+                <a16:creationId xmlns:a16="http://schemas.microsoft.com/office/drawing/2014/main" id="{856E64AE-540B-4384-9463-96BE2E07C0FE}"/>
+              </a:ext>
+            </a:extLst>
+          </p:cNvPr>
+          <p:cNvSpPr/>
+          <p:nvPr/>
+        </p:nvSpPr>
+        <p:spPr>
+          <a:xfrm>
+            <a:off x="9105538" y="2473903"/>
+            <a:ext cx="1041639" cy="594804"/>
+          </a:xfrm>
+          <a:prstGeom prst="rect">
+            <a:avLst/>
+          </a:prstGeom>
+        </p:spPr>
+        <p:style>
+          <a:lnRef idx="2">
+            <a:schemeClr val="accent1">
+              <a:shade val="50000"/>
+            </a:schemeClr>
+          </a:lnRef>
+          <a:fillRef idx="1">
+            <a:schemeClr val="accent1"/>
+          </a:fillRef>
+          <a:effectRef idx="0">
+            <a:schemeClr val="accent1"/>
+          </a:effectRef>
+          <a:fontRef idx="minor">
+            <a:schemeClr val="lt1"/>
+          </a:fontRef>
+        </p:style>
+        <p:txBody>
+          <a:bodyPr rtlCol="0" anchor="ctr"/>
+          <a:lstStyle/>
+          <a:p>
+            <a:pPr algn="ctr"/>
+            <a:r>
+              <a:rPr lang="en-US" altLang="ja-JP" sz="1400" dirty="0"/>
+              <a:t>Sensor</a:t>
+            </a:r>
+          </a:p>
+          <a:p>
+            <a:pPr algn="ctr"/>
+            <a:r>
+              <a:rPr lang="en-US" altLang="ja-JP" sz="1400" dirty="0"/>
+              <a:t>Fusion</a:t>
+            </a:r>
+          </a:p>
+        </p:txBody>
+      </p:sp>
+      <p:sp>
+        <p:nvSpPr>
+          <p:cNvPr id="12" name="正方形/長方形 11">
+            <a:extLst>
+              <a:ext uri="{FF2B5EF4-FFF2-40B4-BE49-F238E27FC236}">
+                <a16:creationId xmlns:a16="http://schemas.microsoft.com/office/drawing/2014/main" id="{88AEB32E-6EA8-4F65-9964-0090712AB862}"/>
+              </a:ext>
+            </a:extLst>
+          </p:cNvPr>
+          <p:cNvSpPr/>
+          <p:nvPr/>
+        </p:nvSpPr>
+        <p:spPr>
+          <a:xfrm>
+            <a:off x="10793775" y="2475382"/>
+            <a:ext cx="1041639" cy="594804"/>
+          </a:xfrm>
+          <a:prstGeom prst="rect">
+            <a:avLst/>
+          </a:prstGeom>
+        </p:spPr>
+        <p:style>
+          <a:lnRef idx="2">
+            <a:schemeClr val="accent1">
+              <a:shade val="50000"/>
+            </a:schemeClr>
+          </a:lnRef>
+          <a:fillRef idx="1">
+            <a:schemeClr val="accent1"/>
+          </a:fillRef>
+          <a:effectRef idx="0">
+            <a:schemeClr val="accent1"/>
+          </a:effectRef>
+          <a:fontRef idx="minor">
+            <a:schemeClr val="lt1"/>
+          </a:fontRef>
+        </p:style>
+        <p:txBody>
+          <a:bodyPr rtlCol="0" anchor="ctr"/>
+          <a:lstStyle/>
+          <a:p>
+            <a:pPr algn="ctr"/>
+            <a:r>
+              <a:rPr lang="en-US" altLang="ja-JP" sz="1400" dirty="0"/>
+              <a:t>Mapping</a:t>
+            </a:r>
+          </a:p>
+        </p:txBody>
+      </p:sp>
+      <p:cxnSp>
+        <p:nvCxnSpPr>
+          <p:cNvPr id="14" name="直線矢印コネクタ 13">
+            <a:extLst>
+              <a:ext uri="{FF2B5EF4-FFF2-40B4-BE49-F238E27FC236}">
+                <a16:creationId xmlns:a16="http://schemas.microsoft.com/office/drawing/2014/main" id="{42C2C78C-DC33-4D12-8813-1A1D828072A9}"/>
+              </a:ext>
+            </a:extLst>
+          </p:cNvPr>
+          <p:cNvCxnSpPr>
+            <a:cxnSpLocks/>
+            <a:stCxn id="2" idx="3"/>
+            <a:endCxn id="4" idx="1"/>
+          </p:cNvCxnSpPr>
+          <p:nvPr/>
+        </p:nvCxnSpPr>
+        <p:spPr>
+          <a:xfrm>
+            <a:off x="1615737" y="2765394"/>
+            <a:ext cx="915881" cy="1479"/>
+          </a:xfrm>
+          <a:prstGeom prst="straightConnector1">
+            <a:avLst/>
+          </a:prstGeom>
+          <a:ln>
+            <a:tailEnd type="triangle"/>
+          </a:ln>
+        </p:spPr>
+        <p:style>
+          <a:lnRef idx="1">
+            <a:schemeClr val="accent1"/>
+          </a:lnRef>
+          <a:fillRef idx="0">
+            <a:schemeClr val="accent1"/>
+          </a:fillRef>
+          <a:effectRef idx="0">
+            <a:schemeClr val="accent1"/>
+          </a:effectRef>
+          <a:fontRef idx="minor">
+            <a:schemeClr val="tx1"/>
+          </a:fontRef>
+        </p:style>
+      </p:cxnSp>
+      <p:cxnSp>
+        <p:nvCxnSpPr>
+          <p:cNvPr id="16" name="直線矢印コネクタ 15">
+            <a:extLst>
+              <a:ext uri="{FF2B5EF4-FFF2-40B4-BE49-F238E27FC236}">
+                <a16:creationId xmlns:a16="http://schemas.microsoft.com/office/drawing/2014/main" id="{394C37AC-A2DC-4D8F-B3D1-9A565276F89C}"/>
+              </a:ext>
+            </a:extLst>
+          </p:cNvPr>
+          <p:cNvCxnSpPr>
+            <a:cxnSpLocks/>
+            <a:stCxn id="4" idx="3"/>
+            <a:endCxn id="6" idx="1"/>
+          </p:cNvCxnSpPr>
+          <p:nvPr/>
+        </p:nvCxnSpPr>
+        <p:spPr>
+          <a:xfrm>
+            <a:off x="4039341" y="2766873"/>
+            <a:ext cx="837465" cy="1475"/>
+          </a:xfrm>
+          <a:prstGeom prst="straightConnector1">
+            <a:avLst/>
+          </a:prstGeom>
+          <a:ln>
+            <a:tailEnd type="triangle"/>
+          </a:ln>
+        </p:spPr>
+        <p:style>
+          <a:lnRef idx="1">
+            <a:schemeClr val="accent1"/>
+          </a:lnRef>
+          <a:fillRef idx="0">
+            <a:schemeClr val="accent1"/>
+          </a:fillRef>
+          <a:effectRef idx="0">
+            <a:schemeClr val="accent1"/>
+          </a:effectRef>
+          <a:fontRef idx="minor">
+            <a:schemeClr val="tx1"/>
+          </a:fontRef>
+        </p:style>
+      </p:cxnSp>
+      <p:cxnSp>
+        <p:nvCxnSpPr>
+          <p:cNvPr id="19" name="直線矢印コネクタ 18">
+            <a:extLst>
+              <a:ext uri="{FF2B5EF4-FFF2-40B4-BE49-F238E27FC236}">
+                <a16:creationId xmlns:a16="http://schemas.microsoft.com/office/drawing/2014/main" id="{806EE987-8BCF-48CC-A6CC-E8DFE0AC3AAB}"/>
+              </a:ext>
+            </a:extLst>
+          </p:cNvPr>
+          <p:cNvCxnSpPr>
+            <a:cxnSpLocks/>
+            <a:stCxn id="6" idx="3"/>
+            <a:endCxn id="8" idx="1"/>
+          </p:cNvCxnSpPr>
+          <p:nvPr/>
+        </p:nvCxnSpPr>
+        <p:spPr>
+          <a:xfrm>
+            <a:off x="6152225" y="2768348"/>
+            <a:ext cx="741291" cy="1478"/>
+          </a:xfrm>
+          <a:prstGeom prst="straightConnector1">
+            <a:avLst/>
+          </a:prstGeom>
+          <a:ln>
+            <a:tailEnd type="triangle"/>
+          </a:ln>
+        </p:spPr>
+        <p:style>
+          <a:lnRef idx="1">
+            <a:schemeClr val="accent1"/>
+          </a:lnRef>
+          <a:fillRef idx="0">
+            <a:schemeClr val="accent1"/>
+          </a:fillRef>
+          <a:effectRef idx="0">
+            <a:schemeClr val="accent1"/>
+          </a:effectRef>
+          <a:fontRef idx="minor">
+            <a:schemeClr val="tx1"/>
+          </a:fontRef>
+        </p:style>
+      </p:cxnSp>
+      <p:cxnSp>
+        <p:nvCxnSpPr>
+          <p:cNvPr id="22" name="直線矢印コネクタ 21">
+            <a:extLst>
+              <a:ext uri="{FF2B5EF4-FFF2-40B4-BE49-F238E27FC236}">
+                <a16:creationId xmlns:a16="http://schemas.microsoft.com/office/drawing/2014/main" id="{4609F424-34A7-4CE7-9913-A08055E72D77}"/>
+              </a:ext>
+            </a:extLst>
+          </p:cNvPr>
+          <p:cNvCxnSpPr>
+            <a:cxnSpLocks/>
+            <a:stCxn id="8" idx="3"/>
+            <a:endCxn id="10" idx="1"/>
+          </p:cNvCxnSpPr>
+          <p:nvPr/>
+        </p:nvCxnSpPr>
+        <p:spPr>
+          <a:xfrm>
+            <a:off x="8401239" y="2769826"/>
+            <a:ext cx="704299" cy="1479"/>
+          </a:xfrm>
+          <a:prstGeom prst="straightConnector1">
+            <a:avLst/>
+          </a:prstGeom>
+          <a:ln>
+            <a:tailEnd type="triangle"/>
+          </a:ln>
+        </p:spPr>
+        <p:style>
+          <a:lnRef idx="1">
+            <a:schemeClr val="accent1"/>
+          </a:lnRef>
+          <a:fillRef idx="0">
+            <a:schemeClr val="accent1"/>
+          </a:fillRef>
+          <a:effectRef idx="0">
+            <a:schemeClr val="accent1"/>
+          </a:effectRef>
+          <a:fontRef idx="minor">
+            <a:schemeClr val="tx1"/>
+          </a:fontRef>
+        </p:style>
+      </p:cxnSp>
+      <p:cxnSp>
+        <p:nvCxnSpPr>
+          <p:cNvPr id="25" name="直線矢印コネクタ 24">
+            <a:extLst>
+              <a:ext uri="{FF2B5EF4-FFF2-40B4-BE49-F238E27FC236}">
+                <a16:creationId xmlns:a16="http://schemas.microsoft.com/office/drawing/2014/main" id="{C8B53275-1F31-454B-A644-75F6DA124417}"/>
+              </a:ext>
+            </a:extLst>
+          </p:cNvPr>
+          <p:cNvCxnSpPr>
+            <a:cxnSpLocks/>
+            <a:stCxn id="10" idx="3"/>
+            <a:endCxn id="12" idx="1"/>
+          </p:cNvCxnSpPr>
+          <p:nvPr/>
+        </p:nvCxnSpPr>
+        <p:spPr>
+          <a:xfrm>
+            <a:off x="10147177" y="2771305"/>
+            <a:ext cx="646598" cy="1479"/>
+          </a:xfrm>
+          <a:prstGeom prst="straightConnector1">
+            <a:avLst/>
+          </a:prstGeom>
+          <a:ln>
+            <a:tailEnd type="triangle"/>
+          </a:ln>
+        </p:spPr>
+        <p:style>
+          <a:lnRef idx="1">
+            <a:schemeClr val="accent1"/>
+          </a:lnRef>
+          <a:fillRef idx="0">
+            <a:schemeClr val="accent1"/>
+          </a:fillRef>
+          <a:effectRef idx="0">
+            <a:schemeClr val="accent1"/>
+          </a:effectRef>
+          <a:fontRef idx="minor">
+            <a:schemeClr val="tx1"/>
+          </a:fontRef>
+        </p:style>
+      </p:cxnSp>
+      <p:cxnSp>
+        <p:nvCxnSpPr>
+          <p:cNvPr id="29" name="直線矢印コネクタ 28">
+            <a:extLst>
+              <a:ext uri="{FF2B5EF4-FFF2-40B4-BE49-F238E27FC236}">
+                <a16:creationId xmlns:a16="http://schemas.microsoft.com/office/drawing/2014/main" id="{6DAFCDD1-2056-4C9B-BEC9-CA6E5AE34B42}"/>
+              </a:ext>
+            </a:extLst>
+          </p:cNvPr>
+          <p:cNvCxnSpPr>
+            <a:cxnSpLocks/>
+          </p:cNvCxnSpPr>
+          <p:nvPr/>
+        </p:nvCxnSpPr>
+        <p:spPr>
+          <a:xfrm>
+            <a:off x="4440317" y="1828800"/>
+            <a:ext cx="0" cy="943244"/>
+          </a:xfrm>
+          <a:prstGeom prst="straightConnector1">
+            <a:avLst/>
+          </a:prstGeom>
+          <a:ln>
+            <a:tailEnd type="triangle"/>
+          </a:ln>
+        </p:spPr>
+        <p:style>
+          <a:lnRef idx="1">
+            <a:schemeClr val="accent1"/>
+          </a:lnRef>
+          <a:fillRef idx="0">
+            <a:schemeClr val="accent1"/>
+          </a:fillRef>
+          <a:effectRef idx="0">
+            <a:schemeClr val="accent1"/>
+          </a:effectRef>
+          <a:fontRef idx="minor">
+            <a:schemeClr val="tx1"/>
+          </a:fontRef>
+        </p:style>
+      </p:cxnSp>
+      <p:cxnSp>
+        <p:nvCxnSpPr>
+          <p:cNvPr id="32" name="直線矢印コネクタ 31">
+            <a:extLst>
+              <a:ext uri="{FF2B5EF4-FFF2-40B4-BE49-F238E27FC236}">
+                <a16:creationId xmlns:a16="http://schemas.microsoft.com/office/drawing/2014/main" id="{0C36F4FF-09F5-43BC-8024-7EE39893C409}"/>
+              </a:ext>
+            </a:extLst>
+          </p:cNvPr>
+          <p:cNvCxnSpPr>
+            <a:cxnSpLocks/>
+          </p:cNvCxnSpPr>
+          <p:nvPr/>
+        </p:nvCxnSpPr>
+        <p:spPr>
+          <a:xfrm flipH="1">
+            <a:off x="4458073" y="1828800"/>
+            <a:ext cx="4224109" cy="0"/>
+          </a:xfrm>
+          <a:prstGeom prst="straightConnector1">
+            <a:avLst/>
+          </a:prstGeom>
+          <a:ln>
+            <a:tailEnd type="none"/>
+          </a:ln>
+        </p:spPr>
+        <p:style>
+          <a:lnRef idx="1">
+            <a:schemeClr val="accent1"/>
+          </a:lnRef>
+          <a:fillRef idx="0">
+            <a:schemeClr val="accent1"/>
+          </a:fillRef>
+          <a:effectRef idx="0">
+            <a:schemeClr val="accent1"/>
+          </a:effectRef>
+          <a:fontRef idx="minor">
+            <a:schemeClr val="tx1"/>
+          </a:fontRef>
+        </p:style>
+      </p:cxnSp>
+      <p:cxnSp>
+        <p:nvCxnSpPr>
+          <p:cNvPr id="36" name="直線矢印コネクタ 35">
+            <a:extLst>
+              <a:ext uri="{FF2B5EF4-FFF2-40B4-BE49-F238E27FC236}">
+                <a16:creationId xmlns:a16="http://schemas.microsoft.com/office/drawing/2014/main" id="{F601F928-485D-47B7-9C58-0326EAF28F27}"/>
+              </a:ext>
+            </a:extLst>
+          </p:cNvPr>
+          <p:cNvCxnSpPr>
+            <a:cxnSpLocks/>
+          </p:cNvCxnSpPr>
+          <p:nvPr/>
+        </p:nvCxnSpPr>
+        <p:spPr>
+          <a:xfrm flipH="1">
+            <a:off x="8682183" y="1828800"/>
+            <a:ext cx="1" cy="943244"/>
+          </a:xfrm>
+          <a:prstGeom prst="straightConnector1">
+            <a:avLst/>
+          </a:prstGeom>
+          <a:ln>
+            <a:tailEnd type="none"/>
+          </a:ln>
+        </p:spPr>
+        <p:style>
+          <a:lnRef idx="1">
+            <a:schemeClr val="accent1"/>
+          </a:lnRef>
+          <a:fillRef idx="0">
+            <a:schemeClr val="accent1"/>
+          </a:fillRef>
+          <a:effectRef idx="0">
+            <a:schemeClr val="accent1"/>
+          </a:effectRef>
+          <a:fontRef idx="minor">
+            <a:schemeClr val="tx1"/>
+          </a:fontRef>
+        </p:style>
+      </p:cxnSp>
+    </p:spTree>
+    <p:extLst>
+      <p:ext uri="{BB962C8B-B14F-4D97-AF65-F5344CB8AC3E}">
+        <p14:creationId xmlns:p14="http://schemas.microsoft.com/office/powerpoint/2010/main" val="3150613370"/>
+      </p:ext>
+    </p:extLst>
+  </p:cSld>
+  <p:clrMapOvr>
+    <a:masterClrMapping/>
+  </p:clrMapOvr>
+</p:sld>
+</file>
+
 <file path=ppt/theme/theme1.xml><?xml version="1.0" encoding="utf-8"?>
 <a:theme xmlns:a="http://schemas.openxmlformats.org/drawingml/2006/main" name="Office テーマ">
   <a:themeElements>

</xml_diff>

<commit_message>
add ScanPointAnalyzer_Activity_analyzePoints.png and ScanPointAnalyzer_Activity_calNormal.png
</commit_message>
<xml_diff>
--- a/SLAM_Theoretical_Formulas.pptx
+++ b/SLAM_Theoretical_Formulas.pptx
@@ -9,6 +9,7 @@
     <p:sldId id="257" r:id="rId3"/>
     <p:sldId id="258" r:id="rId4"/>
     <p:sldId id="259" r:id="rId5"/>
+    <p:sldId id="260" r:id="rId6"/>
   </p:sldIdLst>
   <p:sldSz cx="12192000" cy="6858000"/>
   <p:notesSz cx="6858000" cy="9144000"/>
@@ -262,7 +263,7 @@
           <a:p>
             <a:fld id="{9DDD97A9-1B44-463F-8EAF-3A848A7F5CA1}" type="datetimeFigureOut">
               <a:rPr kumimoji="1" lang="ja-JP" altLang="en-US" smtClean="0"/>
-              <a:t>2020/7/18</a:t>
+              <a:t>2020/7/19</a:t>
             </a:fld>
             <a:endParaRPr kumimoji="1" lang="ja-JP" altLang="en-US"/>
           </a:p>
@@ -492,7 +493,7 @@
           <a:p>
             <a:fld id="{9DDD97A9-1B44-463F-8EAF-3A848A7F5CA1}" type="datetimeFigureOut">
               <a:rPr kumimoji="1" lang="ja-JP" altLang="en-US" smtClean="0"/>
-              <a:t>2020/7/18</a:t>
+              <a:t>2020/7/19</a:t>
             </a:fld>
             <a:endParaRPr kumimoji="1" lang="ja-JP" altLang="en-US"/>
           </a:p>
@@ -732,7 +733,7 @@
           <a:p>
             <a:fld id="{9DDD97A9-1B44-463F-8EAF-3A848A7F5CA1}" type="datetimeFigureOut">
               <a:rPr kumimoji="1" lang="ja-JP" altLang="en-US" smtClean="0"/>
-              <a:t>2020/7/18</a:t>
+              <a:t>2020/7/19</a:t>
             </a:fld>
             <a:endParaRPr kumimoji="1" lang="ja-JP" altLang="en-US"/>
           </a:p>
@@ -962,7 +963,7 @@
           <a:p>
             <a:fld id="{9DDD97A9-1B44-463F-8EAF-3A848A7F5CA1}" type="datetimeFigureOut">
               <a:rPr kumimoji="1" lang="ja-JP" altLang="en-US" smtClean="0"/>
-              <a:t>2020/7/18</a:t>
+              <a:t>2020/7/19</a:t>
             </a:fld>
             <a:endParaRPr kumimoji="1" lang="ja-JP" altLang="en-US"/>
           </a:p>
@@ -1237,7 +1238,7 @@
           <a:p>
             <a:fld id="{9DDD97A9-1B44-463F-8EAF-3A848A7F5CA1}" type="datetimeFigureOut">
               <a:rPr kumimoji="1" lang="ja-JP" altLang="en-US" smtClean="0"/>
-              <a:t>2020/7/18</a:t>
+              <a:t>2020/7/19</a:t>
             </a:fld>
             <a:endParaRPr kumimoji="1" lang="ja-JP" altLang="en-US"/>
           </a:p>
@@ -1566,7 +1567,7 @@
           <a:p>
             <a:fld id="{9DDD97A9-1B44-463F-8EAF-3A848A7F5CA1}" type="datetimeFigureOut">
               <a:rPr kumimoji="1" lang="ja-JP" altLang="en-US" smtClean="0"/>
-              <a:t>2020/7/18</a:t>
+              <a:t>2020/7/19</a:t>
             </a:fld>
             <a:endParaRPr kumimoji="1" lang="ja-JP" altLang="en-US"/>
           </a:p>
@@ -2042,7 +2043,7 @@
           <a:p>
             <a:fld id="{9DDD97A9-1B44-463F-8EAF-3A848A7F5CA1}" type="datetimeFigureOut">
               <a:rPr kumimoji="1" lang="ja-JP" altLang="en-US" smtClean="0"/>
-              <a:t>2020/7/18</a:t>
+              <a:t>2020/7/19</a:t>
             </a:fld>
             <a:endParaRPr kumimoji="1" lang="ja-JP" altLang="en-US"/>
           </a:p>
@@ -2183,7 +2184,7 @@
           <a:p>
             <a:fld id="{9DDD97A9-1B44-463F-8EAF-3A848A7F5CA1}" type="datetimeFigureOut">
               <a:rPr kumimoji="1" lang="ja-JP" altLang="en-US" smtClean="0"/>
-              <a:t>2020/7/18</a:t>
+              <a:t>2020/7/19</a:t>
             </a:fld>
             <a:endParaRPr kumimoji="1" lang="ja-JP" altLang="en-US"/>
           </a:p>
@@ -2296,7 +2297,7 @@
           <a:p>
             <a:fld id="{9DDD97A9-1B44-463F-8EAF-3A848A7F5CA1}" type="datetimeFigureOut">
               <a:rPr kumimoji="1" lang="ja-JP" altLang="en-US" smtClean="0"/>
-              <a:t>2020/7/18</a:t>
+              <a:t>2020/7/19</a:t>
             </a:fld>
             <a:endParaRPr kumimoji="1" lang="ja-JP" altLang="en-US"/>
           </a:p>
@@ -2639,7 +2640,7 @@
           <a:p>
             <a:fld id="{9DDD97A9-1B44-463F-8EAF-3A848A7F5CA1}" type="datetimeFigureOut">
               <a:rPr kumimoji="1" lang="ja-JP" altLang="en-US" smtClean="0"/>
-              <a:t>2020/7/18</a:t>
+              <a:t>2020/7/19</a:t>
             </a:fld>
             <a:endParaRPr kumimoji="1" lang="ja-JP" altLang="en-US"/>
           </a:p>
@@ -2927,7 +2928,7 @@
           <a:p>
             <a:fld id="{9DDD97A9-1B44-463F-8EAF-3A848A7F5CA1}" type="datetimeFigureOut">
               <a:rPr kumimoji="1" lang="ja-JP" altLang="en-US" smtClean="0"/>
-              <a:t>2020/7/18</a:t>
+              <a:t>2020/7/19</a:t>
             </a:fld>
             <a:endParaRPr kumimoji="1" lang="ja-JP" altLang="en-US"/>
           </a:p>
@@ -3200,7 +3201,7 @@
           <a:p>
             <a:fld id="{9DDD97A9-1B44-463F-8EAF-3A848A7F5CA1}" type="datetimeFigureOut">
               <a:rPr kumimoji="1" lang="ja-JP" altLang="en-US" smtClean="0"/>
-              <a:t>2020/7/18</a:t>
+              <a:t>2020/7/19</a:t>
             </a:fld>
             <a:endParaRPr kumimoji="1" lang="ja-JP" altLang="en-US"/>
           </a:p>
@@ -16153,6 +16154,785 @@
 </p:sld>
 </file>
 
+<file path=ppt/slides/slide5.xml><?xml version="1.0" encoding="utf-8"?>
+<p:sld xmlns:a="http://schemas.openxmlformats.org/drawingml/2006/main" xmlns:r="http://schemas.openxmlformats.org/officeDocument/2006/relationships" xmlns:p="http://schemas.openxmlformats.org/presentationml/2006/main">
+  <p:cSld>
+    <p:spTree>
+      <p:nvGrpSpPr>
+        <p:cNvPr id="1" name=""/>
+        <p:cNvGrpSpPr/>
+        <p:nvPr/>
+      </p:nvGrpSpPr>
+      <p:grpSpPr>
+        <a:xfrm>
+          <a:off x="0" y="0"/>
+          <a:ext cx="0" cy="0"/>
+          <a:chOff x="0" y="0"/>
+          <a:chExt cx="0" cy="0"/>
+        </a:xfrm>
+      </p:grpSpPr>
+      <p:cxnSp>
+        <p:nvCxnSpPr>
+          <p:cNvPr id="2" name="直線矢印コネクタ 1">
+            <a:extLst>
+              <a:ext uri="{FF2B5EF4-FFF2-40B4-BE49-F238E27FC236}">
+                <a16:creationId xmlns:a16="http://schemas.microsoft.com/office/drawing/2014/main" id="{7D03E2EA-35CF-4798-9382-FE33C6D9E12A}"/>
+              </a:ext>
+            </a:extLst>
+          </p:cNvPr>
+          <p:cNvCxnSpPr>
+            <a:cxnSpLocks/>
+          </p:cNvCxnSpPr>
+          <p:nvPr/>
+        </p:nvCxnSpPr>
+        <p:spPr>
+          <a:xfrm flipH="1">
+            <a:off x="1041271" y="3686886"/>
+            <a:ext cx="2255082" cy="0"/>
+          </a:xfrm>
+          <a:prstGeom prst="straightConnector1">
+            <a:avLst/>
+          </a:prstGeom>
+          <a:ln w="28575">
+            <a:solidFill>
+              <a:schemeClr val="tx1"/>
+            </a:solidFill>
+            <a:tailEnd type="none"/>
+          </a:ln>
+        </p:spPr>
+        <p:style>
+          <a:lnRef idx="1">
+            <a:schemeClr val="accent1"/>
+          </a:lnRef>
+          <a:fillRef idx="0">
+            <a:schemeClr val="accent1"/>
+          </a:fillRef>
+          <a:effectRef idx="0">
+            <a:schemeClr val="accent1"/>
+          </a:effectRef>
+          <a:fontRef idx="minor">
+            <a:schemeClr val="tx1"/>
+          </a:fontRef>
+        </p:style>
+      </p:cxnSp>
+      <p:sp>
+        <p:nvSpPr>
+          <p:cNvPr id="3" name="楕円 2">
+            <a:extLst>
+              <a:ext uri="{FF2B5EF4-FFF2-40B4-BE49-F238E27FC236}">
+                <a16:creationId xmlns:a16="http://schemas.microsoft.com/office/drawing/2014/main" id="{4BE6043B-482F-4E9D-9EFD-FDB33858D8C2}"/>
+              </a:ext>
+            </a:extLst>
+          </p:cNvPr>
+          <p:cNvSpPr/>
+          <p:nvPr/>
+        </p:nvSpPr>
+        <p:spPr>
+          <a:xfrm>
+            <a:off x="1376020" y="3618926"/>
+            <a:ext cx="135920" cy="135920"/>
+          </a:xfrm>
+          <a:prstGeom prst="ellipse">
+            <a:avLst/>
+          </a:prstGeom>
+        </p:spPr>
+        <p:style>
+          <a:lnRef idx="2">
+            <a:schemeClr val="accent1">
+              <a:shade val="50000"/>
+            </a:schemeClr>
+          </a:lnRef>
+          <a:fillRef idx="1">
+            <a:schemeClr val="accent1"/>
+          </a:fillRef>
+          <a:effectRef idx="0">
+            <a:schemeClr val="accent1"/>
+          </a:effectRef>
+          <a:fontRef idx="minor">
+            <a:schemeClr val="lt1"/>
+          </a:fontRef>
+        </p:style>
+        <p:txBody>
+          <a:bodyPr rtlCol="0" anchor="ctr"/>
+          <a:lstStyle/>
+          <a:p>
+            <a:pPr algn="ctr"/>
+            <a:endParaRPr kumimoji="1" lang="ja-JP" altLang="en-US"/>
+          </a:p>
+        </p:txBody>
+      </p:sp>
+      <p:cxnSp>
+        <p:nvCxnSpPr>
+          <p:cNvPr id="5" name="直線矢印コネクタ 4">
+            <a:extLst>
+              <a:ext uri="{FF2B5EF4-FFF2-40B4-BE49-F238E27FC236}">
+                <a16:creationId xmlns:a16="http://schemas.microsoft.com/office/drawing/2014/main" id="{656ABAE8-6B28-4A44-848E-87F25FA74487}"/>
+              </a:ext>
+            </a:extLst>
+          </p:cNvPr>
+          <p:cNvCxnSpPr>
+            <a:cxnSpLocks/>
+          </p:cNvCxnSpPr>
+          <p:nvPr/>
+        </p:nvCxnSpPr>
+        <p:spPr>
+          <a:xfrm flipH="1">
+            <a:off x="1033872" y="2658553"/>
+            <a:ext cx="2255082" cy="0"/>
+          </a:xfrm>
+          <a:prstGeom prst="straightConnector1">
+            <a:avLst/>
+          </a:prstGeom>
+          <a:ln w="28575">
+            <a:solidFill>
+              <a:schemeClr val="tx1"/>
+            </a:solidFill>
+            <a:tailEnd type="none"/>
+          </a:ln>
+        </p:spPr>
+        <p:style>
+          <a:lnRef idx="1">
+            <a:schemeClr val="accent1"/>
+          </a:lnRef>
+          <a:fillRef idx="0">
+            <a:schemeClr val="accent1"/>
+          </a:fillRef>
+          <a:effectRef idx="0">
+            <a:schemeClr val="accent1"/>
+          </a:effectRef>
+          <a:fontRef idx="minor">
+            <a:schemeClr val="tx1"/>
+          </a:fontRef>
+        </p:style>
+      </p:cxnSp>
+      <p:sp>
+        <p:nvSpPr>
+          <p:cNvPr id="7" name="楕円 6">
+            <a:extLst>
+              <a:ext uri="{FF2B5EF4-FFF2-40B4-BE49-F238E27FC236}">
+                <a16:creationId xmlns:a16="http://schemas.microsoft.com/office/drawing/2014/main" id="{E1CD02B4-70A6-46AC-8763-DB93B417D548}"/>
+              </a:ext>
+            </a:extLst>
+          </p:cNvPr>
+          <p:cNvSpPr/>
+          <p:nvPr/>
+        </p:nvSpPr>
+        <p:spPr>
+          <a:xfrm>
+            <a:off x="2161413" y="2590593"/>
+            <a:ext cx="135920" cy="135920"/>
+          </a:xfrm>
+          <a:prstGeom prst="ellipse">
+            <a:avLst/>
+          </a:prstGeom>
+          <a:solidFill>
+            <a:srgbClr val="FF0000"/>
+          </a:solidFill>
+        </p:spPr>
+        <p:style>
+          <a:lnRef idx="2">
+            <a:schemeClr val="accent1">
+              <a:shade val="50000"/>
+            </a:schemeClr>
+          </a:lnRef>
+          <a:fillRef idx="1">
+            <a:schemeClr val="accent1"/>
+          </a:fillRef>
+          <a:effectRef idx="0">
+            <a:schemeClr val="accent1"/>
+          </a:effectRef>
+          <a:fontRef idx="minor">
+            <a:schemeClr val="lt1"/>
+          </a:fontRef>
+        </p:style>
+        <p:txBody>
+          <a:bodyPr rtlCol="0" anchor="ctr"/>
+          <a:lstStyle/>
+          <a:p>
+            <a:pPr algn="ctr"/>
+            <a:endParaRPr kumimoji="1" lang="ja-JP" altLang="en-US"/>
+          </a:p>
+        </p:txBody>
+      </p:sp>
+      <p:cxnSp>
+        <p:nvCxnSpPr>
+          <p:cNvPr id="8" name="直線矢印コネクタ 7">
+            <a:extLst>
+              <a:ext uri="{FF2B5EF4-FFF2-40B4-BE49-F238E27FC236}">
+                <a16:creationId xmlns:a16="http://schemas.microsoft.com/office/drawing/2014/main" id="{FB3E37D6-B28C-4257-B867-DDBA988828CF}"/>
+              </a:ext>
+            </a:extLst>
+          </p:cNvPr>
+          <p:cNvCxnSpPr>
+            <a:cxnSpLocks/>
+            <a:stCxn id="3" idx="7"/>
+            <a:endCxn id="7" idx="3"/>
+          </p:cNvCxnSpPr>
+          <p:nvPr/>
+        </p:nvCxnSpPr>
+        <p:spPr>
+          <a:xfrm flipV="1">
+            <a:off x="1492035" y="2706608"/>
+            <a:ext cx="689283" cy="932223"/>
+          </a:xfrm>
+          <a:prstGeom prst="straightConnector1">
+            <a:avLst/>
+          </a:prstGeom>
+          <a:ln w="19050">
+            <a:solidFill>
+              <a:srgbClr val="FF0000"/>
+            </a:solidFill>
+            <a:headEnd type="none" w="med" len="med"/>
+            <a:tailEnd type="none" w="med" len="med"/>
+          </a:ln>
+        </p:spPr>
+        <p:style>
+          <a:lnRef idx="1">
+            <a:schemeClr val="accent1"/>
+          </a:lnRef>
+          <a:fillRef idx="0">
+            <a:schemeClr val="accent1"/>
+          </a:fillRef>
+          <a:effectRef idx="0">
+            <a:schemeClr val="accent1"/>
+          </a:effectRef>
+          <a:fontRef idx="minor">
+            <a:schemeClr val="tx1"/>
+          </a:fontRef>
+        </p:style>
+      </p:cxnSp>
+      <p:sp>
+        <p:nvSpPr>
+          <p:cNvPr id="12" name="テキスト ボックス 11">
+            <a:extLst>
+              <a:ext uri="{FF2B5EF4-FFF2-40B4-BE49-F238E27FC236}">
+                <a16:creationId xmlns:a16="http://schemas.microsoft.com/office/drawing/2014/main" id="{EDDFA802-7A4A-4925-8F88-E305ACF660C3}"/>
+              </a:ext>
+            </a:extLst>
+          </p:cNvPr>
+          <p:cNvSpPr txBox="1"/>
+          <p:nvPr/>
+        </p:nvSpPr>
+        <p:spPr>
+          <a:xfrm>
+            <a:off x="867461" y="3960226"/>
+            <a:ext cx="2723823" cy="369332"/>
+          </a:xfrm>
+          <a:prstGeom prst="rect">
+            <a:avLst/>
+          </a:prstGeom>
+          <a:noFill/>
+        </p:spPr>
+        <p:txBody>
+          <a:bodyPr wrap="none" rtlCol="0">
+            <a:spAutoFit/>
+          </a:bodyPr>
+          <a:lstStyle/>
+          <a:p>
+            <a:pPr algn="ctr"/>
+            <a:r>
+              <a:rPr kumimoji="1" lang="en-US" altLang="ja-JP" dirty="0"/>
+              <a:t>Point-to-Point Distance</a:t>
+            </a:r>
+            <a:endParaRPr kumimoji="1" lang="ja-JP" altLang="en-US" dirty="0"/>
+          </a:p>
+        </p:txBody>
+      </p:sp>
+      <p:cxnSp>
+        <p:nvCxnSpPr>
+          <p:cNvPr id="13" name="直線矢印コネクタ 12">
+            <a:extLst>
+              <a:ext uri="{FF2B5EF4-FFF2-40B4-BE49-F238E27FC236}">
+                <a16:creationId xmlns:a16="http://schemas.microsoft.com/office/drawing/2014/main" id="{6E8260BE-35A9-4968-99F7-35067C10B134}"/>
+              </a:ext>
+            </a:extLst>
+          </p:cNvPr>
+          <p:cNvCxnSpPr>
+            <a:cxnSpLocks/>
+          </p:cNvCxnSpPr>
+          <p:nvPr/>
+        </p:nvCxnSpPr>
+        <p:spPr>
+          <a:xfrm flipH="1">
+            <a:off x="4513925" y="3679487"/>
+            <a:ext cx="2255082" cy="0"/>
+          </a:xfrm>
+          <a:prstGeom prst="straightConnector1">
+            <a:avLst/>
+          </a:prstGeom>
+          <a:ln w="28575">
+            <a:solidFill>
+              <a:schemeClr val="tx1"/>
+            </a:solidFill>
+            <a:tailEnd type="none"/>
+          </a:ln>
+        </p:spPr>
+        <p:style>
+          <a:lnRef idx="1">
+            <a:schemeClr val="accent1"/>
+          </a:lnRef>
+          <a:fillRef idx="0">
+            <a:schemeClr val="accent1"/>
+          </a:fillRef>
+          <a:effectRef idx="0">
+            <a:schemeClr val="accent1"/>
+          </a:effectRef>
+          <a:fontRef idx="minor">
+            <a:schemeClr val="tx1"/>
+          </a:fontRef>
+        </p:style>
+      </p:cxnSp>
+      <p:sp>
+        <p:nvSpPr>
+          <p:cNvPr id="14" name="楕円 13">
+            <a:extLst>
+              <a:ext uri="{FF2B5EF4-FFF2-40B4-BE49-F238E27FC236}">
+                <a16:creationId xmlns:a16="http://schemas.microsoft.com/office/drawing/2014/main" id="{69E3D677-AF9E-49C7-BED2-C833E762CF49}"/>
+              </a:ext>
+            </a:extLst>
+          </p:cNvPr>
+          <p:cNvSpPr/>
+          <p:nvPr/>
+        </p:nvSpPr>
+        <p:spPr>
+          <a:xfrm>
+            <a:off x="4848674" y="3611527"/>
+            <a:ext cx="135920" cy="135920"/>
+          </a:xfrm>
+          <a:prstGeom prst="ellipse">
+            <a:avLst/>
+          </a:prstGeom>
+        </p:spPr>
+        <p:style>
+          <a:lnRef idx="2">
+            <a:schemeClr val="accent1">
+              <a:shade val="50000"/>
+            </a:schemeClr>
+          </a:lnRef>
+          <a:fillRef idx="1">
+            <a:schemeClr val="accent1"/>
+          </a:fillRef>
+          <a:effectRef idx="0">
+            <a:schemeClr val="accent1"/>
+          </a:effectRef>
+          <a:fontRef idx="minor">
+            <a:schemeClr val="lt1"/>
+          </a:fontRef>
+        </p:style>
+        <p:txBody>
+          <a:bodyPr rtlCol="0" anchor="ctr"/>
+          <a:lstStyle/>
+          <a:p>
+            <a:pPr algn="ctr"/>
+            <a:endParaRPr kumimoji="1" lang="ja-JP" altLang="en-US"/>
+          </a:p>
+        </p:txBody>
+      </p:sp>
+      <p:cxnSp>
+        <p:nvCxnSpPr>
+          <p:cNvPr id="15" name="直線矢印コネクタ 14">
+            <a:extLst>
+              <a:ext uri="{FF2B5EF4-FFF2-40B4-BE49-F238E27FC236}">
+                <a16:creationId xmlns:a16="http://schemas.microsoft.com/office/drawing/2014/main" id="{CFADBEC0-5CCC-44CC-B09B-092B7C458E50}"/>
+              </a:ext>
+            </a:extLst>
+          </p:cNvPr>
+          <p:cNvCxnSpPr>
+            <a:cxnSpLocks/>
+          </p:cNvCxnSpPr>
+          <p:nvPr/>
+        </p:nvCxnSpPr>
+        <p:spPr>
+          <a:xfrm flipH="1">
+            <a:off x="4506526" y="2651154"/>
+            <a:ext cx="2255082" cy="0"/>
+          </a:xfrm>
+          <a:prstGeom prst="straightConnector1">
+            <a:avLst/>
+          </a:prstGeom>
+          <a:ln w="28575">
+            <a:solidFill>
+              <a:schemeClr val="tx1"/>
+            </a:solidFill>
+            <a:tailEnd type="none"/>
+          </a:ln>
+        </p:spPr>
+        <p:style>
+          <a:lnRef idx="1">
+            <a:schemeClr val="accent1"/>
+          </a:lnRef>
+          <a:fillRef idx="0">
+            <a:schemeClr val="accent1"/>
+          </a:fillRef>
+          <a:effectRef idx="0">
+            <a:schemeClr val="accent1"/>
+          </a:effectRef>
+          <a:fontRef idx="minor">
+            <a:schemeClr val="tx1"/>
+          </a:fontRef>
+        </p:style>
+      </p:cxnSp>
+      <p:sp>
+        <p:nvSpPr>
+          <p:cNvPr id="16" name="楕円 15">
+            <a:extLst>
+              <a:ext uri="{FF2B5EF4-FFF2-40B4-BE49-F238E27FC236}">
+                <a16:creationId xmlns:a16="http://schemas.microsoft.com/office/drawing/2014/main" id="{FD0474DA-B484-4776-BABB-EFF48EE5E8C3}"/>
+              </a:ext>
+            </a:extLst>
+          </p:cNvPr>
+          <p:cNvSpPr/>
+          <p:nvPr/>
+        </p:nvSpPr>
+        <p:spPr>
+          <a:xfrm>
+            <a:off x="5634067" y="2583194"/>
+            <a:ext cx="135920" cy="135920"/>
+          </a:xfrm>
+          <a:prstGeom prst="ellipse">
+            <a:avLst/>
+          </a:prstGeom>
+          <a:solidFill>
+            <a:srgbClr val="FF0000"/>
+          </a:solidFill>
+        </p:spPr>
+        <p:style>
+          <a:lnRef idx="2">
+            <a:schemeClr val="accent1">
+              <a:shade val="50000"/>
+            </a:schemeClr>
+          </a:lnRef>
+          <a:fillRef idx="1">
+            <a:schemeClr val="accent1"/>
+          </a:fillRef>
+          <a:effectRef idx="0">
+            <a:schemeClr val="accent1"/>
+          </a:effectRef>
+          <a:fontRef idx="minor">
+            <a:schemeClr val="lt1"/>
+          </a:fontRef>
+        </p:style>
+        <p:txBody>
+          <a:bodyPr rtlCol="0" anchor="ctr"/>
+          <a:lstStyle/>
+          <a:p>
+            <a:pPr algn="ctr"/>
+            <a:endParaRPr kumimoji="1" lang="ja-JP" altLang="en-US"/>
+          </a:p>
+        </p:txBody>
+      </p:sp>
+      <p:cxnSp>
+        <p:nvCxnSpPr>
+          <p:cNvPr id="17" name="直線矢印コネクタ 16">
+            <a:extLst>
+              <a:ext uri="{FF2B5EF4-FFF2-40B4-BE49-F238E27FC236}">
+                <a16:creationId xmlns:a16="http://schemas.microsoft.com/office/drawing/2014/main" id="{A00695A9-AB94-45D0-B60B-1FBC2751AAC5}"/>
+              </a:ext>
+            </a:extLst>
+          </p:cNvPr>
+          <p:cNvCxnSpPr>
+            <a:cxnSpLocks/>
+            <a:endCxn id="16" idx="4"/>
+          </p:cNvCxnSpPr>
+          <p:nvPr/>
+        </p:nvCxnSpPr>
+        <p:spPr>
+          <a:xfrm flipV="1">
+            <a:off x="5702027" y="2719114"/>
+            <a:ext cx="0" cy="967772"/>
+          </a:xfrm>
+          <a:prstGeom prst="straightConnector1">
+            <a:avLst/>
+          </a:prstGeom>
+          <a:ln w="19050">
+            <a:solidFill>
+              <a:srgbClr val="FF0000"/>
+            </a:solidFill>
+            <a:headEnd type="none" w="med" len="med"/>
+            <a:tailEnd type="none" w="med" len="med"/>
+          </a:ln>
+        </p:spPr>
+        <p:style>
+          <a:lnRef idx="1">
+            <a:schemeClr val="accent1"/>
+          </a:lnRef>
+          <a:fillRef idx="0">
+            <a:schemeClr val="accent1"/>
+          </a:fillRef>
+          <a:effectRef idx="0">
+            <a:schemeClr val="accent1"/>
+          </a:effectRef>
+          <a:fontRef idx="minor">
+            <a:schemeClr val="tx1"/>
+          </a:fontRef>
+        </p:style>
+      </p:cxnSp>
+      <p:sp>
+        <p:nvSpPr>
+          <p:cNvPr id="18" name="テキスト ボックス 17">
+            <a:extLst>
+              <a:ext uri="{FF2B5EF4-FFF2-40B4-BE49-F238E27FC236}">
+                <a16:creationId xmlns:a16="http://schemas.microsoft.com/office/drawing/2014/main" id="{21EA04BA-B097-41F8-98FA-9261D891CDCD}"/>
+              </a:ext>
+            </a:extLst>
+          </p:cNvPr>
+          <p:cNvSpPr txBox="1"/>
+          <p:nvPr/>
+        </p:nvSpPr>
+        <p:spPr>
+          <a:xfrm>
+            <a:off x="4365765" y="3952827"/>
+            <a:ext cx="2672526" cy="369332"/>
+          </a:xfrm>
+          <a:prstGeom prst="rect">
+            <a:avLst/>
+          </a:prstGeom>
+          <a:noFill/>
+        </p:spPr>
+        <p:txBody>
+          <a:bodyPr wrap="none" rtlCol="0">
+            <a:spAutoFit/>
+          </a:bodyPr>
+          <a:lstStyle/>
+          <a:p>
+            <a:pPr algn="ctr"/>
+            <a:r>
+              <a:rPr kumimoji="1" lang="en-US" altLang="ja-JP" dirty="0"/>
+              <a:t>Perpendicular Distance</a:t>
+            </a:r>
+            <a:endParaRPr kumimoji="1" lang="ja-JP" altLang="en-US" dirty="0"/>
+          </a:p>
+        </p:txBody>
+      </p:sp>
+      <p:sp>
+        <p:nvSpPr>
+          <p:cNvPr id="22" name="正方形/長方形 21">
+            <a:extLst>
+              <a:ext uri="{FF2B5EF4-FFF2-40B4-BE49-F238E27FC236}">
+                <a16:creationId xmlns:a16="http://schemas.microsoft.com/office/drawing/2014/main" id="{43FF881E-DC46-4766-A079-FBF79C8B8AC3}"/>
+              </a:ext>
+            </a:extLst>
+          </p:cNvPr>
+          <p:cNvSpPr/>
+          <p:nvPr/>
+        </p:nvSpPr>
+        <p:spPr>
+          <a:xfrm>
+            <a:off x="5702027" y="3542036"/>
+            <a:ext cx="135915" cy="135920"/>
+          </a:xfrm>
+          <a:prstGeom prst="rect">
+            <a:avLst/>
+          </a:prstGeom>
+          <a:noFill/>
+        </p:spPr>
+        <p:style>
+          <a:lnRef idx="2">
+            <a:schemeClr val="accent1">
+              <a:shade val="50000"/>
+            </a:schemeClr>
+          </a:lnRef>
+          <a:fillRef idx="1">
+            <a:schemeClr val="accent1"/>
+          </a:fillRef>
+          <a:effectRef idx="0">
+            <a:schemeClr val="accent1"/>
+          </a:effectRef>
+          <a:fontRef idx="minor">
+            <a:schemeClr val="lt1"/>
+          </a:fontRef>
+        </p:style>
+        <p:txBody>
+          <a:bodyPr rtlCol="0" anchor="ctr"/>
+          <a:lstStyle/>
+          <a:p>
+            <a:pPr algn="ctr"/>
+            <a:endParaRPr kumimoji="1" lang="ja-JP" altLang="en-US"/>
+          </a:p>
+        </p:txBody>
+      </p:sp>
+      <p:sp>
+        <p:nvSpPr>
+          <p:cNvPr id="24" name="楕円 23">
+            <a:extLst>
+              <a:ext uri="{FF2B5EF4-FFF2-40B4-BE49-F238E27FC236}">
+                <a16:creationId xmlns:a16="http://schemas.microsoft.com/office/drawing/2014/main" id="{D7D64DD7-A964-49AB-86E3-6C5AAF359C7A}"/>
+              </a:ext>
+            </a:extLst>
+          </p:cNvPr>
+          <p:cNvSpPr/>
+          <p:nvPr/>
+        </p:nvSpPr>
+        <p:spPr>
+          <a:xfrm>
+            <a:off x="2731063" y="4647260"/>
+            <a:ext cx="135920" cy="135920"/>
+          </a:xfrm>
+          <a:prstGeom prst="ellipse">
+            <a:avLst/>
+          </a:prstGeom>
+          <a:solidFill>
+            <a:srgbClr val="FF0000"/>
+          </a:solidFill>
+        </p:spPr>
+        <p:style>
+          <a:lnRef idx="2">
+            <a:schemeClr val="accent1">
+              <a:shade val="50000"/>
+            </a:schemeClr>
+          </a:lnRef>
+          <a:fillRef idx="1">
+            <a:schemeClr val="accent1"/>
+          </a:fillRef>
+          <a:effectRef idx="0">
+            <a:schemeClr val="accent1"/>
+          </a:effectRef>
+          <a:fontRef idx="minor">
+            <a:schemeClr val="lt1"/>
+          </a:fontRef>
+        </p:style>
+        <p:txBody>
+          <a:bodyPr rtlCol="0" anchor="ctr"/>
+          <a:lstStyle/>
+          <a:p>
+            <a:pPr algn="ctr"/>
+            <a:endParaRPr kumimoji="1" lang="ja-JP" altLang="en-US"/>
+          </a:p>
+        </p:txBody>
+      </p:sp>
+      <p:sp>
+        <p:nvSpPr>
+          <p:cNvPr id="26" name="テキスト ボックス 25">
+            <a:extLst>
+              <a:ext uri="{FF2B5EF4-FFF2-40B4-BE49-F238E27FC236}">
+                <a16:creationId xmlns:a16="http://schemas.microsoft.com/office/drawing/2014/main" id="{2ECFE478-6B69-4F4C-B018-41A9C93328FF}"/>
+              </a:ext>
+            </a:extLst>
+          </p:cNvPr>
+          <p:cNvSpPr txBox="1"/>
+          <p:nvPr/>
+        </p:nvSpPr>
+        <p:spPr>
+          <a:xfrm>
+            <a:off x="2842581" y="4539431"/>
+            <a:ext cx="2204451" cy="369332"/>
+          </a:xfrm>
+          <a:prstGeom prst="rect">
+            <a:avLst/>
+          </a:prstGeom>
+          <a:noFill/>
+        </p:spPr>
+        <p:txBody>
+          <a:bodyPr wrap="none" rtlCol="0">
+            <a:spAutoFit/>
+          </a:bodyPr>
+          <a:lstStyle/>
+          <a:p>
+            <a:pPr algn="ctr"/>
+            <a:r>
+              <a:rPr lang="en-US" altLang="ja-JP" dirty="0"/>
+              <a:t>Current Scan Point</a:t>
+            </a:r>
+            <a:endParaRPr kumimoji="1" lang="ja-JP" altLang="en-US" dirty="0"/>
+          </a:p>
+        </p:txBody>
+      </p:sp>
+      <p:sp>
+        <p:nvSpPr>
+          <p:cNvPr id="28" name="楕円 27">
+            <a:extLst>
+              <a:ext uri="{FF2B5EF4-FFF2-40B4-BE49-F238E27FC236}">
+                <a16:creationId xmlns:a16="http://schemas.microsoft.com/office/drawing/2014/main" id="{24D420D1-B972-410C-B4EF-AA460CAB5DD7}"/>
+              </a:ext>
+            </a:extLst>
+          </p:cNvPr>
+          <p:cNvSpPr/>
+          <p:nvPr/>
+        </p:nvSpPr>
+        <p:spPr>
+          <a:xfrm>
+            <a:off x="2731063" y="5145269"/>
+            <a:ext cx="135920" cy="135920"/>
+          </a:xfrm>
+          <a:prstGeom prst="ellipse">
+            <a:avLst/>
+          </a:prstGeom>
+        </p:spPr>
+        <p:style>
+          <a:lnRef idx="2">
+            <a:schemeClr val="accent1">
+              <a:shade val="50000"/>
+            </a:schemeClr>
+          </a:lnRef>
+          <a:fillRef idx="1">
+            <a:schemeClr val="accent1"/>
+          </a:fillRef>
+          <a:effectRef idx="0">
+            <a:schemeClr val="accent1"/>
+          </a:effectRef>
+          <a:fontRef idx="minor">
+            <a:schemeClr val="lt1"/>
+          </a:fontRef>
+        </p:style>
+        <p:txBody>
+          <a:bodyPr rtlCol="0" anchor="ctr"/>
+          <a:lstStyle/>
+          <a:p>
+            <a:pPr algn="ctr"/>
+            <a:endParaRPr kumimoji="1" lang="ja-JP" altLang="en-US"/>
+          </a:p>
+        </p:txBody>
+      </p:sp>
+      <p:sp>
+        <p:nvSpPr>
+          <p:cNvPr id="30" name="テキスト ボックス 29">
+            <a:extLst>
+              <a:ext uri="{FF2B5EF4-FFF2-40B4-BE49-F238E27FC236}">
+                <a16:creationId xmlns:a16="http://schemas.microsoft.com/office/drawing/2014/main" id="{4550EE14-4527-4CB6-9C7D-C9D0DF67A7C3}"/>
+              </a:ext>
+            </a:extLst>
+          </p:cNvPr>
+          <p:cNvSpPr txBox="1"/>
+          <p:nvPr/>
+        </p:nvSpPr>
+        <p:spPr>
+          <a:xfrm>
+            <a:off x="2836964" y="5029186"/>
+            <a:ext cx="2484976" cy="369332"/>
+          </a:xfrm>
+          <a:prstGeom prst="rect">
+            <a:avLst/>
+          </a:prstGeom>
+          <a:noFill/>
+        </p:spPr>
+        <p:txBody>
+          <a:bodyPr wrap="none" rtlCol="0">
+            <a:spAutoFit/>
+          </a:bodyPr>
+          <a:lstStyle/>
+          <a:p>
+            <a:pPr algn="ctr"/>
+            <a:r>
+              <a:rPr lang="en-US" altLang="ja-JP" dirty="0"/>
+              <a:t>Reference Scan Point</a:t>
+            </a:r>
+            <a:endParaRPr kumimoji="1" lang="ja-JP" altLang="en-US" dirty="0"/>
+          </a:p>
+        </p:txBody>
+      </p:sp>
+    </p:spTree>
+    <p:extLst>
+      <p:ext uri="{BB962C8B-B14F-4D97-AF65-F5344CB8AC3E}">
+        <p14:creationId xmlns:p14="http://schemas.microsoft.com/office/powerpoint/2010/main" val="3669950444"/>
+      </p:ext>
+    </p:extLst>
+  </p:cSld>
+  <p:clrMapOvr>
+    <a:masterClrMapping/>
+  </p:clrMapOvr>
+</p:sld>
+</file>
+
 <file path=ppt/theme/theme1.xml><?xml version="1.0" encoding="utf-8"?>
 <a:theme xmlns:a="http://schemas.openxmlformats.org/drawingml/2006/main" name="Office テーマ">
   <a:themeElements>

</xml_diff>

<commit_message>
add RefScanMakerBS_Activity_makeRefScan.png and RefScanMakerBS_Class.png
</commit_message>
<xml_diff>
--- a/SLAM_Theoretical_Formulas.pptx
+++ b/SLAM_Theoretical_Formulas.pptx
@@ -16920,6 +16920,639 @@
           </a:p>
         </p:txBody>
       </p:sp>
+      <mc:AlternateContent xmlns:mc="http://schemas.openxmlformats.org/markup-compatibility/2006">
+        <mc:Choice xmlns:a14="http://schemas.microsoft.com/office/drawing/2010/main" Requires="a14">
+          <p:sp>
+            <p:nvSpPr>
+              <p:cNvPr id="31" name="テキスト ボックス 30">
+                <a:extLst>
+                  <a:ext uri="{FF2B5EF4-FFF2-40B4-BE49-F238E27FC236}">
+                    <a16:creationId xmlns:a16="http://schemas.microsoft.com/office/drawing/2014/main" id="{3C59F112-D5E7-4FDE-8279-BFB9FD5BB294}"/>
+                  </a:ext>
+                </a:extLst>
+              </p:cNvPr>
+              <p:cNvSpPr txBox="1"/>
+              <p:nvPr/>
+            </p:nvSpPr>
+            <p:spPr>
+              <a:xfrm>
+                <a:off x="4399861" y="692458"/>
+                <a:ext cx="3060903" cy="871264"/>
+              </a:xfrm>
+              <a:prstGeom prst="rect">
+                <a:avLst/>
+              </a:prstGeom>
+              <a:noFill/>
+            </p:spPr>
+            <p:txBody>
+              <a:bodyPr wrap="none" rtlCol="0">
+                <a:spAutoFit/>
+              </a:bodyPr>
+              <a:lstStyle/>
+              <a:p>
+                <a:pPr algn="ctr"/>
+                <a14:m>
+                  <m:oMathPara xmlns:m="http://schemas.openxmlformats.org/officeDocument/2006/math">
+                    <m:oMathParaPr>
+                      <m:jc m:val="centerGroup"/>
+                    </m:oMathParaPr>
+                    <m:oMath xmlns:m="http://schemas.openxmlformats.org/officeDocument/2006/math">
+                      <m:f>
+                        <m:fPr>
+                          <m:ctrlPr>
+                            <a:rPr kumimoji="1" lang="en-US" altLang="ja-JP" i="1" smtClean="0">
+                              <a:latin typeface="Cambria Math" panose="02040503050406030204" pitchFamily="18" charset="0"/>
+                            </a:rPr>
+                          </m:ctrlPr>
+                        </m:fPr>
+                        <m:num>
+                          <m:r>
+                            <a:rPr kumimoji="1" lang="en-US" altLang="ja-JP" b="0" i="1" smtClean="0">
+                              <a:latin typeface="Cambria Math" panose="02040503050406030204" pitchFamily="18" charset="0"/>
+                            </a:rPr>
+                            <m:t>1</m:t>
+                          </m:r>
+                        </m:num>
+                        <m:den>
+                          <m:r>
+                            <a:rPr kumimoji="1" lang="en-US" altLang="ja-JP" b="0" i="1" smtClean="0">
+                              <a:latin typeface="Cambria Math" panose="02040503050406030204" pitchFamily="18" charset="0"/>
+                            </a:rPr>
+                            <m:t>𝑁</m:t>
+                          </m:r>
+                        </m:den>
+                      </m:f>
+                      <m:nary>
+                        <m:naryPr>
+                          <m:chr m:val="∑"/>
+                          <m:ctrlPr>
+                            <a:rPr kumimoji="1" lang="en-US" altLang="ja-JP" i="1" smtClean="0">
+                              <a:latin typeface="Cambria Math" panose="02040503050406030204" pitchFamily="18" charset="0"/>
+                            </a:rPr>
+                          </m:ctrlPr>
+                        </m:naryPr>
+                        <m:sub>
+                          <m:r>
+                            <m:rPr>
+                              <m:brk m:alnAt="23"/>
+                            </m:rPr>
+                            <a:rPr kumimoji="1" lang="en-US" altLang="ja-JP" b="0" i="1" smtClean="0">
+                              <a:latin typeface="Cambria Math" panose="02040503050406030204" pitchFamily="18" charset="0"/>
+                            </a:rPr>
+                            <m:t>𝑖</m:t>
+                          </m:r>
+                          <m:r>
+                            <a:rPr kumimoji="1" lang="en-US" altLang="ja-JP" b="0" i="1" smtClean="0">
+                              <a:latin typeface="Cambria Math" panose="02040503050406030204" pitchFamily="18" charset="0"/>
+                            </a:rPr>
+                            <m:t>=1</m:t>
+                          </m:r>
+                        </m:sub>
+                        <m:sup>
+                          <m:r>
+                            <a:rPr kumimoji="1" lang="en-US" altLang="ja-JP" b="0" i="1" smtClean="0">
+                              <a:latin typeface="Cambria Math" panose="02040503050406030204" pitchFamily="18" charset="0"/>
+                            </a:rPr>
+                            <m:t>𝑁</m:t>
+                          </m:r>
+                        </m:sup>
+                        <m:e>
+                          <m:sSup>
+                            <m:sSupPr>
+                              <m:ctrlPr>
+                                <a:rPr kumimoji="1" lang="en-US" altLang="ja-JP" i="1" smtClean="0">
+                                  <a:latin typeface="Cambria Math" panose="02040503050406030204" pitchFamily="18" charset="0"/>
+                                </a:rPr>
+                              </m:ctrlPr>
+                            </m:sSupPr>
+                            <m:e>
+                              <m:d>
+                                <m:dPr>
+                                  <m:begChr m:val="‖"/>
+                                  <m:endChr m:val="‖"/>
+                                  <m:ctrlPr>
+                                    <a:rPr lang="en-US" altLang="ja-JP" i="1">
+                                      <a:latin typeface="Cambria Math" panose="02040503050406030204" pitchFamily="18" charset="0"/>
+                                    </a:rPr>
+                                  </m:ctrlPr>
+                                </m:dPr>
+                                <m:e>
+                                  <m:sSub>
+                                    <m:sSubPr>
+                                      <m:ctrlPr>
+                                        <a:rPr lang="en-US" altLang="ja-JP" i="1">
+                                          <a:latin typeface="Cambria Math" panose="02040503050406030204" pitchFamily="18" charset="0"/>
+                                        </a:rPr>
+                                      </m:ctrlPr>
+                                    </m:sSubPr>
+                                    <m:e>
+                                      <m:r>
+                                        <a:rPr lang="en-US" altLang="ja-JP" b="1" i="1">
+                                          <a:latin typeface="Cambria Math" panose="02040503050406030204" pitchFamily="18" charset="0"/>
+                                        </a:rPr>
+                                        <m:t>𝒏</m:t>
+                                      </m:r>
+                                    </m:e>
+                                    <m:sub>
+                                      <m:sSub>
+                                        <m:sSubPr>
+                                          <m:ctrlPr>
+                                            <a:rPr lang="en-US" altLang="ja-JP" i="1">
+                                              <a:latin typeface="Cambria Math" panose="02040503050406030204" pitchFamily="18" charset="0"/>
+                                            </a:rPr>
+                                          </m:ctrlPr>
+                                        </m:sSubPr>
+                                        <m:e>
+                                          <m:r>
+                                            <a:rPr lang="en-US" altLang="ja-JP" i="1">
+                                              <a:latin typeface="Cambria Math" panose="02040503050406030204" pitchFamily="18" charset="0"/>
+                                            </a:rPr>
+                                            <m:t>𝑗</m:t>
+                                          </m:r>
+                                        </m:e>
+                                        <m:sub>
+                                          <m:r>
+                                            <a:rPr lang="en-US" altLang="ja-JP" i="1">
+                                              <a:latin typeface="Cambria Math" panose="02040503050406030204" pitchFamily="18" charset="0"/>
+                                            </a:rPr>
+                                            <m:t>𝑖</m:t>
+                                          </m:r>
+                                        </m:sub>
+                                      </m:sSub>
+                                    </m:sub>
+                                  </m:sSub>
+                                  <m:r>
+                                    <a:rPr lang="en-US" altLang="ja-JP" i="1">
+                                      <a:latin typeface="Cambria Math" panose="02040503050406030204" pitchFamily="18" charset="0"/>
+                                      <a:ea typeface="Cambria Math" panose="02040503050406030204" pitchFamily="18" charset="0"/>
+                                    </a:rPr>
+                                    <m:t>∙(</m:t>
+                                  </m:r>
+                                  <m:r>
+                                    <a:rPr lang="en-US" altLang="ja-JP" i="1">
+                                      <a:latin typeface="Cambria Math" panose="02040503050406030204" pitchFamily="18" charset="0"/>
+                                      <a:ea typeface="Cambria Math" panose="02040503050406030204" pitchFamily="18" charset="0"/>
+                                    </a:rPr>
+                                    <m:t>𝑅</m:t>
+                                  </m:r>
+                                  <m:sSub>
+                                    <m:sSubPr>
+                                      <m:ctrlPr>
+                                        <a:rPr lang="en-US" altLang="ja-JP" i="1">
+                                          <a:latin typeface="Cambria Math" panose="02040503050406030204" pitchFamily="18" charset="0"/>
+                                          <a:ea typeface="Cambria Math" panose="02040503050406030204" pitchFamily="18" charset="0"/>
+                                        </a:rPr>
+                                      </m:ctrlPr>
+                                    </m:sSubPr>
+                                    <m:e>
+                                      <m:r>
+                                        <a:rPr lang="en-US" altLang="ja-JP" b="1" i="1">
+                                          <a:latin typeface="Cambria Math" panose="02040503050406030204" pitchFamily="18" charset="0"/>
+                                          <a:ea typeface="Cambria Math" panose="02040503050406030204" pitchFamily="18" charset="0"/>
+                                        </a:rPr>
+                                        <m:t>𝒑</m:t>
+                                      </m:r>
+                                    </m:e>
+                                    <m:sub>
+                                      <m:r>
+                                        <a:rPr lang="en-US" altLang="ja-JP" i="1">
+                                          <a:latin typeface="Cambria Math" panose="02040503050406030204" pitchFamily="18" charset="0"/>
+                                          <a:ea typeface="Cambria Math" panose="02040503050406030204" pitchFamily="18" charset="0"/>
+                                        </a:rPr>
+                                        <m:t>𝑖</m:t>
+                                      </m:r>
+                                    </m:sub>
+                                  </m:sSub>
+                                  <m:r>
+                                    <a:rPr lang="en-US" altLang="ja-JP" i="1">
+                                      <a:latin typeface="Cambria Math" panose="02040503050406030204" pitchFamily="18" charset="0"/>
+                                      <a:ea typeface="Cambria Math" panose="02040503050406030204" pitchFamily="18" charset="0"/>
+                                    </a:rPr>
+                                    <m:t>+</m:t>
+                                  </m:r>
+                                  <m:r>
+                                    <a:rPr lang="en-US" altLang="ja-JP" b="1" i="1">
+                                      <a:latin typeface="Cambria Math" panose="02040503050406030204" pitchFamily="18" charset="0"/>
+                                      <a:ea typeface="Cambria Math" panose="02040503050406030204" pitchFamily="18" charset="0"/>
+                                    </a:rPr>
+                                    <m:t>𝒕</m:t>
+                                  </m:r>
+                                  <m:r>
+                                    <a:rPr lang="en-US" altLang="ja-JP" i="1">
+                                      <a:latin typeface="Cambria Math" panose="02040503050406030204" pitchFamily="18" charset="0"/>
+                                      <a:ea typeface="Cambria Math" panose="02040503050406030204" pitchFamily="18" charset="0"/>
+                                    </a:rPr>
+                                    <m:t>−</m:t>
+                                  </m:r>
+                                  <m:sSub>
+                                    <m:sSubPr>
+                                      <m:ctrlPr>
+                                        <a:rPr lang="en-US" altLang="ja-JP" i="1">
+                                          <a:latin typeface="Cambria Math" panose="02040503050406030204" pitchFamily="18" charset="0"/>
+                                          <a:ea typeface="Cambria Math" panose="02040503050406030204" pitchFamily="18" charset="0"/>
+                                        </a:rPr>
+                                      </m:ctrlPr>
+                                    </m:sSubPr>
+                                    <m:e>
+                                      <m:r>
+                                        <a:rPr lang="en-US" altLang="ja-JP" b="1" i="1">
+                                          <a:latin typeface="Cambria Math" panose="02040503050406030204" pitchFamily="18" charset="0"/>
+                                          <a:ea typeface="Cambria Math" panose="02040503050406030204" pitchFamily="18" charset="0"/>
+                                        </a:rPr>
+                                        <m:t>𝒒</m:t>
+                                      </m:r>
+                                    </m:e>
+                                    <m:sub>
+                                      <m:sSub>
+                                        <m:sSubPr>
+                                          <m:ctrlPr>
+                                            <a:rPr lang="en-US" altLang="ja-JP" i="1">
+                                              <a:latin typeface="Cambria Math" panose="02040503050406030204" pitchFamily="18" charset="0"/>
+                                              <a:ea typeface="Cambria Math" panose="02040503050406030204" pitchFamily="18" charset="0"/>
+                                            </a:rPr>
+                                          </m:ctrlPr>
+                                        </m:sSubPr>
+                                        <m:e>
+                                          <m:r>
+                                            <a:rPr lang="en-US" altLang="ja-JP" i="1">
+                                              <a:latin typeface="Cambria Math" panose="02040503050406030204" pitchFamily="18" charset="0"/>
+                                              <a:ea typeface="Cambria Math" panose="02040503050406030204" pitchFamily="18" charset="0"/>
+                                            </a:rPr>
+                                            <m:t>𝑗</m:t>
+                                          </m:r>
+                                        </m:e>
+                                        <m:sub>
+                                          <m:r>
+                                            <a:rPr lang="en-US" altLang="ja-JP" i="1">
+                                              <a:latin typeface="Cambria Math" panose="02040503050406030204" pitchFamily="18" charset="0"/>
+                                              <a:ea typeface="Cambria Math" panose="02040503050406030204" pitchFamily="18" charset="0"/>
+                                            </a:rPr>
+                                            <m:t>𝑖</m:t>
+                                          </m:r>
+                                        </m:sub>
+                                      </m:sSub>
+                                    </m:sub>
+                                  </m:sSub>
+                                  <m:r>
+                                    <a:rPr lang="en-US" altLang="ja-JP" i="1">
+                                      <a:latin typeface="Cambria Math" panose="02040503050406030204" pitchFamily="18" charset="0"/>
+                                      <a:ea typeface="Cambria Math" panose="02040503050406030204" pitchFamily="18" charset="0"/>
+                                    </a:rPr>
+                                    <m:t>)</m:t>
+                                  </m:r>
+                                </m:e>
+                              </m:d>
+                            </m:e>
+                            <m:sup>
+                              <m:r>
+                                <a:rPr kumimoji="1" lang="en-US" altLang="ja-JP" b="0" i="1" smtClean="0">
+                                  <a:latin typeface="Cambria Math" panose="02040503050406030204" pitchFamily="18" charset="0"/>
+                                </a:rPr>
+                                <m:t>2</m:t>
+                              </m:r>
+                            </m:sup>
+                          </m:sSup>
+                        </m:e>
+                      </m:nary>
+                    </m:oMath>
+                  </m:oMathPara>
+                </a14:m>
+                <a:endParaRPr kumimoji="1" lang="ja-JP" altLang="en-US" dirty="0"/>
+              </a:p>
+            </p:txBody>
+          </p:sp>
+        </mc:Choice>
+        <mc:Fallback>
+          <p:sp>
+            <p:nvSpPr>
+              <p:cNvPr id="31" name="テキスト ボックス 30">
+                <a:extLst>
+                  <a:ext uri="{FF2B5EF4-FFF2-40B4-BE49-F238E27FC236}">
+                    <a16:creationId xmlns:a16="http://schemas.microsoft.com/office/drawing/2014/main" id="{3C59F112-D5E7-4FDE-8279-BFB9FD5BB294}"/>
+                  </a:ext>
+                </a:extLst>
+              </p:cNvPr>
+              <p:cNvSpPr txBox="1">
+                <a:spLocks noRot="1" noChangeAspect="1" noMove="1" noResize="1" noEditPoints="1" noAdjustHandles="1" noChangeArrowheads="1" noChangeShapeType="1" noTextEdit="1"/>
+              </p:cNvSpPr>
+              <p:nvPr/>
+            </p:nvSpPr>
+            <p:spPr>
+              <a:xfrm>
+                <a:off x="4399861" y="692458"/>
+                <a:ext cx="3060903" cy="871264"/>
+              </a:xfrm>
+              <a:prstGeom prst="rect">
+                <a:avLst/>
+              </a:prstGeom>
+              <a:blipFill>
+                <a:blip r:embed="rId2"/>
+                <a:stretch>
+                  <a:fillRect/>
+                </a:stretch>
+              </a:blipFill>
+            </p:spPr>
+            <p:txBody>
+              <a:bodyPr/>
+              <a:lstStyle/>
+              <a:p>
+                <a:r>
+                  <a:rPr lang="ja-JP" altLang="en-US">
+                    <a:noFill/>
+                  </a:rPr>
+                  <a:t> </a:t>
+                </a:r>
+              </a:p>
+            </p:txBody>
+          </p:sp>
+        </mc:Fallback>
+      </mc:AlternateContent>
+      <p:sp>
+        <p:nvSpPr>
+          <p:cNvPr id="32" name="楕円 31">
+            <a:extLst>
+              <a:ext uri="{FF2B5EF4-FFF2-40B4-BE49-F238E27FC236}">
+                <a16:creationId xmlns:a16="http://schemas.microsoft.com/office/drawing/2014/main" id="{1F38B08C-AA74-4FFF-94C7-D2EFD43BA14C}"/>
+              </a:ext>
+            </a:extLst>
+          </p:cNvPr>
+          <p:cNvSpPr/>
+          <p:nvPr/>
+        </p:nvSpPr>
+        <p:spPr>
+          <a:xfrm>
+            <a:off x="5020398" y="963150"/>
+            <a:ext cx="430490" cy="451941"/>
+          </a:xfrm>
+          <a:prstGeom prst="ellipse">
+            <a:avLst/>
+          </a:prstGeom>
+          <a:noFill/>
+          <a:ln w="19050">
+            <a:solidFill>
+              <a:srgbClr val="FF0000"/>
+            </a:solidFill>
+          </a:ln>
+        </p:spPr>
+        <p:style>
+          <a:lnRef idx="2">
+            <a:schemeClr val="accent1">
+              <a:shade val="50000"/>
+            </a:schemeClr>
+          </a:lnRef>
+          <a:fillRef idx="1">
+            <a:schemeClr val="accent1"/>
+          </a:fillRef>
+          <a:effectRef idx="0">
+            <a:schemeClr val="accent1"/>
+          </a:effectRef>
+          <a:fontRef idx="minor">
+            <a:schemeClr val="lt1"/>
+          </a:fontRef>
+        </p:style>
+        <p:txBody>
+          <a:bodyPr rtlCol="0" anchor="ctr"/>
+          <a:lstStyle/>
+          <a:p>
+            <a:pPr algn="ctr"/>
+            <a:endParaRPr kumimoji="1" lang="ja-JP" altLang="en-US"/>
+          </a:p>
+        </p:txBody>
+      </p:sp>
+      <p:sp>
+        <p:nvSpPr>
+          <p:cNvPr id="34" name="楕円 33">
+            <a:extLst>
+              <a:ext uri="{FF2B5EF4-FFF2-40B4-BE49-F238E27FC236}">
+                <a16:creationId xmlns:a16="http://schemas.microsoft.com/office/drawing/2014/main" id="{D787EBB5-EE7E-45ED-A22B-CB88F5D6EF96}"/>
+              </a:ext>
+            </a:extLst>
+          </p:cNvPr>
+          <p:cNvSpPr/>
+          <p:nvPr/>
+        </p:nvSpPr>
+        <p:spPr>
+          <a:xfrm>
+            <a:off x="5625559" y="946873"/>
+            <a:ext cx="855139" cy="451941"/>
+          </a:xfrm>
+          <a:prstGeom prst="ellipse">
+            <a:avLst/>
+          </a:prstGeom>
+          <a:noFill/>
+          <a:ln w="19050">
+            <a:solidFill>
+              <a:srgbClr val="FF0000"/>
+            </a:solidFill>
+          </a:ln>
+        </p:spPr>
+        <p:style>
+          <a:lnRef idx="2">
+            <a:schemeClr val="accent1">
+              <a:shade val="50000"/>
+            </a:schemeClr>
+          </a:lnRef>
+          <a:fillRef idx="1">
+            <a:schemeClr val="accent1"/>
+          </a:fillRef>
+          <a:effectRef idx="0">
+            <a:schemeClr val="accent1"/>
+          </a:effectRef>
+          <a:fontRef idx="minor">
+            <a:schemeClr val="lt1"/>
+          </a:fontRef>
+        </p:style>
+        <p:txBody>
+          <a:bodyPr rtlCol="0" anchor="ctr"/>
+          <a:lstStyle/>
+          <a:p>
+            <a:pPr algn="ctr"/>
+            <a:endParaRPr kumimoji="1" lang="ja-JP" altLang="en-US"/>
+          </a:p>
+        </p:txBody>
+      </p:sp>
+      <p:sp>
+        <p:nvSpPr>
+          <p:cNvPr id="36" name="楕円 35">
+            <a:extLst>
+              <a:ext uri="{FF2B5EF4-FFF2-40B4-BE49-F238E27FC236}">
+                <a16:creationId xmlns:a16="http://schemas.microsoft.com/office/drawing/2014/main" id="{37DA0BED-BE11-47DA-8264-3471B4046EFC}"/>
+              </a:ext>
+            </a:extLst>
+          </p:cNvPr>
+          <p:cNvSpPr/>
+          <p:nvPr/>
+        </p:nvSpPr>
+        <p:spPr>
+          <a:xfrm>
+            <a:off x="6610980" y="946872"/>
+            <a:ext cx="427312" cy="451941"/>
+          </a:xfrm>
+          <a:prstGeom prst="ellipse">
+            <a:avLst/>
+          </a:prstGeom>
+          <a:noFill/>
+          <a:ln w="19050">
+            <a:solidFill>
+              <a:srgbClr val="FF0000"/>
+            </a:solidFill>
+          </a:ln>
+        </p:spPr>
+        <p:style>
+          <a:lnRef idx="2">
+            <a:schemeClr val="accent1">
+              <a:shade val="50000"/>
+            </a:schemeClr>
+          </a:lnRef>
+          <a:fillRef idx="1">
+            <a:schemeClr val="accent1"/>
+          </a:fillRef>
+          <a:effectRef idx="0">
+            <a:schemeClr val="accent1"/>
+          </a:effectRef>
+          <a:fontRef idx="minor">
+            <a:schemeClr val="lt1"/>
+          </a:fontRef>
+        </p:style>
+        <p:txBody>
+          <a:bodyPr rtlCol="0" anchor="ctr"/>
+          <a:lstStyle/>
+          <a:p>
+            <a:pPr algn="ctr"/>
+            <a:endParaRPr kumimoji="1" lang="ja-JP" altLang="en-US"/>
+          </a:p>
+        </p:txBody>
+      </p:sp>
+      <p:sp>
+        <p:nvSpPr>
+          <p:cNvPr id="38" name="テキスト ボックス 37">
+            <a:extLst>
+              <a:ext uri="{FF2B5EF4-FFF2-40B4-BE49-F238E27FC236}">
+                <a16:creationId xmlns:a16="http://schemas.microsoft.com/office/drawing/2014/main" id="{6F5CF1A6-1D53-475B-A453-D464C95AFBDF}"/>
+              </a:ext>
+            </a:extLst>
+          </p:cNvPr>
+          <p:cNvSpPr txBox="1"/>
+          <p:nvPr/>
+        </p:nvSpPr>
+        <p:spPr>
+          <a:xfrm>
+            <a:off x="4914632" y="1444851"/>
+            <a:ext cx="787395" cy="523220"/>
+          </a:xfrm>
+          <a:prstGeom prst="rect">
+            <a:avLst/>
+          </a:prstGeom>
+          <a:noFill/>
+        </p:spPr>
+        <p:txBody>
+          <a:bodyPr wrap="none" rtlCol="0">
+            <a:spAutoFit/>
+          </a:bodyPr>
+          <a:lstStyle/>
+          <a:p>
+            <a:pPr algn="ctr"/>
+            <a:r>
+              <a:rPr kumimoji="1" lang="en-US" altLang="ja-JP" sz="1400" dirty="0"/>
+              <a:t>Normal</a:t>
+            </a:r>
+          </a:p>
+          <a:p>
+            <a:pPr algn="ctr"/>
+            <a:r>
+              <a:rPr lang="en-US" altLang="ja-JP" sz="1400" dirty="0"/>
+              <a:t>Vector</a:t>
+            </a:r>
+            <a:endParaRPr kumimoji="1" lang="ja-JP" altLang="en-US" sz="1400" dirty="0"/>
+          </a:p>
+        </p:txBody>
+      </p:sp>
+      <p:sp>
+        <p:nvSpPr>
+          <p:cNvPr id="40" name="テキスト ボックス 39">
+            <a:extLst>
+              <a:ext uri="{FF2B5EF4-FFF2-40B4-BE49-F238E27FC236}">
+                <a16:creationId xmlns:a16="http://schemas.microsoft.com/office/drawing/2014/main" id="{1B33FB20-3135-4F94-9A65-F0D81F702136}"/>
+              </a:ext>
+            </a:extLst>
+          </p:cNvPr>
+          <p:cNvSpPr txBox="1"/>
+          <p:nvPr/>
+        </p:nvSpPr>
+        <p:spPr>
+          <a:xfrm>
+            <a:off x="5513557" y="398353"/>
+            <a:ext cx="1079142" cy="523220"/>
+          </a:xfrm>
+          <a:prstGeom prst="rect">
+            <a:avLst/>
+          </a:prstGeom>
+          <a:noFill/>
+        </p:spPr>
+        <p:txBody>
+          <a:bodyPr wrap="none" rtlCol="0">
+            <a:spAutoFit/>
+          </a:bodyPr>
+          <a:lstStyle/>
+          <a:p>
+            <a:pPr algn="ctr"/>
+            <a:r>
+              <a:rPr lang="en-US" altLang="ja-JP" sz="1400" dirty="0"/>
+              <a:t>Current</a:t>
+            </a:r>
+          </a:p>
+          <a:p>
+            <a:pPr algn="ctr"/>
+            <a:r>
+              <a:rPr kumimoji="1" lang="en-US" altLang="ja-JP" sz="1400" dirty="0"/>
+              <a:t>Scan Point</a:t>
+            </a:r>
+          </a:p>
+        </p:txBody>
+      </p:sp>
+      <p:sp>
+        <p:nvSpPr>
+          <p:cNvPr id="42" name="テキスト ボックス 41">
+            <a:extLst>
+              <a:ext uri="{FF2B5EF4-FFF2-40B4-BE49-F238E27FC236}">
+                <a16:creationId xmlns:a16="http://schemas.microsoft.com/office/drawing/2014/main" id="{C2E63AD4-6546-4F6F-A869-98AE18BBD839}"/>
+              </a:ext>
+            </a:extLst>
+          </p:cNvPr>
+          <p:cNvSpPr txBox="1"/>
+          <p:nvPr/>
+        </p:nvSpPr>
+        <p:spPr>
+          <a:xfrm>
+            <a:off x="6322564" y="1412624"/>
+            <a:ext cx="1079142" cy="523220"/>
+          </a:xfrm>
+          <a:prstGeom prst="rect">
+            <a:avLst/>
+          </a:prstGeom>
+          <a:noFill/>
+        </p:spPr>
+        <p:txBody>
+          <a:bodyPr wrap="none" rtlCol="0">
+            <a:spAutoFit/>
+          </a:bodyPr>
+          <a:lstStyle/>
+          <a:p>
+            <a:pPr algn="ctr"/>
+            <a:r>
+              <a:rPr lang="en-US" altLang="ja-JP" sz="1400" dirty="0"/>
+              <a:t>Reference</a:t>
+            </a:r>
+          </a:p>
+          <a:p>
+            <a:pPr algn="ctr"/>
+            <a:r>
+              <a:rPr kumimoji="1" lang="en-US" altLang="ja-JP" sz="1400" dirty="0"/>
+              <a:t>Scan Point</a:t>
+            </a:r>
+          </a:p>
+        </p:txBody>
+      </p:sp>
     </p:spTree>
     <p:extLst>
       <p:ext uri="{BB962C8B-B14F-4D97-AF65-F5344CB8AC3E}">

</xml_diff>